<commit_message>
Added: Test function to extract document metadata and demonstrate file search (half implemented)
</commit_message>
<xml_diff>
--- a/OpenAI-BackendTools.pptx
+++ b/OpenAI-BackendTools.pptx
@@ -223,7 +223,7 @@
           <a:p>
             <a:fld id="{FC4BCF81-FD30-4738-8CD3-6C15724C57DB}" type="datetimeFigureOut">
               <a:rPr lang="en-GB" smtClean="0"/>
-              <a:t>24/05/2025</a:t>
+              <a:t>25/05/2025</a:t>
             </a:fld>
             <a:endParaRPr lang="en-GB"/>
           </a:p>
@@ -388,7 +388,7 @@
           <a:p>
             <a:fld id="{393C90FD-22B7-4ADA-A649-5A6995920D65}" type="datetimeFigureOut">
               <a:rPr lang="en-US" smtClean="0"/>
-              <a:t>5/24/2025</a:t>
+              <a:t>5/25/2025</a:t>
             </a:fld>
             <a:endParaRPr lang="en-US"/>
           </a:p>
@@ -19553,7 +19553,7 @@
         </p:blipFill>
         <p:spPr>
           <a:xfrm>
-            <a:off x="5813188" y="1351833"/>
+            <a:off x="5762905" y="2744381"/>
             <a:ext cx="2825764" cy="2070467"/>
           </a:xfrm>
           <a:prstGeom prst="rect">
@@ -19821,8 +19821,8 @@
         </p:nvSpPr>
         <p:spPr>
           <a:xfrm>
-            <a:off x="251520" y="2731500"/>
-            <a:ext cx="901192" cy="252000"/>
+            <a:off x="251520" y="2752060"/>
+            <a:ext cx="671771" cy="180000"/>
           </a:xfrm>
           <a:prstGeom prst="rect">
             <a:avLst/>
@@ -19851,11 +19851,11 @@
           </a:fontRef>
         </p:style>
         <p:txBody>
-          <a:bodyPr rtlCol="0" anchor="t"/>
+          <a:bodyPr lIns="36000" tIns="18000" rIns="0" bIns="0" rtlCol="0" anchor="t"/>
           <a:lstStyle/>
           <a:p>
             <a:r>
-              <a:rPr lang="en-US" sz="1000" b="1">
+              <a:rPr lang="en-US" sz="800" b="1">
                 <a:solidFill>
                   <a:schemeClr val="tx1">
                     <a:lumMod val="75000"/>
@@ -19866,9 +19866,9 @@
                 <a:ea typeface="Open Sans Condensed" panose="020B0806030504020204" pitchFamily="34" charset="0"/>
                 <a:cs typeface="Open Sans Condensed" panose="020B0806030504020204" pitchFamily="34" charset="0"/>
               </a:rPr>
-              <a:t>Atribute</a:t>
+              <a:t>Attribute</a:t>
             </a:r>
-            <a:endParaRPr lang="de-DE" sz="1000" b="1">
+            <a:endParaRPr lang="de-DE" sz="800" b="1">
               <a:solidFill>
                 <a:schemeClr val="tx1">
                   <a:lumMod val="75000"/>
@@ -19896,8 +19896,8 @@
         </p:nvSpPr>
         <p:spPr>
           <a:xfrm>
-            <a:off x="251520" y="3027406"/>
-            <a:ext cx="901192" cy="252000"/>
+            <a:off x="251520" y="3184451"/>
+            <a:ext cx="671771" cy="180000"/>
           </a:xfrm>
           <a:prstGeom prst="rect">
             <a:avLst/>
@@ -19926,11 +19926,11 @@
           </a:fontRef>
         </p:style>
         <p:txBody>
-          <a:bodyPr rtlCol="0" anchor="t"/>
+          <a:bodyPr lIns="36000" tIns="18000" rIns="0" bIns="0" rtlCol="0" anchor="t"/>
           <a:lstStyle/>
           <a:p>
             <a:r>
-              <a:rPr lang="en-US" sz="1000">
+              <a:rPr lang="en-US" sz="800">
                 <a:solidFill>
                   <a:schemeClr val="tx1">
                     <a:lumMod val="75000"/>
@@ -19943,7 +19943,7 @@
               </a:rPr>
               <a:t>id</a:t>
             </a:r>
-            <a:endParaRPr lang="de-DE" sz="1000">
+            <a:endParaRPr lang="de-DE" sz="800">
               <a:solidFill>
                 <a:schemeClr val="tx1">
                   <a:lumMod val="75000"/>
@@ -19971,8 +19971,8 @@
         </p:nvSpPr>
         <p:spPr>
           <a:xfrm>
-            <a:off x="1183869" y="2712856"/>
-            <a:ext cx="4252227" cy="252000"/>
+            <a:off x="956311" y="2755754"/>
+            <a:ext cx="4482490" cy="180000"/>
           </a:xfrm>
           <a:prstGeom prst="rect">
             <a:avLst/>
@@ -20001,11 +20001,11 @@
           </a:fontRef>
         </p:style>
         <p:txBody>
-          <a:bodyPr rtlCol="0" anchor="t"/>
+          <a:bodyPr lIns="36000" tIns="18000" rIns="0" bIns="0" rtlCol="0" anchor="t"/>
           <a:lstStyle/>
           <a:p>
             <a:r>
-              <a:rPr lang="en-US" sz="1000" b="1">
+              <a:rPr lang="en-US" sz="800" b="1">
                 <a:solidFill>
                   <a:schemeClr val="tx1">
                     <a:lumMod val="75000"/>
@@ -20018,7 +20018,7 @@
               </a:rPr>
               <a:t>Decription</a:t>
             </a:r>
-            <a:endParaRPr lang="de-DE" sz="1000" b="1">
+            <a:endParaRPr lang="de-DE" sz="800" b="1">
               <a:solidFill>
                 <a:schemeClr val="tx1">
                   <a:lumMod val="75000"/>
@@ -20046,8 +20046,8 @@
         </p:nvSpPr>
         <p:spPr>
           <a:xfrm>
-            <a:off x="1183869" y="3027406"/>
-            <a:ext cx="4252227" cy="252000"/>
+            <a:off x="953607" y="3184451"/>
+            <a:ext cx="4482490" cy="180000"/>
           </a:xfrm>
           <a:prstGeom prst="rect">
             <a:avLst/>
@@ -20076,11 +20076,11 @@
           </a:fontRef>
         </p:style>
         <p:txBody>
-          <a:bodyPr rtlCol="0" anchor="t"/>
+          <a:bodyPr lIns="36000" tIns="18000" rIns="0" bIns="0" rtlCol="0" anchor="t"/>
           <a:lstStyle/>
           <a:p>
             <a:r>
-              <a:rPr lang="en-US" sz="1000">
+              <a:rPr lang="en-US" sz="800">
                 <a:solidFill>
                   <a:schemeClr val="tx1">
                     <a:lumMod val="75000"/>
@@ -20093,7 +20093,7 @@
               </a:rPr>
               <a:t>The file identifier, which can be referenced in the API endpoints.</a:t>
             </a:r>
-            <a:endParaRPr lang="de-DE" sz="1000">
+            <a:endParaRPr lang="de-DE" sz="800">
               <a:solidFill>
                 <a:schemeClr val="tx1">
                   <a:lumMod val="75000"/>
@@ -20121,8 +20121,8 @@
         </p:nvSpPr>
         <p:spPr>
           <a:xfrm>
-            <a:off x="251520" y="3320674"/>
-            <a:ext cx="901192" cy="252000"/>
+            <a:off x="251520" y="3400152"/>
+            <a:ext cx="671771" cy="180000"/>
           </a:xfrm>
           <a:prstGeom prst="rect">
             <a:avLst/>
@@ -20151,11 +20151,11 @@
           </a:fontRef>
         </p:style>
         <p:txBody>
-          <a:bodyPr rtlCol="0" anchor="t"/>
+          <a:bodyPr lIns="36000" tIns="18000" rIns="0" bIns="0" rtlCol="0" anchor="t"/>
           <a:lstStyle/>
           <a:p>
             <a:r>
-              <a:rPr lang="en-US" sz="1000">
+              <a:rPr lang="en-US" sz="800">
                 <a:solidFill>
                   <a:schemeClr val="tx1">
                     <a:lumMod val="75000"/>
@@ -20168,7 +20168,7 @@
               </a:rPr>
               <a:t>bytes</a:t>
             </a:r>
-            <a:endParaRPr lang="de-DE" sz="1000">
+            <a:endParaRPr lang="de-DE" sz="800">
               <a:solidFill>
                 <a:schemeClr val="tx1">
                   <a:lumMod val="75000"/>
@@ -20196,8 +20196,8 @@
         </p:nvSpPr>
         <p:spPr>
           <a:xfrm>
-            <a:off x="1183869" y="3320674"/>
-            <a:ext cx="4252227" cy="252000"/>
+            <a:off x="953607" y="3400152"/>
+            <a:ext cx="4482490" cy="180000"/>
           </a:xfrm>
           <a:prstGeom prst="rect">
             <a:avLst/>
@@ -20226,11 +20226,11 @@
           </a:fontRef>
         </p:style>
         <p:txBody>
-          <a:bodyPr rtlCol="0" anchor="t"/>
+          <a:bodyPr lIns="36000" tIns="18000" rIns="0" bIns="0" rtlCol="0" anchor="t"/>
           <a:lstStyle/>
           <a:p>
             <a:r>
-              <a:rPr lang="en-US" sz="1000">
+              <a:rPr lang="en-US" sz="800">
                 <a:solidFill>
                   <a:schemeClr val="tx1">
                     <a:lumMod val="75000"/>
@@ -20243,7 +20243,7 @@
               </a:rPr>
               <a:t>The size of the file, in bytes.</a:t>
             </a:r>
-            <a:endParaRPr lang="de-DE" sz="1000">
+            <a:endParaRPr lang="de-DE" sz="800">
               <a:solidFill>
                 <a:schemeClr val="tx1">
                   <a:lumMod val="75000"/>
@@ -20271,8 +20271,8 @@
         </p:nvSpPr>
         <p:spPr>
           <a:xfrm>
-            <a:off x="251520" y="3613942"/>
-            <a:ext cx="901192" cy="252000"/>
+            <a:off x="251520" y="3610364"/>
+            <a:ext cx="671771" cy="180000"/>
           </a:xfrm>
           <a:prstGeom prst="rect">
             <a:avLst/>
@@ -20301,11 +20301,11 @@
           </a:fontRef>
         </p:style>
         <p:txBody>
-          <a:bodyPr rtlCol="0" anchor="t"/>
+          <a:bodyPr lIns="36000" tIns="18000" rIns="0" bIns="0" rtlCol="0" anchor="t"/>
           <a:lstStyle/>
           <a:p>
             <a:r>
-              <a:rPr lang="en-US" sz="1000">
+              <a:rPr lang="en-US" sz="800">
                 <a:solidFill>
                   <a:schemeClr val="tx1">
                     <a:lumMod val="75000"/>
@@ -20335,8 +20335,8 @@
         </p:nvSpPr>
         <p:spPr>
           <a:xfrm>
-            <a:off x="1183869" y="3613942"/>
-            <a:ext cx="4252227" cy="252000"/>
+            <a:off x="953607" y="3610364"/>
+            <a:ext cx="4482490" cy="180000"/>
           </a:xfrm>
           <a:prstGeom prst="rect">
             <a:avLst/>
@@ -20365,11 +20365,11 @@
           </a:fontRef>
         </p:style>
         <p:txBody>
-          <a:bodyPr rtlCol="0" anchor="t"/>
+          <a:bodyPr lIns="36000" tIns="18000" rIns="0" bIns="0" rtlCol="0" anchor="t"/>
           <a:lstStyle/>
           <a:p>
             <a:r>
-              <a:rPr lang="en-US" sz="1000">
+              <a:rPr lang="en-US" sz="800">
                 <a:solidFill>
                   <a:schemeClr val="tx1">
                     <a:lumMod val="75000"/>
@@ -20382,7 +20382,7 @@
               </a:rPr>
               <a:t>The Unix timestamp (in seconds) for when the file was created.</a:t>
             </a:r>
-            <a:endParaRPr lang="de-DE" sz="1000">
+            <a:endParaRPr lang="de-DE" sz="800">
               <a:solidFill>
                 <a:schemeClr val="tx1">
                   <a:lumMod val="75000"/>
@@ -20396,36 +20396,6 @@
           </a:p>
         </p:txBody>
       </p:sp>
-      <p:pic>
-        <p:nvPicPr>
-          <p:cNvPr id="37" name="Picture 36">
-            <a:extLst>
-              <a:ext uri="{FF2B5EF4-FFF2-40B4-BE49-F238E27FC236}">
-                <a16:creationId xmlns:a16="http://schemas.microsoft.com/office/drawing/2014/main" id="{047150E4-6082-DF7F-1339-922F7EB7B3AF}"/>
-              </a:ext>
-            </a:extLst>
-          </p:cNvPr>
-          <p:cNvPicPr>
-            <a:picLocks noChangeAspect="1"/>
-          </p:cNvPicPr>
-          <p:nvPr/>
-        </p:nvPicPr>
-        <p:blipFill>
-          <a:blip r:embed="rId3"/>
-          <a:stretch>
-            <a:fillRect/>
-          </a:stretch>
-        </p:blipFill>
-        <p:spPr>
-          <a:xfrm>
-            <a:off x="5813188" y="3479003"/>
-            <a:ext cx="3079291" cy="1912012"/>
-          </a:xfrm>
-          <a:prstGeom prst="rect">
-            <a:avLst/>
-          </a:prstGeom>
-        </p:spPr>
-      </p:pic>
       <p:sp>
         <p:nvSpPr>
           <p:cNvPr id="38" name="Rectangle 37">
@@ -20855,8 +20825,8 @@
         </p:nvSpPr>
         <p:spPr>
           <a:xfrm>
-            <a:off x="251520" y="3907210"/>
-            <a:ext cx="901192" cy="252000"/>
+            <a:off x="251520" y="3820576"/>
+            <a:ext cx="671771" cy="180000"/>
           </a:xfrm>
           <a:prstGeom prst="rect">
             <a:avLst/>
@@ -20885,11 +20855,11 @@
           </a:fontRef>
         </p:style>
         <p:txBody>
-          <a:bodyPr rtlCol="0" anchor="t"/>
+          <a:bodyPr lIns="36000" tIns="18000" rIns="0" bIns="0" rtlCol="0" anchor="t"/>
           <a:lstStyle/>
           <a:p>
             <a:r>
-              <a:rPr lang="en-US" sz="1000">
+              <a:rPr lang="en-US" sz="800">
                 <a:solidFill>
                   <a:schemeClr val="tx1">
                     <a:lumMod val="65000"/>
@@ -20900,7 +20870,7 @@
               </a:rPr>
               <a:t>expires_at</a:t>
             </a:r>
-            <a:endParaRPr lang="en-CA" sz="1000">
+            <a:endParaRPr lang="en-CA" sz="800">
               <a:solidFill>
                 <a:schemeClr val="tx1">
                   <a:lumMod val="65000"/>
@@ -20926,8 +20896,8 @@
         </p:nvSpPr>
         <p:spPr>
           <a:xfrm>
-            <a:off x="1183869" y="3907210"/>
-            <a:ext cx="4252227" cy="252000"/>
+            <a:off x="953607" y="3820576"/>
+            <a:ext cx="4482490" cy="180000"/>
           </a:xfrm>
           <a:prstGeom prst="rect">
             <a:avLst/>
@@ -20956,11 +20926,11 @@
           </a:fontRef>
         </p:style>
         <p:txBody>
-          <a:bodyPr rtlCol="0" anchor="t"/>
+          <a:bodyPr lIns="36000" tIns="18000" rIns="0" bIns="0" rtlCol="0" anchor="t"/>
           <a:lstStyle/>
           <a:p>
             <a:r>
-              <a:rPr lang="en-US" sz="1000">
+              <a:rPr lang="en-US" sz="800">
                 <a:solidFill>
                   <a:schemeClr val="tx1">
                     <a:lumMod val="75000"/>
@@ -20973,7 +20943,7 @@
               </a:rPr>
               <a:t>The Unix timestamp (in seconds) for when the file will expire. Only used in vector stores.</a:t>
             </a:r>
-            <a:endParaRPr lang="de-DE" sz="1000">
+            <a:endParaRPr lang="de-DE" sz="800">
               <a:solidFill>
                 <a:schemeClr val="tx1">
                   <a:lumMod val="75000"/>
@@ -21001,8 +20971,8 @@
         </p:nvSpPr>
         <p:spPr>
           <a:xfrm>
-            <a:off x="251520" y="4200478"/>
-            <a:ext cx="901192" cy="252000"/>
+            <a:off x="251520" y="4030788"/>
+            <a:ext cx="671771" cy="180000"/>
           </a:xfrm>
           <a:prstGeom prst="rect">
             <a:avLst/>
@@ -21031,11 +21001,11 @@
           </a:fontRef>
         </p:style>
         <p:txBody>
-          <a:bodyPr rtlCol="0" anchor="t"/>
+          <a:bodyPr lIns="36000" tIns="18000" rIns="0" bIns="0" rtlCol="0" anchor="t"/>
           <a:lstStyle/>
           <a:p>
             <a:r>
-              <a:rPr lang="en-US" sz="1000">
+              <a:rPr lang="en-US" sz="800">
                 <a:solidFill>
                   <a:schemeClr val="tx1">
                     <a:lumMod val="65000"/>
@@ -21046,7 +21016,7 @@
               </a:rPr>
               <a:t>object</a:t>
             </a:r>
-            <a:endParaRPr lang="en-CA" sz="1000">
+            <a:endParaRPr lang="en-CA" sz="800">
               <a:solidFill>
                 <a:schemeClr val="tx1">
                   <a:lumMod val="65000"/>
@@ -21072,8 +21042,8 @@
         </p:nvSpPr>
         <p:spPr>
           <a:xfrm>
-            <a:off x="1183869" y="4200478"/>
-            <a:ext cx="4252227" cy="252000"/>
+            <a:off x="953607" y="4030788"/>
+            <a:ext cx="4482490" cy="180000"/>
           </a:xfrm>
           <a:prstGeom prst="rect">
             <a:avLst/>
@@ -21102,11 +21072,11 @@
           </a:fontRef>
         </p:style>
         <p:txBody>
-          <a:bodyPr rtlCol="0" anchor="t"/>
+          <a:bodyPr lIns="36000" tIns="18000" rIns="0" bIns="0" rtlCol="0" anchor="t"/>
           <a:lstStyle/>
           <a:p>
             <a:r>
-              <a:rPr lang="en-US" sz="1000">
+              <a:rPr lang="en-US" sz="800">
                 <a:solidFill>
                   <a:schemeClr val="tx1">
                     <a:lumMod val="75000"/>
@@ -21120,7 +21090,7 @@
               <a:t>The object type, which is always </a:t>
             </a:r>
             <a:r>
-              <a:rPr lang="en-US" sz="1000" u="sng">
+              <a:rPr lang="en-US" sz="800" u="sng">
                 <a:solidFill>
                   <a:schemeClr val="tx1">
                     <a:lumMod val="75000"/>
@@ -21134,7 +21104,7 @@
               <a:t>file</a:t>
             </a:r>
             <a:r>
-              <a:rPr lang="en-US" sz="1000">
+              <a:rPr lang="en-US" sz="800">
                 <a:solidFill>
                   <a:schemeClr val="tx1">
                     <a:lumMod val="75000"/>
@@ -21147,7 +21117,7 @@
               </a:rPr>
               <a:t>.</a:t>
             </a:r>
-            <a:endParaRPr lang="de-DE" sz="1000">
+            <a:endParaRPr lang="de-DE" sz="800">
               <a:solidFill>
                 <a:schemeClr val="tx1">
                   <a:lumMod val="75000"/>
@@ -21175,8 +21145,8 @@
         </p:nvSpPr>
         <p:spPr>
           <a:xfrm>
-            <a:off x="251520" y="4489695"/>
-            <a:ext cx="901192" cy="424910"/>
+            <a:off x="251520" y="4241000"/>
+            <a:ext cx="671771" cy="306333"/>
           </a:xfrm>
           <a:prstGeom prst="rect">
             <a:avLst/>
@@ -21205,11 +21175,11 @@
           </a:fontRef>
         </p:style>
         <p:txBody>
-          <a:bodyPr rtlCol="0" anchor="t"/>
+          <a:bodyPr lIns="36000" tIns="18000" rIns="0" bIns="0" rtlCol="0" anchor="t"/>
           <a:lstStyle/>
           <a:p>
             <a:r>
-              <a:rPr lang="en-US" sz="1000">
+              <a:rPr lang="en-US" sz="800">
                 <a:solidFill>
                   <a:schemeClr val="tx1">
                     <a:lumMod val="65000"/>
@@ -21220,7 +21190,7 @@
               </a:rPr>
               <a:t>purpose</a:t>
             </a:r>
-            <a:endParaRPr lang="en-CA" sz="1000">
+            <a:endParaRPr lang="en-CA" sz="800">
               <a:solidFill>
                 <a:schemeClr val="tx1">
                   <a:lumMod val="65000"/>
@@ -21246,8 +21216,8 @@
         </p:nvSpPr>
         <p:spPr>
           <a:xfrm>
-            <a:off x="1183869" y="4489695"/>
-            <a:ext cx="4252227" cy="424910"/>
+            <a:off x="953607" y="4241000"/>
+            <a:ext cx="4482490" cy="306333"/>
           </a:xfrm>
           <a:prstGeom prst="rect">
             <a:avLst/>
@@ -21276,229 +21246,29 @@
           </a:fontRef>
         </p:style>
         <p:txBody>
-          <a:bodyPr rtlCol="0" anchor="t"/>
+          <a:bodyPr lIns="36000" tIns="18000" rIns="0" bIns="0" rtlCol="0" anchor="t"/>
           <a:lstStyle/>
           <a:p>
             <a:r>
-              <a:rPr lang="en-US" sz="1000">
+              <a:rPr lang="en-US" sz="800">
                 <a:solidFill>
                   <a:schemeClr val="tx1">
-                    <a:lumMod val="75000"/>
-                    <a:lumOff val="25000"/>
+                    <a:lumMod val="65000"/>
+                    <a:lumOff val="35000"/>
                   </a:schemeClr>
                 </a:solidFill>
                 <a:latin typeface="Arial Narrow" panose="020B0606020202030204" pitchFamily="34" charset="0"/>
-                <a:ea typeface="Open Sans Condensed" panose="020B0806030504020204" pitchFamily="34" charset="0"/>
-                <a:cs typeface="Open Sans Condensed" panose="020B0806030504020204" pitchFamily="34" charset="0"/>
               </a:rPr>
-              <a:t>The intended purpose of the file. Supported values are </a:t>
+              <a:t>The intended purpose of the file. Supported values are assistants, assistants_output, batch, batch_output, fine-tune, fine-tune-results and vision.</a:t>
             </a:r>
-            <a:r>
-              <a:rPr lang="en-US" sz="1000" u="sng">
-                <a:solidFill>
-                  <a:schemeClr val="tx1">
-                    <a:lumMod val="75000"/>
-                    <a:lumOff val="25000"/>
-                  </a:schemeClr>
-                </a:solidFill>
-                <a:latin typeface="Arial Narrow" panose="020B0606020202030204" pitchFamily="34" charset="0"/>
-                <a:ea typeface="Open Sans Condensed" panose="020B0806030504020204" pitchFamily="34" charset="0"/>
-                <a:cs typeface="Open Sans Condensed" panose="020B0806030504020204" pitchFamily="34" charset="0"/>
-              </a:rPr>
-              <a:t>assistants</a:t>
-            </a:r>
-            <a:r>
-              <a:rPr lang="en-US" sz="1000">
-                <a:solidFill>
-                  <a:schemeClr val="tx1">
-                    <a:lumMod val="75000"/>
-                    <a:lumOff val="25000"/>
-                  </a:schemeClr>
-                </a:solidFill>
-                <a:latin typeface="Arial Narrow" panose="020B0606020202030204" pitchFamily="34" charset="0"/>
-                <a:ea typeface="Open Sans Condensed" panose="020B0806030504020204" pitchFamily="34" charset="0"/>
-                <a:cs typeface="Open Sans Condensed" panose="020B0806030504020204" pitchFamily="34" charset="0"/>
-              </a:rPr>
-              <a:t>, </a:t>
-            </a:r>
-            <a:r>
-              <a:rPr lang="en-US" sz="1000" u="sng">
-                <a:solidFill>
-                  <a:schemeClr val="tx1">
-                    <a:lumMod val="75000"/>
-                    <a:lumOff val="25000"/>
-                  </a:schemeClr>
-                </a:solidFill>
-                <a:latin typeface="Arial Narrow" panose="020B0606020202030204" pitchFamily="34" charset="0"/>
-                <a:ea typeface="Open Sans Condensed" panose="020B0806030504020204" pitchFamily="34" charset="0"/>
-                <a:cs typeface="Open Sans Condensed" panose="020B0806030504020204" pitchFamily="34" charset="0"/>
-              </a:rPr>
-              <a:t>assistants_output</a:t>
-            </a:r>
-            <a:r>
-              <a:rPr lang="en-US" sz="1000">
-                <a:solidFill>
-                  <a:schemeClr val="tx1">
-                    <a:lumMod val="75000"/>
-                    <a:lumOff val="25000"/>
-                  </a:schemeClr>
-                </a:solidFill>
-                <a:latin typeface="Arial Narrow" panose="020B0606020202030204" pitchFamily="34" charset="0"/>
-                <a:ea typeface="Open Sans Condensed" panose="020B0806030504020204" pitchFamily="34" charset="0"/>
-                <a:cs typeface="Open Sans Condensed" panose="020B0806030504020204" pitchFamily="34" charset="0"/>
-              </a:rPr>
-              <a:t>, </a:t>
-            </a:r>
-            <a:r>
-              <a:rPr lang="en-US" sz="1000" u="sng">
-                <a:solidFill>
-                  <a:schemeClr val="tx1">
-                    <a:lumMod val="75000"/>
-                    <a:lumOff val="25000"/>
-                  </a:schemeClr>
-                </a:solidFill>
-                <a:latin typeface="Arial Narrow" panose="020B0606020202030204" pitchFamily="34" charset="0"/>
-                <a:ea typeface="Open Sans Condensed" panose="020B0806030504020204" pitchFamily="34" charset="0"/>
-                <a:cs typeface="Open Sans Condensed" panose="020B0806030504020204" pitchFamily="34" charset="0"/>
-              </a:rPr>
-              <a:t>batch</a:t>
-            </a:r>
-            <a:r>
-              <a:rPr lang="en-US" sz="1000">
-                <a:solidFill>
-                  <a:schemeClr val="tx1">
-                    <a:lumMod val="75000"/>
-                    <a:lumOff val="25000"/>
-                  </a:schemeClr>
-                </a:solidFill>
-                <a:latin typeface="Arial Narrow" panose="020B0606020202030204" pitchFamily="34" charset="0"/>
-                <a:ea typeface="Open Sans Condensed" panose="020B0806030504020204" pitchFamily="34" charset="0"/>
-                <a:cs typeface="Open Sans Condensed" panose="020B0806030504020204" pitchFamily="34" charset="0"/>
-              </a:rPr>
-              <a:t>, </a:t>
-            </a:r>
-            <a:r>
-              <a:rPr lang="en-US" sz="1000" u="sng">
-                <a:solidFill>
-                  <a:schemeClr val="tx1">
-                    <a:lumMod val="75000"/>
-                    <a:lumOff val="25000"/>
-                  </a:schemeClr>
-                </a:solidFill>
-                <a:latin typeface="Arial Narrow" panose="020B0606020202030204" pitchFamily="34" charset="0"/>
-                <a:ea typeface="Open Sans Condensed" panose="020B0806030504020204" pitchFamily="34" charset="0"/>
-                <a:cs typeface="Open Sans Condensed" panose="020B0806030504020204" pitchFamily="34" charset="0"/>
-              </a:rPr>
-              <a:t>batch_output</a:t>
-            </a:r>
-            <a:r>
-              <a:rPr lang="en-US" sz="1000">
-                <a:solidFill>
-                  <a:schemeClr val="tx1">
-                    <a:lumMod val="75000"/>
-                    <a:lumOff val="25000"/>
-                  </a:schemeClr>
-                </a:solidFill>
-                <a:latin typeface="Arial Narrow" panose="020B0606020202030204" pitchFamily="34" charset="0"/>
-                <a:ea typeface="Open Sans Condensed" panose="020B0806030504020204" pitchFamily="34" charset="0"/>
-                <a:cs typeface="Open Sans Condensed" panose="020B0806030504020204" pitchFamily="34" charset="0"/>
-              </a:rPr>
-              <a:t>, </a:t>
-            </a:r>
-            <a:r>
-              <a:rPr lang="en-US" sz="1000" u="sng">
-                <a:solidFill>
-                  <a:schemeClr val="tx1">
-                    <a:lumMod val="75000"/>
-                    <a:lumOff val="25000"/>
-                  </a:schemeClr>
-                </a:solidFill>
-                <a:latin typeface="Arial Narrow" panose="020B0606020202030204" pitchFamily="34" charset="0"/>
-                <a:ea typeface="Open Sans Condensed" panose="020B0806030504020204" pitchFamily="34" charset="0"/>
-                <a:cs typeface="Open Sans Condensed" panose="020B0806030504020204" pitchFamily="34" charset="0"/>
-              </a:rPr>
-              <a:t>fine-tune</a:t>
-            </a:r>
-            <a:r>
-              <a:rPr lang="en-US" sz="1000">
-                <a:solidFill>
-                  <a:schemeClr val="tx1">
-                    <a:lumMod val="75000"/>
-                    <a:lumOff val="25000"/>
-                  </a:schemeClr>
-                </a:solidFill>
-                <a:latin typeface="Arial Narrow" panose="020B0606020202030204" pitchFamily="34" charset="0"/>
-                <a:ea typeface="Open Sans Condensed" panose="020B0806030504020204" pitchFamily="34" charset="0"/>
-                <a:cs typeface="Open Sans Condensed" panose="020B0806030504020204" pitchFamily="34" charset="0"/>
-              </a:rPr>
-              <a:t>, </a:t>
-            </a:r>
-            <a:r>
-              <a:rPr lang="en-US" sz="1000" u="sng">
-                <a:solidFill>
-                  <a:schemeClr val="tx1">
-                    <a:lumMod val="75000"/>
-                    <a:lumOff val="25000"/>
-                  </a:schemeClr>
-                </a:solidFill>
-                <a:latin typeface="Arial Narrow" panose="020B0606020202030204" pitchFamily="34" charset="0"/>
-                <a:ea typeface="Open Sans Condensed" panose="020B0806030504020204" pitchFamily="34" charset="0"/>
-                <a:cs typeface="Open Sans Condensed" panose="020B0806030504020204" pitchFamily="34" charset="0"/>
-              </a:rPr>
-              <a:t>fine-tune-results</a:t>
-            </a:r>
-            <a:r>
-              <a:rPr lang="en-US" sz="1000">
-                <a:solidFill>
-                  <a:schemeClr val="tx1">
-                    <a:lumMod val="75000"/>
-                    <a:lumOff val="25000"/>
-                  </a:schemeClr>
-                </a:solidFill>
-                <a:latin typeface="Arial Narrow" panose="020B0606020202030204" pitchFamily="34" charset="0"/>
-                <a:ea typeface="Open Sans Condensed" panose="020B0806030504020204" pitchFamily="34" charset="0"/>
-                <a:cs typeface="Open Sans Condensed" panose="020B0806030504020204" pitchFamily="34" charset="0"/>
-              </a:rPr>
-              <a:t> and </a:t>
-            </a:r>
-            <a:r>
-              <a:rPr lang="en-US" sz="1000" u="sng">
-                <a:solidFill>
-                  <a:schemeClr val="tx1">
-                    <a:lumMod val="75000"/>
-                    <a:lumOff val="25000"/>
-                  </a:schemeClr>
-                </a:solidFill>
-                <a:latin typeface="Arial Narrow" panose="020B0606020202030204" pitchFamily="34" charset="0"/>
-                <a:ea typeface="Open Sans Condensed" panose="020B0806030504020204" pitchFamily="34" charset="0"/>
-                <a:cs typeface="Open Sans Condensed" panose="020B0806030504020204" pitchFamily="34" charset="0"/>
-              </a:rPr>
-              <a:t>vision</a:t>
-            </a:r>
-            <a:r>
-              <a:rPr lang="en-US" sz="1000">
-                <a:solidFill>
-                  <a:schemeClr val="tx1">
-                    <a:lumMod val="75000"/>
-                    <a:lumOff val="25000"/>
-                  </a:schemeClr>
-                </a:solidFill>
-                <a:latin typeface="Arial Narrow" panose="020B0606020202030204" pitchFamily="34" charset="0"/>
-                <a:ea typeface="Open Sans Condensed" panose="020B0806030504020204" pitchFamily="34" charset="0"/>
-                <a:cs typeface="Open Sans Condensed" panose="020B0806030504020204" pitchFamily="34" charset="0"/>
-              </a:rPr>
-              <a:t>.</a:t>
-            </a:r>
-            <a:endParaRPr lang="de-DE" sz="1000">
+            <a:endParaRPr lang="de-DE" sz="800">
               <a:solidFill>
                 <a:schemeClr val="tx1">
-                  <a:lumMod val="75000"/>
-                  <a:lumOff val="25000"/>
+                  <a:lumMod val="65000"/>
+                  <a:lumOff val="35000"/>
                 </a:schemeClr>
               </a:solidFill>
               <a:latin typeface="Arial Narrow" panose="020B0606020202030204" pitchFamily="34" charset="0"/>
-              <a:ea typeface="Open Sans Condensed" panose="020B0806030504020204" pitchFamily="34" charset="0"/>
-              <a:cs typeface="Open Sans Condensed" panose="020B0806030504020204" pitchFamily="34" charset="0"/>
             </a:endParaRPr>
           </a:p>
         </p:txBody>
@@ -21517,8 +21287,8 @@
         </p:nvSpPr>
         <p:spPr>
           <a:xfrm>
-            <a:off x="251520" y="4947197"/>
-            <a:ext cx="901192" cy="424910"/>
+            <a:off x="251520" y="4577545"/>
+            <a:ext cx="671771" cy="180000"/>
           </a:xfrm>
           <a:prstGeom prst="rect">
             <a:avLst/>
@@ -21547,11 +21317,11 @@
           </a:fontRef>
         </p:style>
         <p:txBody>
-          <a:bodyPr rtlCol="0" anchor="t"/>
+          <a:bodyPr lIns="36000" tIns="18000" rIns="0" bIns="0" rtlCol="0" anchor="t"/>
           <a:lstStyle/>
           <a:p>
             <a:r>
-              <a:rPr lang="en-US" sz="1000">
+              <a:rPr lang="en-US" sz="800">
                 <a:solidFill>
                   <a:schemeClr val="tx1">
                     <a:lumMod val="65000"/>
@@ -21562,7 +21332,7 @@
               </a:rPr>
               <a:t>status</a:t>
             </a:r>
-            <a:endParaRPr lang="en-CA" sz="1000">
+            <a:endParaRPr lang="en-CA" sz="800">
               <a:solidFill>
                 <a:schemeClr val="tx1">
                   <a:lumMod val="65000"/>
@@ -21588,8 +21358,8 @@
         </p:nvSpPr>
         <p:spPr>
           <a:xfrm>
-            <a:off x="1183869" y="4947197"/>
-            <a:ext cx="4252227" cy="424910"/>
+            <a:off x="953607" y="4577545"/>
+            <a:ext cx="4482490" cy="180000"/>
           </a:xfrm>
           <a:prstGeom prst="rect">
             <a:avLst/>
@@ -21618,117 +21388,29 @@
           </a:fontRef>
         </p:style>
         <p:txBody>
-          <a:bodyPr rtlCol="0" anchor="t"/>
+          <a:bodyPr lIns="36000" tIns="18000" rIns="0" bIns="0" rtlCol="0" anchor="t"/>
           <a:lstStyle/>
           <a:p>
             <a:r>
-              <a:rPr lang="en-US" sz="1000">
+              <a:rPr lang="en-US" sz="800">
                 <a:solidFill>
                   <a:schemeClr val="tx1">
-                    <a:lumMod val="75000"/>
-                    <a:lumOff val="25000"/>
+                    <a:lumMod val="65000"/>
+                    <a:lumOff val="35000"/>
                   </a:schemeClr>
                 </a:solidFill>
                 <a:latin typeface="Arial Narrow" panose="020B0606020202030204" pitchFamily="34" charset="0"/>
-                <a:ea typeface="Open Sans Condensed" panose="020B0806030504020204" pitchFamily="34" charset="0"/>
-                <a:cs typeface="Open Sans Condensed" panose="020B0806030504020204" pitchFamily="34" charset="0"/>
               </a:rPr>
-              <a:t>Deprecated. The current status of the file, which can be either </a:t>
+              <a:t>Deprecated. The current status of the file, which can be either uploaded, processed, or error.</a:t>
             </a:r>
-            <a:r>
-              <a:rPr lang="en-US" sz="1000" u="sng">
-                <a:solidFill>
-                  <a:schemeClr val="tx1">
-                    <a:lumMod val="75000"/>
-                    <a:lumOff val="25000"/>
-                  </a:schemeClr>
-                </a:solidFill>
-                <a:latin typeface="Arial Narrow" panose="020B0606020202030204" pitchFamily="34" charset="0"/>
-                <a:ea typeface="Open Sans Condensed" panose="020B0806030504020204" pitchFamily="34" charset="0"/>
-                <a:cs typeface="Open Sans Condensed" panose="020B0806030504020204" pitchFamily="34" charset="0"/>
-              </a:rPr>
-              <a:t>uploaded</a:t>
-            </a:r>
-            <a:r>
-              <a:rPr lang="en-US" sz="1000">
-                <a:solidFill>
-                  <a:schemeClr val="tx1">
-                    <a:lumMod val="75000"/>
-                    <a:lumOff val="25000"/>
-                  </a:schemeClr>
-                </a:solidFill>
-                <a:latin typeface="Arial Narrow" panose="020B0606020202030204" pitchFamily="34" charset="0"/>
-                <a:ea typeface="Open Sans Condensed" panose="020B0806030504020204" pitchFamily="34" charset="0"/>
-                <a:cs typeface="Open Sans Condensed" panose="020B0806030504020204" pitchFamily="34" charset="0"/>
-              </a:rPr>
-              <a:t>, </a:t>
-            </a:r>
-            <a:r>
-              <a:rPr lang="en-US" sz="1000" u="sng">
-                <a:solidFill>
-                  <a:schemeClr val="tx1">
-                    <a:lumMod val="75000"/>
-                    <a:lumOff val="25000"/>
-                  </a:schemeClr>
-                </a:solidFill>
-                <a:latin typeface="Arial Narrow" panose="020B0606020202030204" pitchFamily="34" charset="0"/>
-                <a:ea typeface="Open Sans Condensed" panose="020B0806030504020204" pitchFamily="34" charset="0"/>
-                <a:cs typeface="Open Sans Condensed" panose="020B0806030504020204" pitchFamily="34" charset="0"/>
-              </a:rPr>
-              <a:t>processed</a:t>
-            </a:r>
-            <a:r>
-              <a:rPr lang="en-US" sz="1000">
-                <a:solidFill>
-                  <a:schemeClr val="tx1">
-                    <a:lumMod val="75000"/>
-                    <a:lumOff val="25000"/>
-                  </a:schemeClr>
-                </a:solidFill>
-                <a:latin typeface="Arial Narrow" panose="020B0606020202030204" pitchFamily="34" charset="0"/>
-                <a:ea typeface="Open Sans Condensed" panose="020B0806030504020204" pitchFamily="34" charset="0"/>
-                <a:cs typeface="Open Sans Condensed" panose="020B0806030504020204" pitchFamily="34" charset="0"/>
-              </a:rPr>
-              <a:t>, or </a:t>
-            </a:r>
-            <a:r>
-              <a:rPr lang="en-US" sz="1000" u="sng">
-                <a:solidFill>
-                  <a:schemeClr val="tx1">
-                    <a:lumMod val="75000"/>
-                    <a:lumOff val="25000"/>
-                  </a:schemeClr>
-                </a:solidFill>
-                <a:latin typeface="Arial Narrow" panose="020B0606020202030204" pitchFamily="34" charset="0"/>
-                <a:ea typeface="Open Sans Condensed" panose="020B0806030504020204" pitchFamily="34" charset="0"/>
-                <a:cs typeface="Open Sans Condensed" panose="020B0806030504020204" pitchFamily="34" charset="0"/>
-              </a:rPr>
-              <a:t>error</a:t>
-            </a:r>
-            <a:r>
-              <a:rPr lang="en-US" sz="1000">
-                <a:solidFill>
-                  <a:schemeClr val="tx1">
-                    <a:lumMod val="75000"/>
-                    <a:lumOff val="25000"/>
-                  </a:schemeClr>
-                </a:solidFill>
-                <a:latin typeface="Arial Narrow" panose="020B0606020202030204" pitchFamily="34" charset="0"/>
-                <a:ea typeface="Open Sans Condensed" panose="020B0806030504020204" pitchFamily="34" charset="0"/>
-                <a:cs typeface="Open Sans Condensed" panose="020B0806030504020204" pitchFamily="34" charset="0"/>
-              </a:rPr>
-              <a:t>.</a:t>
-            </a:r>
-            <a:endParaRPr lang="de-DE" sz="1000">
+            <a:endParaRPr lang="de-DE" sz="800">
               <a:solidFill>
                 <a:schemeClr val="tx1">
-                  <a:lumMod val="75000"/>
-                  <a:lumOff val="25000"/>
+                  <a:lumMod val="65000"/>
+                  <a:lumOff val="35000"/>
                 </a:schemeClr>
               </a:solidFill>
               <a:latin typeface="Arial Narrow" panose="020B0606020202030204" pitchFamily="34" charset="0"/>
-              <a:ea typeface="Open Sans Condensed" panose="020B0806030504020204" pitchFamily="34" charset="0"/>
-              <a:cs typeface="Open Sans Condensed" panose="020B0806030504020204" pitchFamily="34" charset="0"/>
             </a:endParaRPr>
           </a:p>
         </p:txBody>
@@ -21768,7 +21450,7 @@
                   <a:srgbClr val="005AB4"/>
                 </a:solidFill>
                 <a:latin typeface="Arial Narrow" panose="020B0606020202030204" pitchFamily="34" charset="0"/>
-                <a:hlinkClick r:id="rId4"/>
+                <a:hlinkClick r:id="rId3"/>
               </a:rPr>
               <a:t>https://platform.openai.com/docs/api-reference/files</a:t>
             </a:r>
@@ -21975,6 +21657,280 @@
                 <a:srgbClr val="005AB4"/>
               </a:solidFill>
               <a:latin typeface="Arial Narrow" panose="020B0606020202030204" pitchFamily="34" charset="0"/>
+            </a:endParaRPr>
+          </a:p>
+        </p:txBody>
+      </p:sp>
+      <p:sp>
+        <p:nvSpPr>
+          <p:cNvPr id="2" name="Rectangle 1">
+            <a:extLst>
+              <a:ext uri="{FF2B5EF4-FFF2-40B4-BE49-F238E27FC236}">
+                <a16:creationId xmlns:a16="http://schemas.microsoft.com/office/drawing/2014/main" id="{F85246A7-722E-7808-C0A0-54888A25A597}"/>
+              </a:ext>
+            </a:extLst>
+          </p:cNvPr>
+          <p:cNvSpPr/>
+          <p:nvPr/>
+        </p:nvSpPr>
+        <p:spPr>
+          <a:xfrm>
+            <a:off x="251520" y="2972550"/>
+            <a:ext cx="671771" cy="180000"/>
+          </a:xfrm>
+          <a:prstGeom prst="rect">
+            <a:avLst/>
+          </a:prstGeom>
+          <a:solidFill>
+            <a:srgbClr val="EBEEEF"/>
+          </a:solidFill>
+          <a:ln>
+            <a:noFill/>
+          </a:ln>
+        </p:spPr>
+        <p:style>
+          <a:lnRef idx="2">
+            <a:schemeClr val="accent1">
+              <a:shade val="50000"/>
+            </a:schemeClr>
+          </a:lnRef>
+          <a:fillRef idx="1">
+            <a:schemeClr val="accent1"/>
+          </a:fillRef>
+          <a:effectRef idx="0">
+            <a:schemeClr val="accent1"/>
+          </a:effectRef>
+          <a:fontRef idx="minor">
+            <a:schemeClr val="lt1"/>
+          </a:fontRef>
+        </p:style>
+        <p:txBody>
+          <a:bodyPr lIns="36000" tIns="18000" rIns="0" bIns="0" rtlCol="0" anchor="t"/>
+          <a:lstStyle/>
+          <a:p>
+            <a:r>
+              <a:rPr lang="en-US" sz="800">
+                <a:solidFill>
+                  <a:schemeClr val="tx1">
+                    <a:lumMod val="75000"/>
+                    <a:lumOff val="25000"/>
+                  </a:schemeClr>
+                </a:solidFill>
+                <a:latin typeface="Arial Narrow" panose="020B0606020202030204" pitchFamily="34" charset="0"/>
+                <a:ea typeface="Open Sans Condensed" panose="020B0806030504020204" pitchFamily="34" charset="0"/>
+                <a:cs typeface="Open Sans Condensed" panose="020B0806030504020204" pitchFamily="34" charset="0"/>
+              </a:rPr>
+              <a:t>filename</a:t>
+            </a:r>
+            <a:endParaRPr lang="de-DE" sz="800">
+              <a:solidFill>
+                <a:schemeClr val="tx1">
+                  <a:lumMod val="75000"/>
+                  <a:lumOff val="25000"/>
+                </a:schemeClr>
+              </a:solidFill>
+              <a:latin typeface="Arial Narrow" panose="020B0606020202030204" pitchFamily="34" charset="0"/>
+              <a:ea typeface="Open Sans Condensed" panose="020B0806030504020204" pitchFamily="34" charset="0"/>
+              <a:cs typeface="Open Sans Condensed" panose="020B0806030504020204" pitchFamily="34" charset="0"/>
+            </a:endParaRPr>
+          </a:p>
+        </p:txBody>
+      </p:sp>
+      <p:sp>
+        <p:nvSpPr>
+          <p:cNvPr id="3" name="Rectangle 2">
+            <a:extLst>
+              <a:ext uri="{FF2B5EF4-FFF2-40B4-BE49-F238E27FC236}">
+                <a16:creationId xmlns:a16="http://schemas.microsoft.com/office/drawing/2014/main" id="{F6F524CC-2141-B6CF-6F0E-064633E58578}"/>
+              </a:ext>
+            </a:extLst>
+          </p:cNvPr>
+          <p:cNvSpPr/>
+          <p:nvPr/>
+        </p:nvSpPr>
+        <p:spPr>
+          <a:xfrm>
+            <a:off x="953607" y="2972550"/>
+            <a:ext cx="4482490" cy="180000"/>
+          </a:xfrm>
+          <a:prstGeom prst="rect">
+            <a:avLst/>
+          </a:prstGeom>
+          <a:solidFill>
+            <a:srgbClr val="EBEEEF"/>
+          </a:solidFill>
+          <a:ln>
+            <a:noFill/>
+          </a:ln>
+        </p:spPr>
+        <p:style>
+          <a:lnRef idx="2">
+            <a:schemeClr val="accent1">
+              <a:shade val="50000"/>
+            </a:schemeClr>
+          </a:lnRef>
+          <a:fillRef idx="1">
+            <a:schemeClr val="accent1"/>
+          </a:fillRef>
+          <a:effectRef idx="0">
+            <a:schemeClr val="accent1"/>
+          </a:effectRef>
+          <a:fontRef idx="minor">
+            <a:schemeClr val="lt1"/>
+          </a:fontRef>
+        </p:style>
+        <p:txBody>
+          <a:bodyPr lIns="36000" tIns="18000" rIns="0" bIns="0" rtlCol="0" anchor="t"/>
+          <a:lstStyle/>
+          <a:p>
+            <a:r>
+              <a:rPr lang="en-US" sz="800">
+                <a:solidFill>
+                  <a:schemeClr val="tx1">
+                    <a:lumMod val="75000"/>
+                    <a:lumOff val="25000"/>
+                  </a:schemeClr>
+                </a:solidFill>
+                <a:latin typeface="Arial Narrow" panose="020B0606020202030204" pitchFamily="34" charset="0"/>
+                <a:ea typeface="Open Sans Condensed" panose="020B0806030504020204" pitchFamily="34" charset="0"/>
+                <a:cs typeface="Open Sans Condensed" panose="020B0806030504020204" pitchFamily="34" charset="0"/>
+              </a:rPr>
+              <a:t>The name of the file</a:t>
+            </a:r>
+            <a:endParaRPr lang="de-DE" sz="800">
+              <a:solidFill>
+                <a:schemeClr val="tx1">
+                  <a:lumMod val="75000"/>
+                  <a:lumOff val="25000"/>
+                </a:schemeClr>
+              </a:solidFill>
+              <a:latin typeface="Arial Narrow" panose="020B0606020202030204" pitchFamily="34" charset="0"/>
+              <a:ea typeface="Open Sans Condensed" panose="020B0806030504020204" pitchFamily="34" charset="0"/>
+              <a:cs typeface="Open Sans Condensed" panose="020B0806030504020204" pitchFamily="34" charset="0"/>
+            </a:endParaRPr>
+          </a:p>
+        </p:txBody>
+      </p:sp>
+      <p:sp>
+        <p:nvSpPr>
+          <p:cNvPr id="107" name="Rectangle 106">
+            <a:extLst>
+              <a:ext uri="{FF2B5EF4-FFF2-40B4-BE49-F238E27FC236}">
+                <a16:creationId xmlns:a16="http://schemas.microsoft.com/office/drawing/2014/main" id="{AA45D8FE-5612-39E0-3E72-C70D774EB7F6}"/>
+              </a:ext>
+            </a:extLst>
+          </p:cNvPr>
+          <p:cNvSpPr/>
+          <p:nvPr/>
+        </p:nvSpPr>
+        <p:spPr>
+          <a:xfrm>
+            <a:off x="5793712" y="1514522"/>
+            <a:ext cx="2825763" cy="1080120"/>
+          </a:xfrm>
+          <a:prstGeom prst="rect">
+            <a:avLst/>
+          </a:prstGeom>
+          <a:solidFill>
+            <a:srgbClr val="A3B1B7">
+              <a:alpha val="9804"/>
+            </a:srgbClr>
+          </a:solidFill>
+          <a:ln w="12700">
+            <a:solidFill>
+              <a:srgbClr val="6D828B"/>
+            </a:solidFill>
+          </a:ln>
+        </p:spPr>
+        <p:style>
+          <a:lnRef idx="2">
+            <a:schemeClr val="accent1">
+              <a:shade val="50000"/>
+            </a:schemeClr>
+          </a:lnRef>
+          <a:fillRef idx="1">
+            <a:schemeClr val="accent1"/>
+          </a:fillRef>
+          <a:effectRef idx="0">
+            <a:schemeClr val="accent1"/>
+          </a:effectRef>
+          <a:fontRef idx="minor">
+            <a:schemeClr val="lt1"/>
+          </a:fontRef>
+        </p:style>
+        <p:txBody>
+          <a:bodyPr lIns="144000" rtlCol="0" anchor="t" anchorCtr="0"/>
+          <a:lstStyle/>
+          <a:p>
+            <a:r>
+              <a:rPr lang="de-DE" sz="1050">
+                <a:solidFill>
+                  <a:srgbClr val="455157"/>
+                </a:solidFill>
+                <a:latin typeface="Arial Narrow" panose="020B0606020202030204" pitchFamily="34" charset="0"/>
+                <a:ea typeface="Open Sans Condensed" panose="020B0806030504020204" pitchFamily="34" charset="0"/>
+                <a:cs typeface="Open Sans Condensed" panose="020B0806030504020204" pitchFamily="34" charset="0"/>
+              </a:rPr>
+              <a:t>Pricing:</a:t>
+            </a:r>
+          </a:p>
+          <a:p>
+            <a:pPr marL="171450" indent="-171450">
+              <a:buFont typeface="Wingdings" panose="05000000000000000000" pitchFamily="2" charset="2"/>
+              <a:buChar char="§"/>
+            </a:pPr>
+            <a:r>
+              <a:rPr lang="de-DE" sz="1050">
+                <a:solidFill>
+                  <a:srgbClr val="455157"/>
+                </a:solidFill>
+                <a:latin typeface="Arial Narrow" panose="020B0606020202030204" pitchFamily="34" charset="0"/>
+                <a:ea typeface="Open Sans Condensed" panose="020B0806030504020204" pitchFamily="34" charset="0"/>
+                <a:cs typeface="Open Sans Condensed" panose="020B0806030504020204" pitchFamily="34" charset="0"/>
+              </a:rPr>
+              <a:t>free up to 1GB total storage</a:t>
+            </a:r>
+          </a:p>
+          <a:p>
+            <a:pPr marL="171450" indent="-171450">
+              <a:buFont typeface="Wingdings" panose="05000000000000000000" pitchFamily="2" charset="2"/>
+              <a:buChar char="§"/>
+            </a:pPr>
+            <a:r>
+              <a:rPr lang="de-DE" sz="1050">
+                <a:solidFill>
+                  <a:srgbClr val="455157"/>
+                </a:solidFill>
+                <a:latin typeface="Arial Narrow" panose="020B0606020202030204" pitchFamily="34" charset="0"/>
+                <a:ea typeface="Open Sans Condensed" panose="020B0806030504020204" pitchFamily="34" charset="0"/>
+                <a:cs typeface="Open Sans Condensed" panose="020B0806030504020204" pitchFamily="34" charset="0"/>
+              </a:rPr>
+              <a:t>every additional 1 GB = $0.1 / day = $3 / month</a:t>
+            </a:r>
+          </a:p>
+          <a:p>
+            <a:pPr marL="171450" indent="-171450">
+              <a:buFont typeface="Wingdings" panose="05000000000000000000" pitchFamily="2" charset="2"/>
+              <a:buChar char="§"/>
+            </a:pPr>
+            <a:r>
+              <a:rPr lang="de-DE" sz="1050">
+                <a:solidFill>
+                  <a:srgbClr val="455157"/>
+                </a:solidFill>
+                <a:latin typeface="Arial Narrow" panose="020B0606020202030204" pitchFamily="34" charset="0"/>
+                <a:ea typeface="Open Sans Condensed" panose="020B0806030504020204" pitchFamily="34" charset="0"/>
+                <a:cs typeface="Open Sans Condensed" panose="020B0806030504020204" pitchFamily="34" charset="0"/>
+              </a:rPr>
+              <a:t>$2.5 per 1000 file_search tool calls</a:t>
+            </a:r>
+            <a:endParaRPr lang="de-DE" sz="1050" dirty="0">
+              <a:solidFill>
+                <a:srgbClr val="455157"/>
+              </a:solidFill>
+              <a:latin typeface="Arial Narrow" panose="020B0606020202030204" pitchFamily="34" charset="0"/>
+              <a:ea typeface="Open Sans Condensed" panose="020B0806030504020204" pitchFamily="34" charset="0"/>
+              <a:cs typeface="Open Sans Condensed" panose="020B0806030504020204" pitchFamily="34" charset="0"/>
             </a:endParaRPr>
           </a:p>
         </p:txBody>
@@ -22471,8 +22427,8 @@
         </p:nvSpPr>
         <p:spPr>
           <a:xfrm>
-            <a:off x="228660" y="1514522"/>
-            <a:ext cx="4559364" cy="1080120"/>
+            <a:off x="251518" y="1514522"/>
+            <a:ext cx="5976666" cy="1080120"/>
           </a:xfrm>
           <a:prstGeom prst="rect">
             <a:avLst/>
@@ -22533,7 +22489,7 @@
         </p:nvSpPr>
         <p:spPr>
           <a:xfrm>
-            <a:off x="228660" y="1337913"/>
+            <a:off x="251518" y="1337913"/>
             <a:ext cx="708036" cy="172064"/>
           </a:xfrm>
           <a:prstGeom prst="rect">
@@ -23599,7 +23555,7 @@
         </p:blipFill>
         <p:spPr>
           <a:xfrm>
-            <a:off x="5105892" y="1509977"/>
+            <a:off x="5340789" y="2748366"/>
             <a:ext cx="3559839" cy="2287341"/>
           </a:xfrm>
           <a:prstGeom prst="rect">
@@ -23975,6 +23931,2041 @@
                 <a:cs typeface="Open Sans Condensed Light" panose="020B0306030504020204" pitchFamily="34" charset="0"/>
               </a:rPr>
               <a:t>expired</a:t>
+            </a:r>
+            <a:endParaRPr lang="de-DE" sz="800" dirty="0">
+              <a:solidFill>
+                <a:srgbClr val="1064AF"/>
+              </a:solidFill>
+              <a:latin typeface="Arial Narrow" panose="020B0606020202030204" pitchFamily="34" charset="0"/>
+              <a:ea typeface="Open Sans Condensed Light" panose="020B0306030504020204" pitchFamily="34" charset="0"/>
+              <a:cs typeface="Open Sans Condensed Light" panose="020B0306030504020204" pitchFamily="34" charset="0"/>
+            </a:endParaRPr>
+          </a:p>
+        </p:txBody>
+      </p:sp>
+      <p:sp>
+        <p:nvSpPr>
+          <p:cNvPr id="59" name="Rectangle 58">
+            <a:extLst>
+              <a:ext uri="{FF2B5EF4-FFF2-40B4-BE49-F238E27FC236}">
+                <a16:creationId xmlns:a16="http://schemas.microsoft.com/office/drawing/2014/main" id="{1A0D0AA0-3434-D465-8A15-0D5B0ABBA3A5}"/>
+              </a:ext>
+            </a:extLst>
+          </p:cNvPr>
+          <p:cNvSpPr/>
+          <p:nvPr/>
+        </p:nvSpPr>
+        <p:spPr>
+          <a:xfrm>
+            <a:off x="254764" y="2748366"/>
+            <a:ext cx="671771" cy="180000"/>
+          </a:xfrm>
+          <a:prstGeom prst="rect">
+            <a:avLst/>
+          </a:prstGeom>
+          <a:solidFill>
+            <a:srgbClr val="DBCDA5"/>
+          </a:solidFill>
+          <a:ln>
+            <a:noFill/>
+          </a:ln>
+        </p:spPr>
+        <p:style>
+          <a:lnRef idx="2">
+            <a:schemeClr val="accent1">
+              <a:shade val="50000"/>
+            </a:schemeClr>
+          </a:lnRef>
+          <a:fillRef idx="1">
+            <a:schemeClr val="accent1"/>
+          </a:fillRef>
+          <a:effectRef idx="0">
+            <a:schemeClr val="accent1"/>
+          </a:effectRef>
+          <a:fontRef idx="minor">
+            <a:schemeClr val="lt1"/>
+          </a:fontRef>
+        </p:style>
+        <p:txBody>
+          <a:bodyPr lIns="36000" tIns="18000" rIns="0" bIns="0" rtlCol="0" anchor="t"/>
+          <a:lstStyle/>
+          <a:p>
+            <a:r>
+              <a:rPr lang="en-US" sz="800" b="1">
+                <a:solidFill>
+                  <a:schemeClr val="tx1">
+                    <a:lumMod val="75000"/>
+                    <a:lumOff val="25000"/>
+                  </a:schemeClr>
+                </a:solidFill>
+                <a:latin typeface="Arial Narrow" panose="020B0606020202030204" pitchFamily="34" charset="0"/>
+                <a:ea typeface="Open Sans Condensed" panose="020B0806030504020204" pitchFamily="34" charset="0"/>
+                <a:cs typeface="Open Sans Condensed" panose="020B0806030504020204" pitchFamily="34" charset="0"/>
+              </a:rPr>
+              <a:t>Attribute</a:t>
+            </a:r>
+            <a:endParaRPr lang="de-DE" sz="800" b="1">
+              <a:solidFill>
+                <a:schemeClr val="tx1">
+                  <a:lumMod val="75000"/>
+                  <a:lumOff val="25000"/>
+                </a:schemeClr>
+              </a:solidFill>
+              <a:latin typeface="Arial Narrow" panose="020B0606020202030204" pitchFamily="34" charset="0"/>
+              <a:ea typeface="Open Sans Condensed" panose="020B0806030504020204" pitchFamily="34" charset="0"/>
+              <a:cs typeface="Open Sans Condensed" panose="020B0806030504020204" pitchFamily="34" charset="0"/>
+            </a:endParaRPr>
+          </a:p>
+        </p:txBody>
+      </p:sp>
+      <p:sp>
+        <p:nvSpPr>
+          <p:cNvPr id="60" name="Rectangle 59">
+            <a:extLst>
+              <a:ext uri="{FF2B5EF4-FFF2-40B4-BE49-F238E27FC236}">
+                <a16:creationId xmlns:a16="http://schemas.microsoft.com/office/drawing/2014/main" id="{A6069FD8-6F49-AC58-FD53-9983CB5DC91B}"/>
+              </a:ext>
+            </a:extLst>
+          </p:cNvPr>
+          <p:cNvSpPr/>
+          <p:nvPr/>
+        </p:nvSpPr>
+        <p:spPr>
+          <a:xfrm>
+            <a:off x="254764" y="3180757"/>
+            <a:ext cx="671771" cy="180000"/>
+          </a:xfrm>
+          <a:prstGeom prst="rect">
+            <a:avLst/>
+          </a:prstGeom>
+          <a:solidFill>
+            <a:srgbClr val="EBEEEF"/>
+          </a:solidFill>
+          <a:ln>
+            <a:noFill/>
+          </a:ln>
+        </p:spPr>
+        <p:style>
+          <a:lnRef idx="2">
+            <a:schemeClr val="accent1">
+              <a:shade val="50000"/>
+            </a:schemeClr>
+          </a:lnRef>
+          <a:fillRef idx="1">
+            <a:schemeClr val="accent1"/>
+          </a:fillRef>
+          <a:effectRef idx="0">
+            <a:schemeClr val="accent1"/>
+          </a:effectRef>
+          <a:fontRef idx="minor">
+            <a:schemeClr val="lt1"/>
+          </a:fontRef>
+        </p:style>
+        <p:txBody>
+          <a:bodyPr lIns="36000" tIns="18000" rIns="0" bIns="0" rtlCol="0" anchor="t"/>
+          <a:lstStyle/>
+          <a:p>
+            <a:r>
+              <a:rPr lang="en-US" sz="800">
+                <a:solidFill>
+                  <a:schemeClr val="tx1">
+                    <a:lumMod val="75000"/>
+                    <a:lumOff val="25000"/>
+                  </a:schemeClr>
+                </a:solidFill>
+                <a:latin typeface="Arial Narrow" panose="020B0606020202030204" pitchFamily="34" charset="0"/>
+                <a:ea typeface="Open Sans Condensed" panose="020B0806030504020204" pitchFamily="34" charset="0"/>
+                <a:cs typeface="Open Sans Condensed" panose="020B0806030504020204" pitchFamily="34" charset="0"/>
+              </a:rPr>
+              <a:t>id</a:t>
+            </a:r>
+            <a:endParaRPr lang="de-DE" sz="800">
+              <a:solidFill>
+                <a:schemeClr val="tx1">
+                  <a:lumMod val="75000"/>
+                  <a:lumOff val="25000"/>
+                </a:schemeClr>
+              </a:solidFill>
+              <a:latin typeface="Arial Narrow" panose="020B0606020202030204" pitchFamily="34" charset="0"/>
+              <a:ea typeface="Open Sans Condensed" panose="020B0806030504020204" pitchFamily="34" charset="0"/>
+              <a:cs typeface="Open Sans Condensed" panose="020B0806030504020204" pitchFamily="34" charset="0"/>
+            </a:endParaRPr>
+          </a:p>
+        </p:txBody>
+      </p:sp>
+      <p:sp>
+        <p:nvSpPr>
+          <p:cNvPr id="61" name="Rectangle 60">
+            <a:extLst>
+              <a:ext uri="{FF2B5EF4-FFF2-40B4-BE49-F238E27FC236}">
+                <a16:creationId xmlns:a16="http://schemas.microsoft.com/office/drawing/2014/main" id="{74CA0256-51F3-3D9E-2178-49B100949E30}"/>
+              </a:ext>
+            </a:extLst>
+          </p:cNvPr>
+          <p:cNvSpPr/>
+          <p:nvPr/>
+        </p:nvSpPr>
+        <p:spPr>
+          <a:xfrm>
+            <a:off x="959554" y="2752060"/>
+            <a:ext cx="4263222" cy="180000"/>
+          </a:xfrm>
+          <a:prstGeom prst="rect">
+            <a:avLst/>
+          </a:prstGeom>
+          <a:solidFill>
+            <a:srgbClr val="DBCDA5"/>
+          </a:solidFill>
+          <a:ln>
+            <a:noFill/>
+          </a:ln>
+        </p:spPr>
+        <p:style>
+          <a:lnRef idx="2">
+            <a:schemeClr val="accent1">
+              <a:shade val="50000"/>
+            </a:schemeClr>
+          </a:lnRef>
+          <a:fillRef idx="1">
+            <a:schemeClr val="accent1"/>
+          </a:fillRef>
+          <a:effectRef idx="0">
+            <a:schemeClr val="accent1"/>
+          </a:effectRef>
+          <a:fontRef idx="minor">
+            <a:schemeClr val="lt1"/>
+          </a:fontRef>
+        </p:style>
+        <p:txBody>
+          <a:bodyPr lIns="36000" tIns="18000" rIns="0" bIns="0" rtlCol="0" anchor="t"/>
+          <a:lstStyle/>
+          <a:p>
+            <a:r>
+              <a:rPr lang="en-US" sz="800" b="1">
+                <a:solidFill>
+                  <a:schemeClr val="tx1">
+                    <a:lumMod val="75000"/>
+                    <a:lumOff val="25000"/>
+                  </a:schemeClr>
+                </a:solidFill>
+                <a:latin typeface="Arial Narrow" panose="020B0606020202030204" pitchFamily="34" charset="0"/>
+                <a:ea typeface="Open Sans Condensed" panose="020B0806030504020204" pitchFamily="34" charset="0"/>
+                <a:cs typeface="Open Sans Condensed" panose="020B0806030504020204" pitchFamily="34" charset="0"/>
+              </a:rPr>
+              <a:t>Decription</a:t>
+            </a:r>
+            <a:endParaRPr lang="de-DE" sz="800" b="1">
+              <a:solidFill>
+                <a:schemeClr val="tx1">
+                  <a:lumMod val="75000"/>
+                  <a:lumOff val="25000"/>
+                </a:schemeClr>
+              </a:solidFill>
+              <a:latin typeface="Arial Narrow" panose="020B0606020202030204" pitchFamily="34" charset="0"/>
+              <a:ea typeface="Open Sans Condensed" panose="020B0806030504020204" pitchFamily="34" charset="0"/>
+              <a:cs typeface="Open Sans Condensed" panose="020B0806030504020204" pitchFamily="34" charset="0"/>
+            </a:endParaRPr>
+          </a:p>
+        </p:txBody>
+      </p:sp>
+      <p:sp>
+        <p:nvSpPr>
+          <p:cNvPr id="62" name="Rectangle 61">
+            <a:extLst>
+              <a:ext uri="{FF2B5EF4-FFF2-40B4-BE49-F238E27FC236}">
+                <a16:creationId xmlns:a16="http://schemas.microsoft.com/office/drawing/2014/main" id="{BB006F82-B2A1-FD07-22F9-EF659E4C62A3}"/>
+              </a:ext>
+            </a:extLst>
+          </p:cNvPr>
+          <p:cNvSpPr/>
+          <p:nvPr/>
+        </p:nvSpPr>
+        <p:spPr>
+          <a:xfrm>
+            <a:off x="956850" y="3180757"/>
+            <a:ext cx="4263222" cy="180000"/>
+          </a:xfrm>
+          <a:prstGeom prst="rect">
+            <a:avLst/>
+          </a:prstGeom>
+          <a:solidFill>
+            <a:srgbClr val="EBEEEF"/>
+          </a:solidFill>
+          <a:ln>
+            <a:noFill/>
+          </a:ln>
+        </p:spPr>
+        <p:style>
+          <a:lnRef idx="2">
+            <a:schemeClr val="accent1">
+              <a:shade val="50000"/>
+            </a:schemeClr>
+          </a:lnRef>
+          <a:fillRef idx="1">
+            <a:schemeClr val="accent1"/>
+          </a:fillRef>
+          <a:effectRef idx="0">
+            <a:schemeClr val="accent1"/>
+          </a:effectRef>
+          <a:fontRef idx="minor">
+            <a:schemeClr val="lt1"/>
+          </a:fontRef>
+        </p:style>
+        <p:txBody>
+          <a:bodyPr lIns="36000" tIns="18000" rIns="36000" bIns="0" rtlCol="0" anchor="t"/>
+          <a:lstStyle/>
+          <a:p>
+            <a:r>
+              <a:rPr lang="en-US" sz="800">
+                <a:solidFill>
+                  <a:schemeClr val="tx1">
+                    <a:lumMod val="75000"/>
+                    <a:lumOff val="25000"/>
+                  </a:schemeClr>
+                </a:solidFill>
+                <a:latin typeface="Arial Narrow" panose="020B0606020202030204" pitchFamily="34" charset="0"/>
+                <a:ea typeface="Open Sans Condensed" panose="020B0806030504020204" pitchFamily="34" charset="0"/>
+                <a:cs typeface="Open Sans Condensed" panose="020B0806030504020204" pitchFamily="34" charset="0"/>
+              </a:rPr>
+              <a:t>The identifier, which can be referenced in API endpoints.</a:t>
+            </a:r>
+            <a:endParaRPr lang="de-DE" sz="800">
+              <a:solidFill>
+                <a:schemeClr val="tx1">
+                  <a:lumMod val="75000"/>
+                  <a:lumOff val="25000"/>
+                </a:schemeClr>
+              </a:solidFill>
+              <a:latin typeface="Arial Narrow" panose="020B0606020202030204" pitchFamily="34" charset="0"/>
+              <a:ea typeface="Open Sans Condensed" panose="020B0806030504020204" pitchFamily="34" charset="0"/>
+              <a:cs typeface="Open Sans Condensed" panose="020B0806030504020204" pitchFamily="34" charset="0"/>
+            </a:endParaRPr>
+          </a:p>
+        </p:txBody>
+      </p:sp>
+      <p:sp>
+        <p:nvSpPr>
+          <p:cNvPr id="63" name="Rectangle 62">
+            <a:extLst>
+              <a:ext uri="{FF2B5EF4-FFF2-40B4-BE49-F238E27FC236}">
+                <a16:creationId xmlns:a16="http://schemas.microsoft.com/office/drawing/2014/main" id="{9DDBD57C-F82B-F82B-0AA7-55BC8C433FD7}"/>
+              </a:ext>
+            </a:extLst>
+          </p:cNvPr>
+          <p:cNvSpPr/>
+          <p:nvPr/>
+        </p:nvSpPr>
+        <p:spPr>
+          <a:xfrm>
+            <a:off x="254764" y="3396301"/>
+            <a:ext cx="671771" cy="432708"/>
+          </a:xfrm>
+          <a:prstGeom prst="rect">
+            <a:avLst/>
+          </a:prstGeom>
+          <a:solidFill>
+            <a:srgbClr val="EBEEEF"/>
+          </a:solidFill>
+          <a:ln>
+            <a:noFill/>
+          </a:ln>
+        </p:spPr>
+        <p:style>
+          <a:lnRef idx="2">
+            <a:schemeClr val="accent1">
+              <a:shade val="50000"/>
+            </a:schemeClr>
+          </a:lnRef>
+          <a:fillRef idx="1">
+            <a:schemeClr val="accent1"/>
+          </a:fillRef>
+          <a:effectRef idx="0">
+            <a:schemeClr val="accent1"/>
+          </a:effectRef>
+          <a:fontRef idx="minor">
+            <a:schemeClr val="lt1"/>
+          </a:fontRef>
+        </p:style>
+        <p:txBody>
+          <a:bodyPr lIns="36000" tIns="18000" rIns="0" bIns="0" rtlCol="0" anchor="t"/>
+          <a:lstStyle/>
+          <a:p>
+            <a:r>
+              <a:rPr lang="en-US" sz="800">
+                <a:solidFill>
+                  <a:schemeClr val="tx1">
+                    <a:lumMod val="75000"/>
+                    <a:lumOff val="25000"/>
+                  </a:schemeClr>
+                </a:solidFill>
+                <a:latin typeface="Arial Narrow" panose="020B0606020202030204" pitchFamily="34" charset="0"/>
+                <a:ea typeface="Open Sans Condensed" panose="020B0806030504020204" pitchFamily="34" charset="0"/>
+                <a:cs typeface="Open Sans Condensed" panose="020B0806030504020204" pitchFamily="34" charset="0"/>
+              </a:rPr>
+              <a:t>created_at /</a:t>
+            </a:r>
+            <a:br>
+              <a:rPr lang="en-US" sz="800">
+                <a:solidFill>
+                  <a:schemeClr val="tx1">
+                    <a:lumMod val="75000"/>
+                    <a:lumOff val="25000"/>
+                  </a:schemeClr>
+                </a:solidFill>
+                <a:latin typeface="Arial Narrow" panose="020B0606020202030204" pitchFamily="34" charset="0"/>
+                <a:ea typeface="Open Sans Condensed" panose="020B0806030504020204" pitchFamily="34" charset="0"/>
+                <a:cs typeface="Open Sans Condensed" panose="020B0806030504020204" pitchFamily="34" charset="0"/>
+              </a:rPr>
+            </a:br>
+            <a:r>
+              <a:rPr lang="en-US" sz="800">
+                <a:solidFill>
+                  <a:schemeClr val="tx1">
+                    <a:lumMod val="65000"/>
+                    <a:lumOff val="35000"/>
+                  </a:schemeClr>
+                </a:solidFill>
+                <a:latin typeface="Arial Narrow" panose="020B0606020202030204" pitchFamily="34" charset="0"/>
+              </a:rPr>
+              <a:t>expires_at</a:t>
+            </a:r>
+            <a:r>
+              <a:rPr lang="en-US" sz="800">
+                <a:solidFill>
+                  <a:schemeClr val="tx1">
+                    <a:lumMod val="75000"/>
+                    <a:lumOff val="25000"/>
+                  </a:schemeClr>
+                </a:solidFill>
+                <a:latin typeface="Arial Narrow" panose="020B0606020202030204" pitchFamily="34" charset="0"/>
+                <a:ea typeface="Open Sans Condensed" panose="020B0806030504020204" pitchFamily="34" charset="0"/>
+                <a:cs typeface="Open Sans Condensed" panose="020B0806030504020204" pitchFamily="34" charset="0"/>
+              </a:rPr>
+              <a:t> /</a:t>
+            </a:r>
+          </a:p>
+          <a:p>
+            <a:r>
+              <a:rPr lang="en-US" sz="800">
+                <a:solidFill>
+                  <a:schemeClr val="tx1">
+                    <a:lumMod val="65000"/>
+                    <a:lumOff val="35000"/>
+                  </a:schemeClr>
+                </a:solidFill>
+                <a:latin typeface="Arial Narrow" panose="020B0606020202030204" pitchFamily="34" charset="0"/>
+              </a:rPr>
+              <a:t>last_active_at</a:t>
+            </a:r>
+            <a:endParaRPr lang="en-CA" sz="800">
+              <a:solidFill>
+                <a:schemeClr val="tx1">
+                  <a:lumMod val="65000"/>
+                  <a:lumOff val="35000"/>
+                </a:schemeClr>
+              </a:solidFill>
+              <a:latin typeface="Arial Narrow" panose="020B0606020202030204" pitchFamily="34" charset="0"/>
+            </a:endParaRPr>
+          </a:p>
+        </p:txBody>
+      </p:sp>
+      <p:sp>
+        <p:nvSpPr>
+          <p:cNvPr id="64" name="Rectangle 63">
+            <a:extLst>
+              <a:ext uri="{FF2B5EF4-FFF2-40B4-BE49-F238E27FC236}">
+                <a16:creationId xmlns:a16="http://schemas.microsoft.com/office/drawing/2014/main" id="{A2FFEC83-7655-46EA-6F8C-4DAD979034C7}"/>
+              </a:ext>
+            </a:extLst>
+          </p:cNvPr>
+          <p:cNvSpPr/>
+          <p:nvPr/>
+        </p:nvSpPr>
+        <p:spPr>
+          <a:xfrm>
+            <a:off x="956850" y="3396301"/>
+            <a:ext cx="4263222" cy="432708"/>
+          </a:xfrm>
+          <a:prstGeom prst="rect">
+            <a:avLst/>
+          </a:prstGeom>
+          <a:solidFill>
+            <a:srgbClr val="EBEEEF"/>
+          </a:solidFill>
+          <a:ln>
+            <a:noFill/>
+          </a:ln>
+        </p:spPr>
+        <p:style>
+          <a:lnRef idx="2">
+            <a:schemeClr val="accent1">
+              <a:shade val="50000"/>
+            </a:schemeClr>
+          </a:lnRef>
+          <a:fillRef idx="1">
+            <a:schemeClr val="accent1"/>
+          </a:fillRef>
+          <a:effectRef idx="0">
+            <a:schemeClr val="accent1"/>
+          </a:effectRef>
+          <a:fontRef idx="minor">
+            <a:schemeClr val="lt1"/>
+          </a:fontRef>
+        </p:style>
+        <p:txBody>
+          <a:bodyPr lIns="36000" tIns="18000" rIns="36000" bIns="0" rtlCol="0" anchor="t"/>
+          <a:lstStyle/>
+          <a:p>
+            <a:r>
+              <a:rPr lang="en-US" sz="800">
+                <a:solidFill>
+                  <a:schemeClr val="tx1">
+                    <a:lumMod val="75000"/>
+                    <a:lumOff val="25000"/>
+                  </a:schemeClr>
+                </a:solidFill>
+                <a:latin typeface="Arial Narrow" panose="020B0606020202030204" pitchFamily="34" charset="0"/>
+                <a:ea typeface="Open Sans Condensed" panose="020B0806030504020204" pitchFamily="34" charset="0"/>
+                <a:cs typeface="Open Sans Condensed" panose="020B0806030504020204" pitchFamily="34" charset="0"/>
+              </a:rPr>
+              <a:t>The Unix timestamp (in seconds) for when the vector store was created / will expire / was last active.</a:t>
+            </a:r>
+            <a:endParaRPr lang="de-DE" sz="800">
+              <a:solidFill>
+                <a:schemeClr val="tx1">
+                  <a:lumMod val="75000"/>
+                  <a:lumOff val="25000"/>
+                </a:schemeClr>
+              </a:solidFill>
+              <a:latin typeface="Arial Narrow" panose="020B0606020202030204" pitchFamily="34" charset="0"/>
+              <a:ea typeface="Open Sans Condensed" panose="020B0806030504020204" pitchFamily="34" charset="0"/>
+              <a:cs typeface="Open Sans Condensed" panose="020B0806030504020204" pitchFamily="34" charset="0"/>
+            </a:endParaRPr>
+          </a:p>
+        </p:txBody>
+      </p:sp>
+      <p:sp>
+        <p:nvSpPr>
+          <p:cNvPr id="67" name="Rectangle 66">
+            <a:extLst>
+              <a:ext uri="{FF2B5EF4-FFF2-40B4-BE49-F238E27FC236}">
+                <a16:creationId xmlns:a16="http://schemas.microsoft.com/office/drawing/2014/main" id="{50EC3F56-4DCE-5835-8ABE-EC3E206567F6}"/>
+              </a:ext>
+            </a:extLst>
+          </p:cNvPr>
+          <p:cNvSpPr/>
+          <p:nvPr/>
+        </p:nvSpPr>
+        <p:spPr>
+          <a:xfrm>
+            <a:off x="254764" y="3868059"/>
+            <a:ext cx="671771" cy="288000"/>
+          </a:xfrm>
+          <a:prstGeom prst="rect">
+            <a:avLst/>
+          </a:prstGeom>
+          <a:solidFill>
+            <a:srgbClr val="EBEEEF"/>
+          </a:solidFill>
+          <a:ln>
+            <a:noFill/>
+          </a:ln>
+        </p:spPr>
+        <p:style>
+          <a:lnRef idx="2">
+            <a:schemeClr val="accent1">
+              <a:shade val="50000"/>
+            </a:schemeClr>
+          </a:lnRef>
+          <a:fillRef idx="1">
+            <a:schemeClr val="accent1"/>
+          </a:fillRef>
+          <a:effectRef idx="0">
+            <a:schemeClr val="accent1"/>
+          </a:effectRef>
+          <a:fontRef idx="minor">
+            <a:schemeClr val="lt1"/>
+          </a:fontRef>
+        </p:style>
+        <p:txBody>
+          <a:bodyPr lIns="36000" tIns="18000" rIns="0" bIns="0" rtlCol="0" anchor="t"/>
+          <a:lstStyle/>
+          <a:p>
+            <a:r>
+              <a:rPr lang="en-US" sz="800">
+                <a:solidFill>
+                  <a:schemeClr val="tx1">
+                    <a:lumMod val="65000"/>
+                    <a:lumOff val="35000"/>
+                  </a:schemeClr>
+                </a:solidFill>
+                <a:latin typeface="Arial Narrow" panose="020B0606020202030204" pitchFamily="34" charset="0"/>
+              </a:rPr>
+              <a:t>status</a:t>
+            </a:r>
+            <a:endParaRPr lang="en-CA" sz="800">
+              <a:solidFill>
+                <a:schemeClr val="tx1">
+                  <a:lumMod val="65000"/>
+                  <a:lumOff val="35000"/>
+                </a:schemeClr>
+              </a:solidFill>
+              <a:latin typeface="Arial Narrow" panose="020B0606020202030204" pitchFamily="34" charset="0"/>
+            </a:endParaRPr>
+          </a:p>
+        </p:txBody>
+      </p:sp>
+      <p:sp>
+        <p:nvSpPr>
+          <p:cNvPr id="68" name="Rectangle 67">
+            <a:extLst>
+              <a:ext uri="{FF2B5EF4-FFF2-40B4-BE49-F238E27FC236}">
+                <a16:creationId xmlns:a16="http://schemas.microsoft.com/office/drawing/2014/main" id="{DBBA2A1C-707B-9138-806F-C8AC4DE1A865}"/>
+              </a:ext>
+            </a:extLst>
+          </p:cNvPr>
+          <p:cNvSpPr/>
+          <p:nvPr/>
+        </p:nvSpPr>
+        <p:spPr>
+          <a:xfrm>
+            <a:off x="956850" y="3868059"/>
+            <a:ext cx="4263222" cy="288000"/>
+          </a:xfrm>
+          <a:prstGeom prst="rect">
+            <a:avLst/>
+          </a:prstGeom>
+          <a:solidFill>
+            <a:srgbClr val="EBEEEF"/>
+          </a:solidFill>
+          <a:ln>
+            <a:noFill/>
+          </a:ln>
+        </p:spPr>
+        <p:style>
+          <a:lnRef idx="2">
+            <a:schemeClr val="accent1">
+              <a:shade val="50000"/>
+            </a:schemeClr>
+          </a:lnRef>
+          <a:fillRef idx="1">
+            <a:schemeClr val="accent1"/>
+          </a:fillRef>
+          <a:effectRef idx="0">
+            <a:schemeClr val="accent1"/>
+          </a:effectRef>
+          <a:fontRef idx="minor">
+            <a:schemeClr val="lt1"/>
+          </a:fontRef>
+        </p:style>
+        <p:txBody>
+          <a:bodyPr lIns="36000" tIns="18000" rIns="36000" bIns="0" rtlCol="0" anchor="t"/>
+          <a:lstStyle/>
+          <a:p>
+            <a:r>
+              <a:rPr lang="en-US" sz="800">
+                <a:solidFill>
+                  <a:schemeClr val="tx1">
+                    <a:lumMod val="75000"/>
+                    <a:lumOff val="25000"/>
+                  </a:schemeClr>
+                </a:solidFill>
+                <a:latin typeface="Arial Narrow" panose="020B0606020202030204" pitchFamily="34" charset="0"/>
+                <a:ea typeface="Open Sans Condensed" panose="020B0806030504020204" pitchFamily="34" charset="0"/>
+                <a:cs typeface="Open Sans Condensed" panose="020B0806030504020204" pitchFamily="34" charset="0"/>
+              </a:rPr>
+              <a:t>The status of the vector store, which can be either </a:t>
+            </a:r>
+            <a:r>
+              <a:rPr lang="en-US" sz="800" u="sng">
+                <a:solidFill>
+                  <a:schemeClr val="tx1">
+                    <a:lumMod val="75000"/>
+                    <a:lumOff val="25000"/>
+                  </a:schemeClr>
+                </a:solidFill>
+                <a:latin typeface="Arial Narrow" panose="020B0606020202030204" pitchFamily="34" charset="0"/>
+                <a:ea typeface="Open Sans Condensed" panose="020B0806030504020204" pitchFamily="34" charset="0"/>
+                <a:cs typeface="Open Sans Condensed" panose="020B0806030504020204" pitchFamily="34" charset="0"/>
+              </a:rPr>
+              <a:t>expired</a:t>
+            </a:r>
+            <a:r>
+              <a:rPr lang="en-US" sz="800">
+                <a:solidFill>
+                  <a:schemeClr val="tx1">
+                    <a:lumMod val="75000"/>
+                    <a:lumOff val="25000"/>
+                  </a:schemeClr>
+                </a:solidFill>
+                <a:latin typeface="Arial Narrow" panose="020B0606020202030204" pitchFamily="34" charset="0"/>
+                <a:ea typeface="Open Sans Condensed" panose="020B0806030504020204" pitchFamily="34" charset="0"/>
+                <a:cs typeface="Open Sans Condensed" panose="020B0806030504020204" pitchFamily="34" charset="0"/>
+              </a:rPr>
+              <a:t>, </a:t>
+            </a:r>
+            <a:r>
+              <a:rPr lang="en-US" sz="800" u="sng">
+                <a:solidFill>
+                  <a:schemeClr val="tx1">
+                    <a:lumMod val="75000"/>
+                    <a:lumOff val="25000"/>
+                  </a:schemeClr>
+                </a:solidFill>
+                <a:latin typeface="Arial Narrow" panose="020B0606020202030204" pitchFamily="34" charset="0"/>
+                <a:ea typeface="Open Sans Condensed" panose="020B0806030504020204" pitchFamily="34" charset="0"/>
+                <a:cs typeface="Open Sans Condensed" panose="020B0806030504020204" pitchFamily="34" charset="0"/>
+              </a:rPr>
+              <a:t>in_progress</a:t>
+            </a:r>
+            <a:r>
+              <a:rPr lang="en-US" sz="800">
+                <a:solidFill>
+                  <a:schemeClr val="tx1">
+                    <a:lumMod val="75000"/>
+                    <a:lumOff val="25000"/>
+                  </a:schemeClr>
+                </a:solidFill>
+                <a:latin typeface="Arial Narrow" panose="020B0606020202030204" pitchFamily="34" charset="0"/>
+                <a:ea typeface="Open Sans Condensed" panose="020B0806030504020204" pitchFamily="34" charset="0"/>
+                <a:cs typeface="Open Sans Condensed" panose="020B0806030504020204" pitchFamily="34" charset="0"/>
+              </a:rPr>
+              <a:t>, or </a:t>
+            </a:r>
+            <a:r>
+              <a:rPr lang="en-US" sz="800" u="sng">
+                <a:solidFill>
+                  <a:schemeClr val="tx1">
+                    <a:lumMod val="75000"/>
+                    <a:lumOff val="25000"/>
+                  </a:schemeClr>
+                </a:solidFill>
+                <a:latin typeface="Arial Narrow" panose="020B0606020202030204" pitchFamily="34" charset="0"/>
+                <a:ea typeface="Open Sans Condensed" panose="020B0806030504020204" pitchFamily="34" charset="0"/>
+                <a:cs typeface="Open Sans Condensed" panose="020B0806030504020204" pitchFamily="34" charset="0"/>
+              </a:rPr>
+              <a:t>completed</a:t>
+            </a:r>
+            <a:r>
+              <a:rPr lang="en-US" sz="800">
+                <a:solidFill>
+                  <a:schemeClr val="tx1">
+                    <a:lumMod val="75000"/>
+                    <a:lumOff val="25000"/>
+                  </a:schemeClr>
+                </a:solidFill>
+                <a:latin typeface="Arial Narrow" panose="020B0606020202030204" pitchFamily="34" charset="0"/>
+                <a:ea typeface="Open Sans Condensed" panose="020B0806030504020204" pitchFamily="34" charset="0"/>
+                <a:cs typeface="Open Sans Condensed" panose="020B0806030504020204" pitchFamily="34" charset="0"/>
+              </a:rPr>
+              <a:t>. A status of completed indicates that the vector store is ready for use.</a:t>
+            </a:r>
+            <a:endParaRPr lang="de-DE" sz="800">
+              <a:solidFill>
+                <a:schemeClr val="tx1">
+                  <a:lumMod val="75000"/>
+                  <a:lumOff val="25000"/>
+                </a:schemeClr>
+              </a:solidFill>
+              <a:latin typeface="Arial Narrow" panose="020B0606020202030204" pitchFamily="34" charset="0"/>
+              <a:ea typeface="Open Sans Condensed" panose="020B0806030504020204" pitchFamily="34" charset="0"/>
+              <a:cs typeface="Open Sans Condensed" panose="020B0806030504020204" pitchFamily="34" charset="0"/>
+            </a:endParaRPr>
+          </a:p>
+        </p:txBody>
+      </p:sp>
+      <p:sp>
+        <p:nvSpPr>
+          <p:cNvPr id="75" name="Rectangle 74">
+            <a:extLst>
+              <a:ext uri="{FF2B5EF4-FFF2-40B4-BE49-F238E27FC236}">
+                <a16:creationId xmlns:a16="http://schemas.microsoft.com/office/drawing/2014/main" id="{D1B13F48-6B86-3FFC-B323-CB2777E2BDC6}"/>
+              </a:ext>
+            </a:extLst>
+          </p:cNvPr>
+          <p:cNvSpPr/>
+          <p:nvPr/>
+        </p:nvSpPr>
+        <p:spPr>
+          <a:xfrm>
+            <a:off x="254764" y="2968856"/>
+            <a:ext cx="671771" cy="180000"/>
+          </a:xfrm>
+          <a:prstGeom prst="rect">
+            <a:avLst/>
+          </a:prstGeom>
+          <a:solidFill>
+            <a:srgbClr val="EBEEEF"/>
+          </a:solidFill>
+          <a:ln>
+            <a:noFill/>
+          </a:ln>
+        </p:spPr>
+        <p:style>
+          <a:lnRef idx="2">
+            <a:schemeClr val="accent1">
+              <a:shade val="50000"/>
+            </a:schemeClr>
+          </a:lnRef>
+          <a:fillRef idx="1">
+            <a:schemeClr val="accent1"/>
+          </a:fillRef>
+          <a:effectRef idx="0">
+            <a:schemeClr val="accent1"/>
+          </a:effectRef>
+          <a:fontRef idx="minor">
+            <a:schemeClr val="lt1"/>
+          </a:fontRef>
+        </p:style>
+        <p:txBody>
+          <a:bodyPr lIns="36000" tIns="18000" rIns="0" bIns="0" rtlCol="0" anchor="t"/>
+          <a:lstStyle/>
+          <a:p>
+            <a:r>
+              <a:rPr lang="en-US" sz="800">
+                <a:solidFill>
+                  <a:schemeClr val="tx1">
+                    <a:lumMod val="75000"/>
+                    <a:lumOff val="25000"/>
+                  </a:schemeClr>
+                </a:solidFill>
+                <a:latin typeface="Arial Narrow" panose="020B0606020202030204" pitchFamily="34" charset="0"/>
+                <a:ea typeface="Open Sans Condensed" panose="020B0806030504020204" pitchFamily="34" charset="0"/>
+                <a:cs typeface="Open Sans Condensed" panose="020B0806030504020204" pitchFamily="34" charset="0"/>
+              </a:rPr>
+              <a:t>name</a:t>
+            </a:r>
+            <a:endParaRPr lang="de-DE" sz="800">
+              <a:solidFill>
+                <a:schemeClr val="tx1">
+                  <a:lumMod val="75000"/>
+                  <a:lumOff val="25000"/>
+                </a:schemeClr>
+              </a:solidFill>
+              <a:latin typeface="Arial Narrow" panose="020B0606020202030204" pitchFamily="34" charset="0"/>
+              <a:ea typeface="Open Sans Condensed" panose="020B0806030504020204" pitchFamily="34" charset="0"/>
+              <a:cs typeface="Open Sans Condensed" panose="020B0806030504020204" pitchFamily="34" charset="0"/>
+            </a:endParaRPr>
+          </a:p>
+        </p:txBody>
+      </p:sp>
+      <p:sp>
+        <p:nvSpPr>
+          <p:cNvPr id="76" name="Rectangle 75">
+            <a:extLst>
+              <a:ext uri="{FF2B5EF4-FFF2-40B4-BE49-F238E27FC236}">
+                <a16:creationId xmlns:a16="http://schemas.microsoft.com/office/drawing/2014/main" id="{8496805F-795E-92C5-71BB-08ADEA9CBF87}"/>
+              </a:ext>
+            </a:extLst>
+          </p:cNvPr>
+          <p:cNvSpPr/>
+          <p:nvPr/>
+        </p:nvSpPr>
+        <p:spPr>
+          <a:xfrm>
+            <a:off x="956850" y="2968856"/>
+            <a:ext cx="4263222" cy="180000"/>
+          </a:xfrm>
+          <a:prstGeom prst="rect">
+            <a:avLst/>
+          </a:prstGeom>
+          <a:solidFill>
+            <a:srgbClr val="EBEEEF"/>
+          </a:solidFill>
+          <a:ln>
+            <a:noFill/>
+          </a:ln>
+        </p:spPr>
+        <p:style>
+          <a:lnRef idx="2">
+            <a:schemeClr val="accent1">
+              <a:shade val="50000"/>
+            </a:schemeClr>
+          </a:lnRef>
+          <a:fillRef idx="1">
+            <a:schemeClr val="accent1"/>
+          </a:fillRef>
+          <a:effectRef idx="0">
+            <a:schemeClr val="accent1"/>
+          </a:effectRef>
+          <a:fontRef idx="minor">
+            <a:schemeClr val="lt1"/>
+          </a:fontRef>
+        </p:style>
+        <p:txBody>
+          <a:bodyPr lIns="36000" tIns="18000" rIns="36000" bIns="0" rtlCol="0" anchor="t"/>
+          <a:lstStyle/>
+          <a:p>
+            <a:r>
+              <a:rPr lang="en-US" sz="800">
+                <a:solidFill>
+                  <a:schemeClr val="tx1">
+                    <a:lumMod val="75000"/>
+                    <a:lumOff val="25000"/>
+                  </a:schemeClr>
+                </a:solidFill>
+                <a:latin typeface="Arial Narrow" panose="020B0606020202030204" pitchFamily="34" charset="0"/>
+                <a:ea typeface="Open Sans Condensed" panose="020B0806030504020204" pitchFamily="34" charset="0"/>
+                <a:cs typeface="Open Sans Condensed" panose="020B0806030504020204" pitchFamily="34" charset="0"/>
+              </a:rPr>
+              <a:t>The name of the vector store.</a:t>
+            </a:r>
+            <a:endParaRPr lang="de-DE" sz="800">
+              <a:solidFill>
+                <a:schemeClr val="tx1">
+                  <a:lumMod val="75000"/>
+                  <a:lumOff val="25000"/>
+                </a:schemeClr>
+              </a:solidFill>
+              <a:latin typeface="Arial Narrow" panose="020B0606020202030204" pitchFamily="34" charset="0"/>
+              <a:ea typeface="Open Sans Condensed" panose="020B0806030504020204" pitchFamily="34" charset="0"/>
+              <a:cs typeface="Open Sans Condensed" panose="020B0806030504020204" pitchFamily="34" charset="0"/>
+            </a:endParaRPr>
+          </a:p>
+        </p:txBody>
+      </p:sp>
+      <p:sp>
+        <p:nvSpPr>
+          <p:cNvPr id="77" name="Rectangle 76">
+            <a:extLst>
+              <a:ext uri="{FF2B5EF4-FFF2-40B4-BE49-F238E27FC236}">
+                <a16:creationId xmlns:a16="http://schemas.microsoft.com/office/drawing/2014/main" id="{FFB46E22-61F9-914D-AFDF-36918D466A0C}"/>
+              </a:ext>
+            </a:extLst>
+          </p:cNvPr>
+          <p:cNvSpPr/>
+          <p:nvPr/>
+        </p:nvSpPr>
+        <p:spPr>
+          <a:xfrm>
+            <a:off x="254764" y="4191603"/>
+            <a:ext cx="671771" cy="433737"/>
+          </a:xfrm>
+          <a:prstGeom prst="rect">
+            <a:avLst/>
+          </a:prstGeom>
+          <a:solidFill>
+            <a:srgbClr val="EBEEEF"/>
+          </a:solidFill>
+          <a:ln>
+            <a:noFill/>
+          </a:ln>
+        </p:spPr>
+        <p:style>
+          <a:lnRef idx="2">
+            <a:schemeClr val="accent1">
+              <a:shade val="50000"/>
+            </a:schemeClr>
+          </a:lnRef>
+          <a:fillRef idx="1">
+            <a:schemeClr val="accent1"/>
+          </a:fillRef>
+          <a:effectRef idx="0">
+            <a:schemeClr val="accent1"/>
+          </a:effectRef>
+          <a:fontRef idx="minor">
+            <a:schemeClr val="lt1"/>
+          </a:fontRef>
+        </p:style>
+        <p:txBody>
+          <a:bodyPr lIns="36000" tIns="18000" rIns="0" bIns="0" rtlCol="0" anchor="t"/>
+          <a:lstStyle/>
+          <a:p>
+            <a:r>
+              <a:rPr lang="en-US" sz="800">
+                <a:solidFill>
+                  <a:schemeClr val="tx1">
+                    <a:lumMod val="65000"/>
+                    <a:lumOff val="35000"/>
+                  </a:schemeClr>
+                </a:solidFill>
+                <a:latin typeface="Arial Narrow" panose="020B0606020202030204" pitchFamily="34" charset="0"/>
+              </a:rPr>
+              <a:t>metadata</a:t>
+            </a:r>
+            <a:endParaRPr lang="en-CA" sz="800">
+              <a:solidFill>
+                <a:schemeClr val="tx1">
+                  <a:lumMod val="65000"/>
+                  <a:lumOff val="35000"/>
+                </a:schemeClr>
+              </a:solidFill>
+              <a:latin typeface="Arial Narrow" panose="020B0606020202030204" pitchFamily="34" charset="0"/>
+            </a:endParaRPr>
+          </a:p>
+        </p:txBody>
+      </p:sp>
+      <p:sp>
+        <p:nvSpPr>
+          <p:cNvPr id="78" name="Rectangle 77">
+            <a:extLst>
+              <a:ext uri="{FF2B5EF4-FFF2-40B4-BE49-F238E27FC236}">
+                <a16:creationId xmlns:a16="http://schemas.microsoft.com/office/drawing/2014/main" id="{90C06E82-7074-9DBC-59B8-40E95C5D1412}"/>
+              </a:ext>
+            </a:extLst>
+          </p:cNvPr>
+          <p:cNvSpPr/>
+          <p:nvPr/>
+        </p:nvSpPr>
+        <p:spPr>
+          <a:xfrm>
+            <a:off x="956850" y="4191603"/>
+            <a:ext cx="4263222" cy="433737"/>
+          </a:xfrm>
+          <a:prstGeom prst="rect">
+            <a:avLst/>
+          </a:prstGeom>
+          <a:solidFill>
+            <a:srgbClr val="EBEEEF"/>
+          </a:solidFill>
+          <a:ln>
+            <a:noFill/>
+          </a:ln>
+        </p:spPr>
+        <p:style>
+          <a:lnRef idx="2">
+            <a:schemeClr val="accent1">
+              <a:shade val="50000"/>
+            </a:schemeClr>
+          </a:lnRef>
+          <a:fillRef idx="1">
+            <a:schemeClr val="accent1"/>
+          </a:fillRef>
+          <a:effectRef idx="0">
+            <a:schemeClr val="accent1"/>
+          </a:effectRef>
+          <a:fontRef idx="minor">
+            <a:schemeClr val="lt1"/>
+          </a:fontRef>
+        </p:style>
+        <p:txBody>
+          <a:bodyPr lIns="36000" tIns="18000" rIns="36000" bIns="0" rtlCol="0" anchor="t"/>
+          <a:lstStyle/>
+          <a:p>
+            <a:r>
+              <a:rPr lang="en-US" sz="800">
+                <a:solidFill>
+                  <a:schemeClr val="tx1">
+                    <a:lumMod val="75000"/>
+                    <a:lumOff val="25000"/>
+                  </a:schemeClr>
+                </a:solidFill>
+                <a:latin typeface="Arial Narrow" panose="020B0606020202030204" pitchFamily="34" charset="0"/>
+                <a:ea typeface="Open Sans Condensed" panose="020B0806030504020204" pitchFamily="34" charset="0"/>
+                <a:cs typeface="Open Sans Condensed" panose="020B0806030504020204" pitchFamily="34" charset="0"/>
+              </a:rPr>
+              <a:t>Set of 16 key-value pairs that can be attached to an object. This can be useful for storing additional information about the object in a structured format, and querying for objects via API or the dashboard. Keys: strings max. 64 characters. Values: strings with max. 512 characters.</a:t>
+            </a:r>
+            <a:endParaRPr lang="de-DE" sz="800">
+              <a:solidFill>
+                <a:schemeClr val="tx1">
+                  <a:lumMod val="75000"/>
+                  <a:lumOff val="25000"/>
+                </a:schemeClr>
+              </a:solidFill>
+              <a:latin typeface="Arial Narrow" panose="020B0606020202030204" pitchFamily="34" charset="0"/>
+              <a:ea typeface="Open Sans Condensed" panose="020B0806030504020204" pitchFamily="34" charset="0"/>
+              <a:cs typeface="Open Sans Condensed" panose="020B0806030504020204" pitchFamily="34" charset="0"/>
+            </a:endParaRPr>
+          </a:p>
+        </p:txBody>
+      </p:sp>
+      <p:sp>
+        <p:nvSpPr>
+          <p:cNvPr id="80" name="Rectangle 79">
+            <a:extLst>
+              <a:ext uri="{FF2B5EF4-FFF2-40B4-BE49-F238E27FC236}">
+                <a16:creationId xmlns:a16="http://schemas.microsoft.com/office/drawing/2014/main" id="{8584F85C-1E00-F81E-297C-60E03EA9A051}"/>
+              </a:ext>
+            </a:extLst>
+          </p:cNvPr>
+          <p:cNvSpPr/>
+          <p:nvPr/>
+        </p:nvSpPr>
+        <p:spPr>
+          <a:xfrm>
+            <a:off x="253888" y="4662093"/>
+            <a:ext cx="671771" cy="180000"/>
+          </a:xfrm>
+          <a:prstGeom prst="rect">
+            <a:avLst/>
+          </a:prstGeom>
+          <a:solidFill>
+            <a:srgbClr val="EBEEEF"/>
+          </a:solidFill>
+          <a:ln>
+            <a:noFill/>
+          </a:ln>
+        </p:spPr>
+        <p:style>
+          <a:lnRef idx="2">
+            <a:schemeClr val="accent1">
+              <a:shade val="50000"/>
+            </a:schemeClr>
+          </a:lnRef>
+          <a:fillRef idx="1">
+            <a:schemeClr val="accent1"/>
+          </a:fillRef>
+          <a:effectRef idx="0">
+            <a:schemeClr val="accent1"/>
+          </a:effectRef>
+          <a:fontRef idx="minor">
+            <a:schemeClr val="lt1"/>
+          </a:fontRef>
+        </p:style>
+        <p:txBody>
+          <a:bodyPr lIns="36000" tIns="18000" rIns="0" bIns="0" rtlCol="0" anchor="t"/>
+          <a:lstStyle/>
+          <a:p>
+            <a:r>
+              <a:rPr lang="en-US" sz="800">
+                <a:solidFill>
+                  <a:schemeClr val="tx1">
+                    <a:lumMod val="75000"/>
+                    <a:lumOff val="25000"/>
+                  </a:schemeClr>
+                </a:solidFill>
+                <a:latin typeface="Arial Narrow" panose="020B0606020202030204" pitchFamily="34" charset="0"/>
+                <a:ea typeface="Open Sans Condensed" panose="020B0806030504020204" pitchFamily="34" charset="0"/>
+                <a:cs typeface="Open Sans Condensed" panose="020B0806030504020204" pitchFamily="34" charset="0"/>
+              </a:rPr>
+              <a:t>file_counts</a:t>
+            </a:r>
+            <a:endParaRPr lang="de-DE" sz="800">
+              <a:solidFill>
+                <a:schemeClr val="tx1">
+                  <a:lumMod val="75000"/>
+                  <a:lumOff val="25000"/>
+                </a:schemeClr>
+              </a:solidFill>
+              <a:latin typeface="Arial Narrow" panose="020B0606020202030204" pitchFamily="34" charset="0"/>
+              <a:ea typeface="Open Sans Condensed" panose="020B0806030504020204" pitchFamily="34" charset="0"/>
+              <a:cs typeface="Open Sans Condensed" panose="020B0806030504020204" pitchFamily="34" charset="0"/>
+            </a:endParaRPr>
+          </a:p>
+        </p:txBody>
+      </p:sp>
+      <p:sp>
+        <p:nvSpPr>
+          <p:cNvPr id="82" name="Rectangle 81">
+            <a:extLst>
+              <a:ext uri="{FF2B5EF4-FFF2-40B4-BE49-F238E27FC236}">
+                <a16:creationId xmlns:a16="http://schemas.microsoft.com/office/drawing/2014/main" id="{069A63E2-D58C-7178-E218-C4DBADAEA491}"/>
+              </a:ext>
+            </a:extLst>
+          </p:cNvPr>
+          <p:cNvSpPr/>
+          <p:nvPr/>
+        </p:nvSpPr>
+        <p:spPr>
+          <a:xfrm>
+            <a:off x="955974" y="4662093"/>
+            <a:ext cx="4263222" cy="180000"/>
+          </a:xfrm>
+          <a:prstGeom prst="rect">
+            <a:avLst/>
+          </a:prstGeom>
+          <a:solidFill>
+            <a:srgbClr val="EBEEEF"/>
+          </a:solidFill>
+          <a:ln>
+            <a:noFill/>
+          </a:ln>
+        </p:spPr>
+        <p:style>
+          <a:lnRef idx="2">
+            <a:schemeClr val="accent1">
+              <a:shade val="50000"/>
+            </a:schemeClr>
+          </a:lnRef>
+          <a:fillRef idx="1">
+            <a:schemeClr val="accent1"/>
+          </a:fillRef>
+          <a:effectRef idx="0">
+            <a:schemeClr val="accent1"/>
+          </a:effectRef>
+          <a:fontRef idx="minor">
+            <a:schemeClr val="lt1"/>
+          </a:fontRef>
+        </p:style>
+        <p:txBody>
+          <a:bodyPr lIns="36000" tIns="18000" rIns="36000" bIns="0" rtlCol="0" anchor="t"/>
+          <a:lstStyle/>
+          <a:p>
+            <a:r>
+              <a:rPr lang="en-US" sz="800">
+                <a:solidFill>
+                  <a:schemeClr val="tx1">
+                    <a:lumMod val="75000"/>
+                    <a:lumOff val="25000"/>
+                  </a:schemeClr>
+                </a:solidFill>
+                <a:latin typeface="Arial Narrow" panose="020B0606020202030204" pitchFamily="34" charset="0"/>
+                <a:ea typeface="Open Sans Condensed" panose="020B0806030504020204" pitchFamily="34" charset="0"/>
+                <a:cs typeface="Open Sans Condensed" panose="020B0806030504020204" pitchFamily="34" charset="0"/>
+              </a:rPr>
+              <a:t>The number of files </a:t>
+            </a:r>
+            <a:r>
+              <a:rPr lang="en-US" sz="800" u="sng">
+                <a:solidFill>
+                  <a:schemeClr val="tx1">
+                    <a:lumMod val="75000"/>
+                    <a:lumOff val="25000"/>
+                  </a:schemeClr>
+                </a:solidFill>
+                <a:latin typeface="Arial Narrow" panose="020B0606020202030204" pitchFamily="34" charset="0"/>
+                <a:ea typeface="Open Sans Condensed" panose="020B0806030504020204" pitchFamily="34" charset="0"/>
+                <a:cs typeface="Open Sans Condensed" panose="020B0806030504020204" pitchFamily="34" charset="0"/>
+              </a:rPr>
+              <a:t>cancelled</a:t>
+            </a:r>
+            <a:r>
+              <a:rPr lang="en-US" sz="800">
+                <a:solidFill>
+                  <a:schemeClr val="tx1">
+                    <a:lumMod val="75000"/>
+                    <a:lumOff val="25000"/>
+                  </a:schemeClr>
+                </a:solidFill>
+                <a:latin typeface="Arial Narrow" panose="020B0606020202030204" pitchFamily="34" charset="0"/>
+                <a:ea typeface="Open Sans Condensed" panose="020B0806030504020204" pitchFamily="34" charset="0"/>
+                <a:cs typeface="Open Sans Condensed" panose="020B0806030504020204" pitchFamily="34" charset="0"/>
+              </a:rPr>
+              <a:t>, </a:t>
+            </a:r>
+            <a:r>
+              <a:rPr lang="en-US" sz="800" u="sng">
+                <a:solidFill>
+                  <a:schemeClr val="tx1">
+                    <a:lumMod val="75000"/>
+                    <a:lumOff val="25000"/>
+                  </a:schemeClr>
+                </a:solidFill>
+                <a:latin typeface="Arial Narrow" panose="020B0606020202030204" pitchFamily="34" charset="0"/>
+                <a:ea typeface="Open Sans Condensed" panose="020B0806030504020204" pitchFamily="34" charset="0"/>
+                <a:cs typeface="Open Sans Condensed" panose="020B0806030504020204" pitchFamily="34" charset="0"/>
+              </a:rPr>
+              <a:t>completed</a:t>
+            </a:r>
+            <a:r>
+              <a:rPr lang="en-US" sz="800">
+                <a:solidFill>
+                  <a:schemeClr val="tx1">
+                    <a:lumMod val="75000"/>
+                    <a:lumOff val="25000"/>
+                  </a:schemeClr>
+                </a:solidFill>
+                <a:latin typeface="Arial Narrow" panose="020B0606020202030204" pitchFamily="34" charset="0"/>
+                <a:ea typeface="Open Sans Condensed" panose="020B0806030504020204" pitchFamily="34" charset="0"/>
+                <a:cs typeface="Open Sans Condensed" panose="020B0806030504020204" pitchFamily="34" charset="0"/>
+              </a:rPr>
+              <a:t>, </a:t>
+            </a:r>
+            <a:r>
+              <a:rPr lang="en-US" sz="800" u="sng">
+                <a:solidFill>
+                  <a:schemeClr val="tx1">
+                    <a:lumMod val="75000"/>
+                    <a:lumOff val="25000"/>
+                  </a:schemeClr>
+                </a:solidFill>
+                <a:latin typeface="Arial Narrow" panose="020B0606020202030204" pitchFamily="34" charset="0"/>
+                <a:ea typeface="Open Sans Condensed" panose="020B0806030504020204" pitchFamily="34" charset="0"/>
+                <a:cs typeface="Open Sans Condensed" panose="020B0806030504020204" pitchFamily="34" charset="0"/>
+              </a:rPr>
+              <a:t>failed</a:t>
+            </a:r>
+            <a:r>
+              <a:rPr lang="en-US" sz="800">
+                <a:solidFill>
+                  <a:schemeClr val="tx1">
+                    <a:lumMod val="75000"/>
+                    <a:lumOff val="25000"/>
+                  </a:schemeClr>
+                </a:solidFill>
+                <a:latin typeface="Arial Narrow" panose="020B0606020202030204" pitchFamily="34" charset="0"/>
+                <a:ea typeface="Open Sans Condensed" panose="020B0806030504020204" pitchFamily="34" charset="0"/>
+                <a:cs typeface="Open Sans Condensed" panose="020B0806030504020204" pitchFamily="34" charset="0"/>
+              </a:rPr>
+              <a:t>, </a:t>
+            </a:r>
+            <a:r>
+              <a:rPr lang="en-US" sz="800" u="sng">
+                <a:solidFill>
+                  <a:schemeClr val="tx1">
+                    <a:lumMod val="75000"/>
+                    <a:lumOff val="25000"/>
+                  </a:schemeClr>
+                </a:solidFill>
+                <a:latin typeface="Arial Narrow" panose="020B0606020202030204" pitchFamily="34" charset="0"/>
+                <a:ea typeface="Open Sans Condensed" panose="020B0806030504020204" pitchFamily="34" charset="0"/>
+                <a:cs typeface="Open Sans Condensed" panose="020B0806030504020204" pitchFamily="34" charset="0"/>
+              </a:rPr>
+              <a:t>in_progress</a:t>
+            </a:r>
+            <a:r>
+              <a:rPr lang="en-US" sz="800">
+                <a:solidFill>
+                  <a:schemeClr val="tx1">
+                    <a:lumMod val="75000"/>
+                    <a:lumOff val="25000"/>
+                  </a:schemeClr>
+                </a:solidFill>
+                <a:latin typeface="Arial Narrow" panose="020B0606020202030204" pitchFamily="34" charset="0"/>
+                <a:ea typeface="Open Sans Condensed" panose="020B0806030504020204" pitchFamily="34" charset="0"/>
+                <a:cs typeface="Open Sans Condensed" panose="020B0806030504020204" pitchFamily="34" charset="0"/>
+              </a:rPr>
+              <a:t>, and </a:t>
+            </a:r>
+            <a:r>
+              <a:rPr lang="en-US" sz="800" u="sng">
+                <a:solidFill>
+                  <a:schemeClr val="tx1">
+                    <a:lumMod val="75000"/>
+                    <a:lumOff val="25000"/>
+                  </a:schemeClr>
+                </a:solidFill>
+                <a:latin typeface="Arial Narrow" panose="020B0606020202030204" pitchFamily="34" charset="0"/>
+                <a:ea typeface="Open Sans Condensed" panose="020B0806030504020204" pitchFamily="34" charset="0"/>
+                <a:cs typeface="Open Sans Condensed" panose="020B0806030504020204" pitchFamily="34" charset="0"/>
+              </a:rPr>
+              <a:t>total</a:t>
+            </a:r>
+            <a:endParaRPr lang="de-DE" sz="800" u="sng">
+              <a:solidFill>
+                <a:schemeClr val="tx1">
+                  <a:lumMod val="75000"/>
+                  <a:lumOff val="25000"/>
+                </a:schemeClr>
+              </a:solidFill>
+              <a:latin typeface="Arial Narrow" panose="020B0606020202030204" pitchFamily="34" charset="0"/>
+              <a:ea typeface="Open Sans Condensed" panose="020B0806030504020204" pitchFamily="34" charset="0"/>
+              <a:cs typeface="Open Sans Condensed" panose="020B0806030504020204" pitchFamily="34" charset="0"/>
+            </a:endParaRPr>
+          </a:p>
+        </p:txBody>
+      </p:sp>
+      <p:sp>
+        <p:nvSpPr>
+          <p:cNvPr id="93" name="Rectangle 92">
+            <a:extLst>
+              <a:ext uri="{FF2B5EF4-FFF2-40B4-BE49-F238E27FC236}">
+                <a16:creationId xmlns:a16="http://schemas.microsoft.com/office/drawing/2014/main" id="{3FF04913-423D-34D1-1771-4F03BFB5C2EE}"/>
+              </a:ext>
+            </a:extLst>
+          </p:cNvPr>
+          <p:cNvSpPr/>
+          <p:nvPr/>
+        </p:nvSpPr>
+        <p:spPr>
+          <a:xfrm>
+            <a:off x="253888" y="4873994"/>
+            <a:ext cx="671771" cy="180000"/>
+          </a:xfrm>
+          <a:prstGeom prst="rect">
+            <a:avLst/>
+          </a:prstGeom>
+          <a:solidFill>
+            <a:srgbClr val="EBEEEF"/>
+          </a:solidFill>
+          <a:ln>
+            <a:noFill/>
+          </a:ln>
+        </p:spPr>
+        <p:style>
+          <a:lnRef idx="2">
+            <a:schemeClr val="accent1">
+              <a:shade val="50000"/>
+            </a:schemeClr>
+          </a:lnRef>
+          <a:fillRef idx="1">
+            <a:schemeClr val="accent1"/>
+          </a:fillRef>
+          <a:effectRef idx="0">
+            <a:schemeClr val="accent1"/>
+          </a:effectRef>
+          <a:fontRef idx="minor">
+            <a:schemeClr val="lt1"/>
+          </a:fontRef>
+        </p:style>
+        <p:txBody>
+          <a:bodyPr lIns="36000" tIns="18000" rIns="0" bIns="0" rtlCol="0" anchor="t"/>
+          <a:lstStyle/>
+          <a:p>
+            <a:r>
+              <a:rPr lang="en-US" sz="800">
+                <a:solidFill>
+                  <a:schemeClr val="tx1">
+                    <a:lumMod val="75000"/>
+                    <a:lumOff val="25000"/>
+                  </a:schemeClr>
+                </a:solidFill>
+                <a:latin typeface="Arial Narrow" panose="020B0606020202030204" pitchFamily="34" charset="0"/>
+                <a:ea typeface="Open Sans Condensed" panose="020B0806030504020204" pitchFamily="34" charset="0"/>
+                <a:cs typeface="Open Sans Condensed" panose="020B0806030504020204" pitchFamily="34" charset="0"/>
+              </a:rPr>
+              <a:t>usage_bytes</a:t>
+            </a:r>
+            <a:endParaRPr lang="de-DE" sz="800">
+              <a:solidFill>
+                <a:schemeClr val="tx1">
+                  <a:lumMod val="75000"/>
+                  <a:lumOff val="25000"/>
+                </a:schemeClr>
+              </a:solidFill>
+              <a:latin typeface="Arial Narrow" panose="020B0606020202030204" pitchFamily="34" charset="0"/>
+              <a:ea typeface="Open Sans Condensed" panose="020B0806030504020204" pitchFamily="34" charset="0"/>
+              <a:cs typeface="Open Sans Condensed" panose="020B0806030504020204" pitchFamily="34" charset="0"/>
+            </a:endParaRPr>
+          </a:p>
+        </p:txBody>
+      </p:sp>
+      <p:sp>
+        <p:nvSpPr>
+          <p:cNvPr id="94" name="Rectangle 93">
+            <a:extLst>
+              <a:ext uri="{FF2B5EF4-FFF2-40B4-BE49-F238E27FC236}">
+                <a16:creationId xmlns:a16="http://schemas.microsoft.com/office/drawing/2014/main" id="{2ACF51C9-8375-47B5-245E-AC19F60C76E5}"/>
+              </a:ext>
+            </a:extLst>
+          </p:cNvPr>
+          <p:cNvSpPr/>
+          <p:nvPr/>
+        </p:nvSpPr>
+        <p:spPr>
+          <a:xfrm>
+            <a:off x="955974" y="4873994"/>
+            <a:ext cx="4263222" cy="180000"/>
+          </a:xfrm>
+          <a:prstGeom prst="rect">
+            <a:avLst/>
+          </a:prstGeom>
+          <a:solidFill>
+            <a:srgbClr val="EBEEEF"/>
+          </a:solidFill>
+          <a:ln>
+            <a:noFill/>
+          </a:ln>
+        </p:spPr>
+        <p:style>
+          <a:lnRef idx="2">
+            <a:schemeClr val="accent1">
+              <a:shade val="50000"/>
+            </a:schemeClr>
+          </a:lnRef>
+          <a:fillRef idx="1">
+            <a:schemeClr val="accent1"/>
+          </a:fillRef>
+          <a:effectRef idx="0">
+            <a:schemeClr val="accent1"/>
+          </a:effectRef>
+          <a:fontRef idx="minor">
+            <a:schemeClr val="lt1"/>
+          </a:fontRef>
+        </p:style>
+        <p:txBody>
+          <a:bodyPr lIns="36000" tIns="18000" rIns="36000" bIns="0" rtlCol="0" anchor="t"/>
+          <a:lstStyle/>
+          <a:p>
+            <a:r>
+              <a:rPr lang="en-US" sz="800">
+                <a:solidFill>
+                  <a:schemeClr val="tx1">
+                    <a:lumMod val="75000"/>
+                    <a:lumOff val="25000"/>
+                  </a:schemeClr>
+                </a:solidFill>
+                <a:latin typeface="Arial Narrow" panose="020B0606020202030204" pitchFamily="34" charset="0"/>
+                <a:ea typeface="Open Sans Condensed" panose="020B0806030504020204" pitchFamily="34" charset="0"/>
+                <a:cs typeface="Open Sans Condensed" panose="020B0806030504020204" pitchFamily="34" charset="0"/>
+              </a:rPr>
+              <a:t>The total number of bytes used by the files in the vector store.</a:t>
+            </a:r>
+            <a:endParaRPr lang="de-DE" sz="800" u="sng">
+              <a:solidFill>
+                <a:schemeClr val="tx1">
+                  <a:lumMod val="75000"/>
+                  <a:lumOff val="25000"/>
+                </a:schemeClr>
+              </a:solidFill>
+              <a:latin typeface="Arial Narrow" panose="020B0606020202030204" pitchFamily="34" charset="0"/>
+              <a:ea typeface="Open Sans Condensed" panose="020B0806030504020204" pitchFamily="34" charset="0"/>
+              <a:cs typeface="Open Sans Condensed" panose="020B0806030504020204" pitchFamily="34" charset="0"/>
+            </a:endParaRPr>
+          </a:p>
+        </p:txBody>
+      </p:sp>
+      <p:sp>
+        <p:nvSpPr>
+          <p:cNvPr id="95" name="Rectangle 94">
+            <a:extLst>
+              <a:ext uri="{FF2B5EF4-FFF2-40B4-BE49-F238E27FC236}">
+                <a16:creationId xmlns:a16="http://schemas.microsoft.com/office/drawing/2014/main" id="{0BA3BAF5-C699-DCE1-91B3-38DAE872BB62}"/>
+              </a:ext>
+            </a:extLst>
+          </p:cNvPr>
+          <p:cNvSpPr/>
+          <p:nvPr/>
+        </p:nvSpPr>
+        <p:spPr>
+          <a:xfrm>
+            <a:off x="4639624" y="1836994"/>
+            <a:ext cx="436432" cy="180000"/>
+          </a:xfrm>
+          <a:prstGeom prst="rect">
+            <a:avLst/>
+          </a:prstGeom>
+          <a:solidFill>
+            <a:srgbClr val="CEFCFF"/>
+          </a:solidFill>
+          <a:ln w="19050">
+            <a:solidFill>
+              <a:srgbClr val="2194F6"/>
+            </a:solidFill>
+          </a:ln>
+        </p:spPr>
+        <p:style>
+          <a:lnRef idx="2">
+            <a:schemeClr val="accent1">
+              <a:shade val="50000"/>
+            </a:schemeClr>
+          </a:lnRef>
+          <a:fillRef idx="1">
+            <a:schemeClr val="accent1"/>
+          </a:fillRef>
+          <a:effectRef idx="0">
+            <a:schemeClr val="accent1"/>
+          </a:effectRef>
+          <a:fontRef idx="minor">
+            <a:schemeClr val="lt1"/>
+          </a:fontRef>
+        </p:style>
+        <p:txBody>
+          <a:bodyPr lIns="36000" tIns="0" rIns="0" bIns="0" rtlCol="0" anchor="ctr"/>
+          <a:lstStyle/>
+          <a:p>
+            <a:r>
+              <a:rPr lang="de-DE" sz="800">
+                <a:solidFill>
+                  <a:srgbClr val="1064AF"/>
+                </a:solidFill>
+                <a:latin typeface="Arial Narrow" panose="020B0606020202030204" pitchFamily="34" charset="0"/>
+                <a:ea typeface="Open Sans Condensed Light" panose="020B0306030504020204" pitchFamily="34" charset="0"/>
+                <a:cs typeface="Open Sans Condensed Light" panose="020B0306030504020204" pitchFamily="34" charset="0"/>
+              </a:rPr>
+              <a:t>{...}</a:t>
+            </a:r>
+            <a:endParaRPr lang="de-DE" sz="800" dirty="0">
+              <a:solidFill>
+                <a:srgbClr val="1064AF"/>
+              </a:solidFill>
+              <a:latin typeface="Arial Narrow" panose="020B0606020202030204" pitchFamily="34" charset="0"/>
+              <a:ea typeface="Open Sans Condensed Light" panose="020B0306030504020204" pitchFamily="34" charset="0"/>
+              <a:cs typeface="Open Sans Condensed Light" panose="020B0306030504020204" pitchFamily="34" charset="0"/>
+            </a:endParaRPr>
+          </a:p>
+        </p:txBody>
+      </p:sp>
+      <p:sp>
+        <p:nvSpPr>
+          <p:cNvPr id="96" name="TextBox 95">
+            <a:extLst>
+              <a:ext uri="{FF2B5EF4-FFF2-40B4-BE49-F238E27FC236}">
+                <a16:creationId xmlns:a16="http://schemas.microsoft.com/office/drawing/2014/main" id="{3D51E402-0D31-2D0E-572A-2EAC6A30F098}"/>
+              </a:ext>
+            </a:extLst>
+          </p:cNvPr>
+          <p:cNvSpPr txBox="1"/>
+          <p:nvPr/>
+        </p:nvSpPr>
+        <p:spPr>
+          <a:xfrm>
+            <a:off x="4682174" y="1669415"/>
+            <a:ext cx="351058" cy="123111"/>
+          </a:xfrm>
+          <a:prstGeom prst="rect">
+            <a:avLst/>
+          </a:prstGeom>
+          <a:noFill/>
+        </p:spPr>
+        <p:txBody>
+          <a:bodyPr wrap="none" lIns="0" tIns="0" rIns="0" bIns="0" rtlCol="0">
+            <a:spAutoFit/>
+          </a:bodyPr>
+          <a:lstStyle/>
+          <a:p>
+            <a:r>
+              <a:rPr lang="en-US" sz="800">
+                <a:solidFill>
+                  <a:schemeClr val="tx1">
+                    <a:lumMod val="65000"/>
+                    <a:lumOff val="35000"/>
+                  </a:schemeClr>
+                </a:solidFill>
+                <a:latin typeface="Arial Narrow" panose="020B0606020202030204" pitchFamily="34" charset="0"/>
+              </a:rPr>
+              <a:t>metadata</a:t>
+            </a:r>
+            <a:endParaRPr lang="en-CA" sz="800">
+              <a:solidFill>
+                <a:schemeClr val="tx1">
+                  <a:lumMod val="65000"/>
+                  <a:lumOff val="35000"/>
+                </a:schemeClr>
+              </a:solidFill>
+              <a:latin typeface="Arial Narrow" panose="020B0606020202030204" pitchFamily="34" charset="0"/>
+            </a:endParaRPr>
+          </a:p>
+        </p:txBody>
+      </p:sp>
+      <p:sp>
+        <p:nvSpPr>
+          <p:cNvPr id="97" name="Rectangle 96">
+            <a:extLst>
+              <a:ext uri="{FF2B5EF4-FFF2-40B4-BE49-F238E27FC236}">
+                <a16:creationId xmlns:a16="http://schemas.microsoft.com/office/drawing/2014/main" id="{6BDD25A5-EA51-478E-F53E-44B469EAD908}"/>
+              </a:ext>
+            </a:extLst>
+          </p:cNvPr>
+          <p:cNvSpPr/>
+          <p:nvPr/>
+        </p:nvSpPr>
+        <p:spPr>
+          <a:xfrm>
+            <a:off x="4639624" y="2071152"/>
+            <a:ext cx="436432" cy="180000"/>
+          </a:xfrm>
+          <a:prstGeom prst="rect">
+            <a:avLst/>
+          </a:prstGeom>
+          <a:solidFill>
+            <a:srgbClr val="CEFCFF"/>
+          </a:solidFill>
+          <a:ln w="19050">
+            <a:solidFill>
+              <a:srgbClr val="2194F6"/>
+            </a:solidFill>
+          </a:ln>
+        </p:spPr>
+        <p:style>
+          <a:lnRef idx="2">
+            <a:schemeClr val="accent1">
+              <a:shade val="50000"/>
+            </a:schemeClr>
+          </a:lnRef>
+          <a:fillRef idx="1">
+            <a:schemeClr val="accent1"/>
+          </a:fillRef>
+          <a:effectRef idx="0">
+            <a:schemeClr val="accent1"/>
+          </a:effectRef>
+          <a:fontRef idx="minor">
+            <a:schemeClr val="lt1"/>
+          </a:fontRef>
+        </p:style>
+        <p:txBody>
+          <a:bodyPr lIns="36000" tIns="0" rIns="0" bIns="0" rtlCol="0" anchor="ctr"/>
+          <a:lstStyle/>
+          <a:p>
+            <a:r>
+              <a:rPr lang="de-DE" sz="800">
+                <a:solidFill>
+                  <a:srgbClr val="1064AF"/>
+                </a:solidFill>
+                <a:latin typeface="Arial Narrow" panose="020B0606020202030204" pitchFamily="34" charset="0"/>
+                <a:ea typeface="Open Sans Condensed Light" panose="020B0306030504020204" pitchFamily="34" charset="0"/>
+                <a:cs typeface="Open Sans Condensed Light" panose="020B0306030504020204" pitchFamily="34" charset="0"/>
+              </a:rPr>
+              <a:t>{...}</a:t>
+            </a:r>
+            <a:endParaRPr lang="de-DE" sz="800" dirty="0">
+              <a:solidFill>
+                <a:srgbClr val="1064AF"/>
+              </a:solidFill>
+              <a:latin typeface="Arial Narrow" panose="020B0606020202030204" pitchFamily="34" charset="0"/>
+              <a:ea typeface="Open Sans Condensed Light" panose="020B0306030504020204" pitchFamily="34" charset="0"/>
+              <a:cs typeface="Open Sans Condensed Light" panose="020B0306030504020204" pitchFamily="34" charset="0"/>
+            </a:endParaRPr>
+          </a:p>
+        </p:txBody>
+      </p:sp>
+      <p:sp>
+        <p:nvSpPr>
+          <p:cNvPr id="98" name="Rectangle 97">
+            <a:extLst>
+              <a:ext uri="{FF2B5EF4-FFF2-40B4-BE49-F238E27FC236}">
+                <a16:creationId xmlns:a16="http://schemas.microsoft.com/office/drawing/2014/main" id="{9CB2E08E-AD6D-3130-D209-02470C90500F}"/>
+              </a:ext>
+            </a:extLst>
+          </p:cNvPr>
+          <p:cNvSpPr/>
+          <p:nvPr/>
+        </p:nvSpPr>
+        <p:spPr>
+          <a:xfrm>
+            <a:off x="5075276" y="1836994"/>
+            <a:ext cx="436432" cy="180000"/>
+          </a:xfrm>
+          <a:prstGeom prst="rect">
+            <a:avLst/>
+          </a:prstGeom>
+          <a:solidFill>
+            <a:srgbClr val="CEFCFF"/>
+          </a:solidFill>
+          <a:ln w="19050">
+            <a:solidFill>
+              <a:srgbClr val="2194F6"/>
+            </a:solidFill>
+          </a:ln>
+        </p:spPr>
+        <p:style>
+          <a:lnRef idx="2">
+            <a:schemeClr val="accent1">
+              <a:shade val="50000"/>
+            </a:schemeClr>
+          </a:lnRef>
+          <a:fillRef idx="1">
+            <a:schemeClr val="accent1"/>
+          </a:fillRef>
+          <a:effectRef idx="0">
+            <a:schemeClr val="accent1"/>
+          </a:effectRef>
+          <a:fontRef idx="minor">
+            <a:schemeClr val="lt1"/>
+          </a:fontRef>
+        </p:style>
+        <p:txBody>
+          <a:bodyPr lIns="36000" tIns="0" rIns="0" bIns="0" rtlCol="0" anchor="ctr"/>
+          <a:lstStyle/>
+          <a:p>
+            <a:r>
+              <a:rPr lang="de-DE" sz="800">
+                <a:solidFill>
+                  <a:srgbClr val="1064AF"/>
+                </a:solidFill>
+                <a:latin typeface="Arial Narrow" panose="020B0606020202030204" pitchFamily="34" charset="0"/>
+                <a:ea typeface="Open Sans Condensed Light" panose="020B0306030504020204" pitchFamily="34" charset="0"/>
+                <a:cs typeface="Open Sans Condensed Light" panose="020B0306030504020204" pitchFamily="34" charset="0"/>
+              </a:rPr>
+              <a:t>{...}</a:t>
+            </a:r>
+            <a:endParaRPr lang="de-DE" sz="800" dirty="0">
+              <a:solidFill>
+                <a:srgbClr val="1064AF"/>
+              </a:solidFill>
+              <a:latin typeface="Arial Narrow" panose="020B0606020202030204" pitchFamily="34" charset="0"/>
+              <a:ea typeface="Open Sans Condensed Light" panose="020B0306030504020204" pitchFamily="34" charset="0"/>
+              <a:cs typeface="Open Sans Condensed Light" panose="020B0306030504020204" pitchFamily="34" charset="0"/>
+            </a:endParaRPr>
+          </a:p>
+        </p:txBody>
+      </p:sp>
+      <p:sp>
+        <p:nvSpPr>
+          <p:cNvPr id="99" name="TextBox 98">
+            <a:extLst>
+              <a:ext uri="{FF2B5EF4-FFF2-40B4-BE49-F238E27FC236}">
+                <a16:creationId xmlns:a16="http://schemas.microsoft.com/office/drawing/2014/main" id="{B7861FC9-D9F0-39F1-FE82-8AB84B4BE953}"/>
+              </a:ext>
+            </a:extLst>
+          </p:cNvPr>
+          <p:cNvSpPr txBox="1"/>
+          <p:nvPr/>
+        </p:nvSpPr>
+        <p:spPr>
+          <a:xfrm>
+            <a:off x="5117826" y="1669415"/>
+            <a:ext cx="402354" cy="123111"/>
+          </a:xfrm>
+          <a:prstGeom prst="rect">
+            <a:avLst/>
+          </a:prstGeom>
+          <a:noFill/>
+        </p:spPr>
+        <p:txBody>
+          <a:bodyPr wrap="none" lIns="0" tIns="0" rIns="0" bIns="0" rtlCol="0">
+            <a:spAutoFit/>
+          </a:bodyPr>
+          <a:lstStyle/>
+          <a:p>
+            <a:r>
+              <a:rPr lang="en-US" sz="800">
+                <a:solidFill>
+                  <a:schemeClr val="tx1">
+                    <a:lumMod val="65000"/>
+                    <a:lumOff val="35000"/>
+                  </a:schemeClr>
+                </a:solidFill>
+                <a:latin typeface="Arial Narrow" panose="020B0606020202030204" pitchFamily="34" charset="0"/>
+              </a:rPr>
+              <a:t>file_counts</a:t>
+            </a:r>
+            <a:endParaRPr lang="en-CA" sz="800">
+              <a:solidFill>
+                <a:schemeClr val="tx1">
+                  <a:lumMod val="65000"/>
+                  <a:lumOff val="35000"/>
+                </a:schemeClr>
+              </a:solidFill>
+              <a:latin typeface="Arial Narrow" panose="020B0606020202030204" pitchFamily="34" charset="0"/>
+            </a:endParaRPr>
+          </a:p>
+        </p:txBody>
+      </p:sp>
+      <p:sp>
+        <p:nvSpPr>
+          <p:cNvPr id="100" name="Rectangle 99">
+            <a:extLst>
+              <a:ext uri="{FF2B5EF4-FFF2-40B4-BE49-F238E27FC236}">
+                <a16:creationId xmlns:a16="http://schemas.microsoft.com/office/drawing/2014/main" id="{EC20DEF6-AE9B-9067-5024-03E51D2D9C36}"/>
+              </a:ext>
+            </a:extLst>
+          </p:cNvPr>
+          <p:cNvSpPr/>
+          <p:nvPr/>
+        </p:nvSpPr>
+        <p:spPr>
+          <a:xfrm>
+            <a:off x="5075276" y="2071152"/>
+            <a:ext cx="436432" cy="180000"/>
+          </a:xfrm>
+          <a:prstGeom prst="rect">
+            <a:avLst/>
+          </a:prstGeom>
+          <a:solidFill>
+            <a:srgbClr val="CEFCFF"/>
+          </a:solidFill>
+          <a:ln w="19050">
+            <a:solidFill>
+              <a:srgbClr val="2194F6"/>
+            </a:solidFill>
+          </a:ln>
+        </p:spPr>
+        <p:style>
+          <a:lnRef idx="2">
+            <a:schemeClr val="accent1">
+              <a:shade val="50000"/>
+            </a:schemeClr>
+          </a:lnRef>
+          <a:fillRef idx="1">
+            <a:schemeClr val="accent1"/>
+          </a:fillRef>
+          <a:effectRef idx="0">
+            <a:schemeClr val="accent1"/>
+          </a:effectRef>
+          <a:fontRef idx="minor">
+            <a:schemeClr val="lt1"/>
+          </a:fontRef>
+        </p:style>
+        <p:txBody>
+          <a:bodyPr lIns="36000" tIns="0" rIns="0" bIns="0" rtlCol="0" anchor="ctr"/>
+          <a:lstStyle/>
+          <a:p>
+            <a:r>
+              <a:rPr lang="de-DE" sz="800">
+                <a:solidFill>
+                  <a:srgbClr val="1064AF"/>
+                </a:solidFill>
+                <a:latin typeface="Arial Narrow" panose="020B0606020202030204" pitchFamily="34" charset="0"/>
+                <a:ea typeface="Open Sans Condensed Light" panose="020B0306030504020204" pitchFamily="34" charset="0"/>
+                <a:cs typeface="Open Sans Condensed Light" panose="020B0306030504020204" pitchFamily="34" charset="0"/>
+              </a:rPr>
+              <a:t>{...}</a:t>
+            </a:r>
+            <a:endParaRPr lang="de-DE" sz="800" dirty="0">
+              <a:solidFill>
+                <a:srgbClr val="1064AF"/>
+              </a:solidFill>
+              <a:latin typeface="Arial Narrow" panose="020B0606020202030204" pitchFamily="34" charset="0"/>
+              <a:ea typeface="Open Sans Condensed Light" panose="020B0306030504020204" pitchFamily="34" charset="0"/>
+              <a:cs typeface="Open Sans Condensed Light" panose="020B0306030504020204" pitchFamily="34" charset="0"/>
+            </a:endParaRPr>
+          </a:p>
+        </p:txBody>
+      </p:sp>
+      <p:sp>
+        <p:nvSpPr>
+          <p:cNvPr id="104" name="Rectangle 103">
+            <a:extLst>
+              <a:ext uri="{FF2B5EF4-FFF2-40B4-BE49-F238E27FC236}">
+                <a16:creationId xmlns:a16="http://schemas.microsoft.com/office/drawing/2014/main" id="{D68B6428-B28F-6629-F28C-D9775F78E50E}"/>
+              </a:ext>
+            </a:extLst>
+          </p:cNvPr>
+          <p:cNvSpPr/>
+          <p:nvPr/>
+        </p:nvSpPr>
+        <p:spPr>
+          <a:xfrm>
+            <a:off x="5511708" y="1836994"/>
+            <a:ext cx="576064" cy="180000"/>
+          </a:xfrm>
+          <a:prstGeom prst="rect">
+            <a:avLst/>
+          </a:prstGeom>
+          <a:solidFill>
+            <a:srgbClr val="CEFCFF"/>
+          </a:solidFill>
+          <a:ln w="19050">
+            <a:solidFill>
+              <a:srgbClr val="2194F6"/>
+            </a:solidFill>
+          </a:ln>
+        </p:spPr>
+        <p:style>
+          <a:lnRef idx="2">
+            <a:schemeClr val="accent1">
+              <a:shade val="50000"/>
+            </a:schemeClr>
+          </a:lnRef>
+          <a:fillRef idx="1">
+            <a:schemeClr val="accent1"/>
+          </a:fillRef>
+          <a:effectRef idx="0">
+            <a:schemeClr val="accent1"/>
+          </a:effectRef>
+          <a:fontRef idx="minor">
+            <a:schemeClr val="lt1"/>
+          </a:fontRef>
+        </p:style>
+        <p:txBody>
+          <a:bodyPr lIns="36000" tIns="0" rIns="0" bIns="0" rtlCol="0" anchor="ctr"/>
+          <a:lstStyle/>
+          <a:p>
+            <a:r>
+              <a:rPr lang="de-DE" sz="800">
+                <a:solidFill>
+                  <a:srgbClr val="1064AF"/>
+                </a:solidFill>
+                <a:latin typeface="Arial Narrow" panose="020B0606020202030204" pitchFamily="34" charset="0"/>
+                <a:ea typeface="Open Sans Condensed Light" panose="020B0306030504020204" pitchFamily="34" charset="0"/>
+                <a:cs typeface="Open Sans Condensed Light" panose="020B0306030504020204" pitchFamily="34" charset="0"/>
+              </a:rPr>
+              <a:t>44013862</a:t>
+            </a:r>
+            <a:endParaRPr lang="de-DE" sz="800" dirty="0">
+              <a:solidFill>
+                <a:srgbClr val="1064AF"/>
+              </a:solidFill>
+              <a:latin typeface="Arial Narrow" panose="020B0606020202030204" pitchFamily="34" charset="0"/>
+              <a:ea typeface="Open Sans Condensed Light" panose="020B0306030504020204" pitchFamily="34" charset="0"/>
+              <a:cs typeface="Open Sans Condensed Light" panose="020B0306030504020204" pitchFamily="34" charset="0"/>
+            </a:endParaRPr>
+          </a:p>
+        </p:txBody>
+      </p:sp>
+      <p:sp>
+        <p:nvSpPr>
+          <p:cNvPr id="105" name="TextBox 104">
+            <a:extLst>
+              <a:ext uri="{FF2B5EF4-FFF2-40B4-BE49-F238E27FC236}">
+                <a16:creationId xmlns:a16="http://schemas.microsoft.com/office/drawing/2014/main" id="{4D0A4590-C9FF-9E21-E1D9-625E6E7AF979}"/>
+              </a:ext>
+            </a:extLst>
+          </p:cNvPr>
+          <p:cNvSpPr txBox="1"/>
+          <p:nvPr/>
+        </p:nvSpPr>
+        <p:spPr>
+          <a:xfrm>
+            <a:off x="5560856" y="1669415"/>
+            <a:ext cx="474489" cy="123111"/>
+          </a:xfrm>
+          <a:prstGeom prst="rect">
+            <a:avLst/>
+          </a:prstGeom>
+          <a:noFill/>
+        </p:spPr>
+        <p:txBody>
+          <a:bodyPr wrap="none" lIns="0" tIns="0" rIns="0" bIns="0" rtlCol="0">
+            <a:spAutoFit/>
+          </a:bodyPr>
+          <a:lstStyle/>
+          <a:p>
+            <a:r>
+              <a:rPr lang="en-US" sz="800">
+                <a:solidFill>
+                  <a:schemeClr val="tx1">
+                    <a:lumMod val="65000"/>
+                    <a:lumOff val="35000"/>
+                  </a:schemeClr>
+                </a:solidFill>
+                <a:latin typeface="Arial Narrow" panose="020B0606020202030204" pitchFamily="34" charset="0"/>
+              </a:rPr>
+              <a:t>usage_bytes</a:t>
+            </a:r>
+            <a:endParaRPr lang="en-CA" sz="800">
+              <a:solidFill>
+                <a:schemeClr val="tx1">
+                  <a:lumMod val="65000"/>
+                  <a:lumOff val="35000"/>
+                </a:schemeClr>
+              </a:solidFill>
+              <a:latin typeface="Arial Narrow" panose="020B0606020202030204" pitchFamily="34" charset="0"/>
+            </a:endParaRPr>
+          </a:p>
+        </p:txBody>
+      </p:sp>
+      <p:sp>
+        <p:nvSpPr>
+          <p:cNvPr id="106" name="Rectangle 105">
+            <a:extLst>
+              <a:ext uri="{FF2B5EF4-FFF2-40B4-BE49-F238E27FC236}">
+                <a16:creationId xmlns:a16="http://schemas.microsoft.com/office/drawing/2014/main" id="{E1C881E7-0A63-6AFA-9598-3619271DA01D}"/>
+              </a:ext>
+            </a:extLst>
+          </p:cNvPr>
+          <p:cNvSpPr/>
+          <p:nvPr/>
+        </p:nvSpPr>
+        <p:spPr>
+          <a:xfrm>
+            <a:off x="5511708" y="2071152"/>
+            <a:ext cx="576064" cy="180000"/>
+          </a:xfrm>
+          <a:prstGeom prst="rect">
+            <a:avLst/>
+          </a:prstGeom>
+          <a:solidFill>
+            <a:srgbClr val="CEFCFF"/>
+          </a:solidFill>
+          <a:ln w="19050">
+            <a:solidFill>
+              <a:srgbClr val="2194F6"/>
+            </a:solidFill>
+          </a:ln>
+        </p:spPr>
+        <p:style>
+          <a:lnRef idx="2">
+            <a:schemeClr val="accent1">
+              <a:shade val="50000"/>
+            </a:schemeClr>
+          </a:lnRef>
+          <a:fillRef idx="1">
+            <a:schemeClr val="accent1"/>
+          </a:fillRef>
+          <a:effectRef idx="0">
+            <a:schemeClr val="accent1"/>
+          </a:effectRef>
+          <a:fontRef idx="minor">
+            <a:schemeClr val="lt1"/>
+          </a:fontRef>
+        </p:style>
+        <p:txBody>
+          <a:bodyPr lIns="36000" tIns="0" rIns="0" bIns="0" rtlCol="0" anchor="ctr"/>
+          <a:lstStyle/>
+          <a:p>
+            <a:r>
+              <a:rPr lang="de-DE" sz="800">
+                <a:solidFill>
+                  <a:srgbClr val="1064AF"/>
+                </a:solidFill>
+                <a:latin typeface="Arial Narrow" panose="020B0606020202030204" pitchFamily="34" charset="0"/>
+                <a:ea typeface="Open Sans Condensed Light" panose="020B0306030504020204" pitchFamily="34" charset="0"/>
+                <a:cs typeface="Open Sans Condensed Light" panose="020B0306030504020204" pitchFamily="34" charset="0"/>
+              </a:rPr>
+              <a:t>1740996732</a:t>
             </a:r>
             <a:endParaRPr lang="de-DE" sz="800" dirty="0">
               <a:solidFill>

</xml_diff>

<commit_message>
Added: test_file_search_functionalities() filtered search test case
</commit_message>
<xml_diff>
--- a/OpenAI-BackendTools.pptx
+++ b/OpenAI-BackendTools.pptx
@@ -5,10 +5,10 @@
     <p:sldMasterId id="2147483678" r:id="rId1"/>
   </p:sldMasterIdLst>
   <p:notesMasterIdLst>
-    <p:notesMasterId r:id="rId7"/>
+    <p:notesMasterId r:id="rId8"/>
   </p:notesMasterIdLst>
   <p:handoutMasterIdLst>
-    <p:handoutMasterId r:id="rId8"/>
+    <p:handoutMasterId r:id="rId9"/>
   </p:handoutMasterIdLst>
   <p:sldIdLst>
     <p:sldId id="258" r:id="rId2"/>
@@ -16,6 +16,7 @@
     <p:sldId id="259" r:id="rId4"/>
     <p:sldId id="260" r:id="rId5"/>
     <p:sldId id="262" r:id="rId6"/>
+    <p:sldId id="263" r:id="rId7"/>
   </p:sldIdLst>
   <p:sldSz cx="9144000" cy="5715000" type="screen16x10"/>
   <p:notesSz cx="6797675" cy="9926638"/>
@@ -223,7 +224,7 @@
           <a:p>
             <a:fld id="{FC4BCF81-FD30-4738-8CD3-6C15724C57DB}" type="datetimeFigureOut">
               <a:rPr lang="en-GB" smtClean="0"/>
-              <a:t>25/05/2025</a:t>
+              <a:t>26/05/2025</a:t>
             </a:fld>
             <a:endParaRPr lang="en-GB"/>
           </a:p>
@@ -388,7 +389,7 @@
           <a:p>
             <a:fld id="{393C90FD-22B7-4ADA-A649-5A6995920D65}" type="datetimeFigureOut">
               <a:rPr lang="en-US" smtClean="0"/>
-              <a:t>5/25/2025</a:t>
+              <a:t>5/26/2025</a:t>
             </a:fld>
             <a:endParaRPr lang="en-US"/>
           </a:p>
@@ -25991,6 +25992,153 @@
 </p:sld>
 </file>
 
+<file path=ppt/slides/slide6.xml><?xml version="1.0" encoding="utf-8"?>
+<p:sld xmlns:a="http://schemas.openxmlformats.org/drawingml/2006/main" xmlns:r="http://schemas.openxmlformats.org/officeDocument/2006/relationships" xmlns:p="http://schemas.openxmlformats.org/presentationml/2006/main">
+  <p:cSld>
+    <p:spTree>
+      <p:nvGrpSpPr>
+        <p:cNvPr id="1" name=""/>
+        <p:cNvGrpSpPr/>
+        <p:nvPr/>
+      </p:nvGrpSpPr>
+      <p:grpSpPr>
+        <a:xfrm>
+          <a:off x="0" y="0"/>
+          <a:ext cx="0" cy="0"/>
+          <a:chOff x="0" y="0"/>
+          <a:chExt cx="0" cy="0"/>
+        </a:xfrm>
+      </p:grpSpPr>
+      <p:sp>
+        <p:nvSpPr>
+          <p:cNvPr id="2" name="Title 1">
+            <a:extLst>
+              <a:ext uri="{FF2B5EF4-FFF2-40B4-BE49-F238E27FC236}">
+                <a16:creationId xmlns:a16="http://schemas.microsoft.com/office/drawing/2014/main" id="{DA391E45-5173-E639-33B2-276F945F228B}"/>
+              </a:ext>
+            </a:extLst>
+          </p:cNvPr>
+          <p:cNvSpPr>
+            <a:spLocks noGrp="1"/>
+          </p:cNvSpPr>
+          <p:nvPr>
+            <p:ph type="title"/>
+          </p:nvPr>
+        </p:nvSpPr>
+        <p:spPr/>
+        <p:txBody>
+          <a:bodyPr/>
+          <a:lstStyle/>
+          <a:p>
+            <a:r>
+              <a:rPr lang="en-US"/>
+              <a:t>Search Results</a:t>
+            </a:r>
+            <a:endParaRPr lang="en-CA"/>
+          </a:p>
+        </p:txBody>
+      </p:sp>
+      <p:pic>
+        <p:nvPicPr>
+          <p:cNvPr id="4" name="Picture 3">
+            <a:extLst>
+              <a:ext uri="{FF2B5EF4-FFF2-40B4-BE49-F238E27FC236}">
+                <a16:creationId xmlns:a16="http://schemas.microsoft.com/office/drawing/2014/main" id="{A62F8149-C6BF-6562-C74C-91F5BB95619E}"/>
+              </a:ext>
+            </a:extLst>
+          </p:cNvPr>
+          <p:cNvPicPr>
+            <a:picLocks noChangeAspect="1"/>
+          </p:cNvPicPr>
+          <p:nvPr/>
+        </p:nvPicPr>
+        <p:blipFill>
+          <a:blip r:embed="rId2"/>
+          <a:srcRect b="31324"/>
+          <a:stretch/>
+        </p:blipFill>
+        <p:spPr>
+          <a:xfrm>
+            <a:off x="4716015" y="956447"/>
+            <a:ext cx="3875707" cy="1757037"/>
+          </a:xfrm>
+          <a:prstGeom prst="rect">
+            <a:avLst/>
+          </a:prstGeom>
+        </p:spPr>
+      </p:pic>
+      <p:pic>
+        <p:nvPicPr>
+          <p:cNvPr id="6" name="Picture 5">
+            <a:extLst>
+              <a:ext uri="{FF2B5EF4-FFF2-40B4-BE49-F238E27FC236}">
+                <a16:creationId xmlns:a16="http://schemas.microsoft.com/office/drawing/2014/main" id="{FBCF194F-17F5-7FD5-54CB-4ADAC96ACA19}"/>
+              </a:ext>
+            </a:extLst>
+          </p:cNvPr>
+          <p:cNvPicPr>
+            <a:picLocks noChangeAspect="1"/>
+          </p:cNvPicPr>
+          <p:nvPr/>
+        </p:nvPicPr>
+        <p:blipFill>
+          <a:blip r:embed="rId3"/>
+          <a:stretch>
+            <a:fillRect/>
+          </a:stretch>
+        </p:blipFill>
+        <p:spPr>
+          <a:xfrm>
+            <a:off x="207382" y="956447"/>
+            <a:ext cx="4345790" cy="3649976"/>
+          </a:xfrm>
+          <a:prstGeom prst="rect">
+            <a:avLst/>
+          </a:prstGeom>
+        </p:spPr>
+      </p:pic>
+      <p:pic>
+        <p:nvPicPr>
+          <p:cNvPr id="8" name="Picture 7">
+            <a:extLst>
+              <a:ext uri="{FF2B5EF4-FFF2-40B4-BE49-F238E27FC236}">
+                <a16:creationId xmlns:a16="http://schemas.microsoft.com/office/drawing/2014/main" id="{E3EADE13-261D-4BB4-CC34-EB88283071F6}"/>
+              </a:ext>
+            </a:extLst>
+          </p:cNvPr>
+          <p:cNvPicPr>
+            <a:picLocks noChangeAspect="1"/>
+          </p:cNvPicPr>
+          <p:nvPr/>
+        </p:nvPicPr>
+        <p:blipFill>
+          <a:blip r:embed="rId4"/>
+          <a:srcRect b="29529"/>
+          <a:stretch/>
+        </p:blipFill>
+        <p:spPr>
+          <a:xfrm>
+            <a:off x="4716015" y="2785572"/>
+            <a:ext cx="4056492" cy="2187671"/>
+          </a:xfrm>
+          <a:prstGeom prst="rect">
+            <a:avLst/>
+          </a:prstGeom>
+        </p:spPr>
+      </p:pic>
+    </p:spTree>
+    <p:extLst>
+      <p:ext uri="{BB962C8B-B14F-4D97-AF65-F5344CB8AC3E}">
+        <p14:creationId xmlns:p14="http://schemas.microsoft.com/office/powerpoint/2010/main" val="2133512896"/>
+      </p:ext>
+    </p:extLst>
+  </p:cSld>
+  <p:clrMapOvr>
+    <a:masterClrMapping/>
+  </p:clrMapOvr>
+</p:sld>
+</file>
+
 <file path=ppt/theme/theme1.xml><?xml version="1.0" encoding="utf-8"?>
 <a:theme xmlns:a="http://schemas.openxmlformats.org/drawingml/2006/main" name="Office 2013 - 2022 Theme">
   <a:themeElements>

</xml_diff>

<commit_message>
Added: Output rewritten search query in search test
</commit_message>
<xml_diff>
--- a/OpenAI-BackendTools.pptx
+++ b/OpenAI-BackendTools.pptx
@@ -5,10 +5,10 @@
     <p:sldMasterId id="2147483678" r:id="rId1"/>
   </p:sldMasterIdLst>
   <p:notesMasterIdLst>
-    <p:notesMasterId r:id="rId10"/>
+    <p:notesMasterId r:id="rId11"/>
   </p:notesMasterIdLst>
   <p:handoutMasterIdLst>
-    <p:handoutMasterId r:id="rId11"/>
+    <p:handoutMasterId r:id="rId12"/>
   </p:handoutMasterIdLst>
   <p:sldIdLst>
     <p:sldId id="258" r:id="rId2"/>
@@ -17,8 +17,9 @@
     <p:sldId id="260" r:id="rId5"/>
     <p:sldId id="262" r:id="rId6"/>
     <p:sldId id="263" r:id="rId7"/>
-    <p:sldId id="264" r:id="rId8"/>
-    <p:sldId id="265" r:id="rId9"/>
+    <p:sldId id="266" r:id="rId8"/>
+    <p:sldId id="264" r:id="rId9"/>
+    <p:sldId id="265" r:id="rId10"/>
   </p:sldIdLst>
   <p:sldSz cx="9144000" cy="5715000" type="screen16x10"/>
   <p:notesSz cx="6797675" cy="9926638"/>
@@ -226,7 +227,7 @@
           <a:p>
             <a:fld id="{FC4BCF81-FD30-4738-8CD3-6C15724C57DB}" type="datetimeFigureOut">
               <a:rPr lang="en-GB" smtClean="0"/>
-              <a:t>27/05/2025</a:t>
+              <a:t>28/05/2025</a:t>
             </a:fld>
             <a:endParaRPr lang="en-GB"/>
           </a:p>
@@ -391,7 +392,7 @@
           <a:p>
             <a:fld id="{393C90FD-22B7-4ADA-A649-5A6995920D65}" type="datetimeFigureOut">
               <a:rPr lang="en-US" smtClean="0"/>
-              <a:t>5/27/2025</a:t>
+              <a:t>5/28/2025</a:t>
             </a:fld>
             <a:endParaRPr lang="en-US"/>
           </a:p>
@@ -26181,6 +26182,424 @@
           <a:p>
             <a:r>
               <a:rPr lang="en-US"/>
+              <a:t>Search Results with query rewrite</a:t>
+            </a:r>
+            <a:endParaRPr lang="en-CA"/>
+          </a:p>
+        </p:txBody>
+      </p:sp>
+      <p:pic>
+        <p:nvPicPr>
+          <p:cNvPr id="5" name="Picture 4">
+            <a:extLst>
+              <a:ext uri="{FF2B5EF4-FFF2-40B4-BE49-F238E27FC236}">
+                <a16:creationId xmlns:a16="http://schemas.microsoft.com/office/drawing/2014/main" id="{B3F73481-56AA-A374-D910-233D181C582F}"/>
+              </a:ext>
+            </a:extLst>
+          </p:cNvPr>
+          <p:cNvPicPr>
+            <a:picLocks noChangeAspect="1"/>
+          </p:cNvPicPr>
+          <p:nvPr/>
+        </p:nvPicPr>
+        <p:blipFill>
+          <a:blip r:embed="rId2"/>
+          <a:stretch>
+            <a:fillRect/>
+          </a:stretch>
+        </p:blipFill>
+        <p:spPr>
+          <a:xfrm>
+            <a:off x="371493" y="841276"/>
+            <a:ext cx="2930203" cy="4361518"/>
+          </a:xfrm>
+          <a:prstGeom prst="rect">
+            <a:avLst/>
+          </a:prstGeom>
+        </p:spPr>
+      </p:pic>
+      <p:pic>
+        <p:nvPicPr>
+          <p:cNvPr id="9" name="Picture 8">
+            <a:extLst>
+              <a:ext uri="{FF2B5EF4-FFF2-40B4-BE49-F238E27FC236}">
+                <a16:creationId xmlns:a16="http://schemas.microsoft.com/office/drawing/2014/main" id="{E00D3593-133D-E87E-55E6-ADA36B134A35}"/>
+              </a:ext>
+            </a:extLst>
+          </p:cNvPr>
+          <p:cNvPicPr>
+            <a:picLocks noChangeAspect="1"/>
+          </p:cNvPicPr>
+          <p:nvPr/>
+        </p:nvPicPr>
+        <p:blipFill>
+          <a:blip r:embed="rId3"/>
+          <a:stretch>
+            <a:fillRect/>
+          </a:stretch>
+        </p:blipFill>
+        <p:spPr>
+          <a:xfrm>
+            <a:off x="3851920" y="2001553"/>
+            <a:ext cx="4499238" cy="2222515"/>
+          </a:xfrm>
+          <a:prstGeom prst="rect">
+            <a:avLst/>
+          </a:prstGeom>
+        </p:spPr>
+      </p:pic>
+      <p:sp>
+        <p:nvSpPr>
+          <p:cNvPr id="10" name="TextBox 9">
+            <a:extLst>
+              <a:ext uri="{FF2B5EF4-FFF2-40B4-BE49-F238E27FC236}">
+                <a16:creationId xmlns:a16="http://schemas.microsoft.com/office/drawing/2014/main" id="{49F6B8BB-8B81-59FF-6EFC-B06F8FC8A913}"/>
+              </a:ext>
+            </a:extLst>
+          </p:cNvPr>
+          <p:cNvSpPr txBox="1"/>
+          <p:nvPr/>
+        </p:nvSpPr>
+        <p:spPr>
+          <a:xfrm>
+            <a:off x="3995936" y="950350"/>
+            <a:ext cx="3637214" cy="492443"/>
+          </a:xfrm>
+          <a:prstGeom prst="rect">
+            <a:avLst/>
+          </a:prstGeom>
+          <a:noFill/>
+        </p:spPr>
+        <p:txBody>
+          <a:bodyPr wrap="none" lIns="0" tIns="0" rIns="0" bIns="0" rtlCol="0">
+            <a:spAutoFit/>
+          </a:bodyPr>
+          <a:lstStyle/>
+          <a:p>
+            <a:r>
+              <a:rPr lang="en-US" sz="1600">
+                <a:solidFill>
+                  <a:srgbClr val="005AB4"/>
+                </a:solidFill>
+                <a:latin typeface="Arial Narrow" panose="020B0606020202030204" pitchFamily="34" charset="0"/>
+              </a:rPr>
+              <a:t>Query: </a:t>
+            </a:r>
+            <a:r>
+              <a:rPr lang="en-US" sz="1600" b="0">
+                <a:solidFill>
+                  <a:srgbClr val="00AA1E"/>
+                </a:solidFill>
+                <a:effectLst/>
+                <a:latin typeface="JetBrains Mono" panose="020B0509020102050004" pitchFamily="49" charset="0"/>
+              </a:rPr>
+              <a:t>All files from year 2015.</a:t>
+            </a:r>
+          </a:p>
+          <a:p>
+            <a:r>
+              <a:rPr lang="en-US" sz="1600">
+                <a:solidFill>
+                  <a:srgbClr val="005AB4"/>
+                </a:solidFill>
+                <a:latin typeface="Arial Narrow" panose="020B0606020202030204" pitchFamily="34" charset="0"/>
+              </a:rPr>
+              <a:t>Rewritten query: </a:t>
+            </a:r>
+            <a:r>
+              <a:rPr lang="en-US" sz="1600" b="0">
+                <a:solidFill>
+                  <a:srgbClr val="00AA1E"/>
+                </a:solidFill>
+                <a:effectLst/>
+                <a:latin typeface="JetBrains Mono" panose="020B0509020102050004" pitchFamily="49" charset="0"/>
+              </a:rPr>
+              <a:t>Files from 2015</a:t>
+            </a:r>
+            <a:endParaRPr lang="en-US" sz="1600" b="0">
+              <a:solidFill>
+                <a:srgbClr val="000000"/>
+              </a:solidFill>
+              <a:effectLst/>
+              <a:latin typeface="JetBrains Mono" panose="020B0509020102050004" pitchFamily="49" charset="0"/>
+            </a:endParaRPr>
+          </a:p>
+        </p:txBody>
+      </p:sp>
+      <p:sp>
+        <p:nvSpPr>
+          <p:cNvPr id="11" name="TextBox 10">
+            <a:extLst>
+              <a:ext uri="{FF2B5EF4-FFF2-40B4-BE49-F238E27FC236}">
+                <a16:creationId xmlns:a16="http://schemas.microsoft.com/office/drawing/2014/main" id="{F704FCAD-573D-6913-3585-7D3DAE4BDDCD}"/>
+              </a:ext>
+            </a:extLst>
+          </p:cNvPr>
+          <p:cNvSpPr txBox="1"/>
+          <p:nvPr/>
+        </p:nvSpPr>
+        <p:spPr>
+          <a:xfrm>
+            <a:off x="5292080" y="5305772"/>
+            <a:ext cx="2720296" cy="138499"/>
+          </a:xfrm>
+          <a:prstGeom prst="rect">
+            <a:avLst/>
+          </a:prstGeom>
+          <a:noFill/>
+        </p:spPr>
+        <p:txBody>
+          <a:bodyPr wrap="none" lIns="0" tIns="0" rIns="0" bIns="0" rtlCol="0">
+            <a:spAutoFit/>
+          </a:bodyPr>
+          <a:lstStyle/>
+          <a:p>
+            <a:pPr algn="l"/>
+            <a:r>
+              <a:rPr lang="en-CA" sz="900">
+                <a:solidFill>
+                  <a:srgbClr val="005AB4"/>
+                </a:solidFill>
+                <a:latin typeface="Arial Narrow" panose="020B0606020202030204" pitchFamily="34" charset="0"/>
+                <a:hlinkClick r:id="rId4"/>
+              </a:rPr>
+              <a:t>https://platform.openai.com/docs/guides/retrieval#query-rewriting</a:t>
+            </a:r>
+            <a:endParaRPr lang="en-CA" sz="900">
+              <a:solidFill>
+                <a:srgbClr val="005AB4"/>
+              </a:solidFill>
+              <a:latin typeface="Arial Narrow" panose="020B0606020202030204" pitchFamily="34" charset="0"/>
+            </a:endParaRPr>
+          </a:p>
+        </p:txBody>
+      </p:sp>
+      <p:sp>
+        <p:nvSpPr>
+          <p:cNvPr id="12" name="Rectangle 11">
+            <a:extLst>
+              <a:ext uri="{FF2B5EF4-FFF2-40B4-BE49-F238E27FC236}">
+                <a16:creationId xmlns:a16="http://schemas.microsoft.com/office/drawing/2014/main" id="{70B446C6-09BB-70F8-14FA-03EDECFA1AAB}"/>
+              </a:ext>
+            </a:extLst>
+          </p:cNvPr>
+          <p:cNvSpPr/>
+          <p:nvPr/>
+        </p:nvSpPr>
+        <p:spPr>
+          <a:xfrm>
+            <a:off x="506103" y="2059904"/>
+            <a:ext cx="1944216" cy="216024"/>
+          </a:xfrm>
+          <a:prstGeom prst="rect">
+            <a:avLst/>
+          </a:prstGeom>
+          <a:noFill/>
+          <a:ln w="25400">
+            <a:solidFill>
+              <a:srgbClr val="FF0000"/>
+            </a:solidFill>
+          </a:ln>
+        </p:spPr>
+        <p:style>
+          <a:lnRef idx="2">
+            <a:schemeClr val="accent1">
+              <a:shade val="15000"/>
+            </a:schemeClr>
+          </a:lnRef>
+          <a:fillRef idx="1">
+            <a:schemeClr val="accent1"/>
+          </a:fillRef>
+          <a:effectRef idx="0">
+            <a:schemeClr val="accent1"/>
+          </a:effectRef>
+          <a:fontRef idx="minor">
+            <a:schemeClr val="lt1"/>
+          </a:fontRef>
+        </p:style>
+        <p:txBody>
+          <a:bodyPr lIns="36000" tIns="36000" rIns="36000" bIns="36000" rtlCol="0" anchor="ctr"/>
+          <a:lstStyle/>
+          <a:p>
+            <a:pPr algn="ctr"/>
+            <a:endParaRPr lang="en-CA" sz="1600">
+              <a:solidFill>
+                <a:srgbClr val="005AB4"/>
+              </a:solidFill>
+              <a:latin typeface="Arial Narrow" panose="020B0606020202030204" pitchFamily="34" charset="0"/>
+            </a:endParaRPr>
+          </a:p>
+        </p:txBody>
+      </p:sp>
+      <p:sp>
+        <p:nvSpPr>
+          <p:cNvPr id="14" name="TextBox 13">
+            <a:extLst>
+              <a:ext uri="{FF2B5EF4-FFF2-40B4-BE49-F238E27FC236}">
+                <a16:creationId xmlns:a16="http://schemas.microsoft.com/office/drawing/2014/main" id="{E6CAB2A2-01ED-F6EE-DEB9-074B3A465E95}"/>
+              </a:ext>
+            </a:extLst>
+          </p:cNvPr>
+          <p:cNvSpPr txBox="1"/>
+          <p:nvPr/>
+        </p:nvSpPr>
+        <p:spPr>
+          <a:xfrm>
+            <a:off x="3874749" y="1544582"/>
+            <a:ext cx="4872208" cy="257122"/>
+          </a:xfrm>
+          <a:prstGeom prst="rect">
+            <a:avLst/>
+          </a:prstGeom>
+          <a:noFill/>
+        </p:spPr>
+        <p:txBody>
+          <a:bodyPr wrap="square">
+            <a:spAutoFit/>
+          </a:bodyPr>
+          <a:lstStyle/>
+          <a:p>
+            <a:pPr>
+              <a:lnSpc>
+                <a:spcPts val="1425"/>
+              </a:lnSpc>
+            </a:pPr>
+            <a:r>
+              <a:rPr lang="en-US" sz="900" b="0">
+                <a:solidFill>
+                  <a:srgbClr val="321EC8"/>
+                </a:solidFill>
+                <a:effectLst/>
+                <a:latin typeface="JetBrains Mono" panose="020B0509020102050004" pitchFamily="49" charset="0"/>
+              </a:rPr>
+              <a:t>rewritten_search_query</a:t>
+            </a:r>
+            <a:r>
+              <a:rPr lang="en-US" sz="900" b="0">
+                <a:solidFill>
+                  <a:srgbClr val="000000"/>
+                </a:solidFill>
+                <a:effectLst/>
+                <a:latin typeface="JetBrains Mono" panose="020B0509020102050004" pitchFamily="49" charset="0"/>
+              </a:rPr>
+              <a:t> </a:t>
+            </a:r>
+            <a:r>
+              <a:rPr lang="en-US" sz="900" b="0">
+                <a:solidFill>
+                  <a:srgbClr val="002B55"/>
+                </a:solidFill>
+                <a:effectLst/>
+                <a:latin typeface="JetBrains Mono" panose="020B0509020102050004" pitchFamily="49" charset="0"/>
+              </a:rPr>
+              <a:t>=</a:t>
+            </a:r>
+            <a:r>
+              <a:rPr lang="en-US" sz="900" b="0">
+                <a:solidFill>
+                  <a:srgbClr val="000000"/>
+                </a:solidFill>
+                <a:effectLst/>
+                <a:latin typeface="JetBrains Mono" panose="020B0509020102050004" pitchFamily="49" charset="0"/>
+              </a:rPr>
+              <a:t> </a:t>
+            </a:r>
+            <a:r>
+              <a:rPr lang="en-US" sz="900" b="0">
+                <a:solidFill>
+                  <a:srgbClr val="321EC8"/>
+                </a:solidFill>
+                <a:effectLst/>
+                <a:latin typeface="JetBrains Mono" panose="020B0509020102050004" pitchFamily="49" charset="0"/>
+              </a:rPr>
+              <a:t>search_results</a:t>
+            </a:r>
+            <a:r>
+              <a:rPr lang="en-US" sz="900" b="0">
+                <a:solidFill>
+                  <a:srgbClr val="000000"/>
+                </a:solidFill>
+                <a:effectLst/>
+                <a:latin typeface="JetBrains Mono" panose="020B0509020102050004" pitchFamily="49" charset="0"/>
+              </a:rPr>
+              <a:t>.model_extra[</a:t>
+            </a:r>
+            <a:r>
+              <a:rPr lang="en-US" sz="900" b="0">
+                <a:solidFill>
+                  <a:srgbClr val="00AA1E"/>
+                </a:solidFill>
+                <a:effectLst/>
+                <a:latin typeface="JetBrains Mono" panose="020B0509020102050004" pitchFamily="49" charset="0"/>
+              </a:rPr>
+              <a:t>'search_query'</a:t>
+            </a:r>
+            <a:r>
+              <a:rPr lang="en-US" sz="900" b="0">
+                <a:solidFill>
+                  <a:srgbClr val="000000"/>
+                </a:solidFill>
+                <a:effectLst/>
+                <a:latin typeface="JetBrains Mono" panose="020B0509020102050004" pitchFamily="49" charset="0"/>
+              </a:rPr>
+              <a:t>]</a:t>
+            </a:r>
+          </a:p>
+        </p:txBody>
+      </p:sp>
+    </p:spTree>
+    <p:extLst>
+      <p:ext uri="{BB962C8B-B14F-4D97-AF65-F5344CB8AC3E}">
+        <p14:creationId xmlns:p14="http://schemas.microsoft.com/office/powerpoint/2010/main" val="198766353"/>
+      </p:ext>
+    </p:extLst>
+  </p:cSld>
+  <p:clrMapOvr>
+    <a:masterClrMapping/>
+  </p:clrMapOvr>
+</p:sld>
+</file>
+
+<file path=ppt/slides/slide8.xml><?xml version="1.0" encoding="utf-8"?>
+<p:sld xmlns:a="http://schemas.openxmlformats.org/drawingml/2006/main" xmlns:r="http://schemas.openxmlformats.org/officeDocument/2006/relationships" xmlns:p="http://schemas.openxmlformats.org/presentationml/2006/main">
+  <p:cSld>
+    <p:spTree>
+      <p:nvGrpSpPr>
+        <p:cNvPr id="1" name=""/>
+        <p:cNvGrpSpPr/>
+        <p:nvPr/>
+      </p:nvGrpSpPr>
+      <p:grpSpPr>
+        <a:xfrm>
+          <a:off x="0" y="0"/>
+          <a:ext cx="0" cy="0"/>
+          <a:chOff x="0" y="0"/>
+          <a:chExt cx="0" cy="0"/>
+        </a:xfrm>
+      </p:grpSpPr>
+      <p:sp>
+        <p:nvSpPr>
+          <p:cNvPr id="2" name="Title 1">
+            <a:extLst>
+              <a:ext uri="{FF2B5EF4-FFF2-40B4-BE49-F238E27FC236}">
+                <a16:creationId xmlns:a16="http://schemas.microsoft.com/office/drawing/2014/main" id="{DA391E45-5173-E639-33B2-276F945F228B}"/>
+              </a:ext>
+            </a:extLst>
+          </p:cNvPr>
+          <p:cNvSpPr>
+            <a:spLocks noGrp="1"/>
+          </p:cNvSpPr>
+          <p:nvPr>
+            <p:ph type="title"/>
+          </p:nvPr>
+        </p:nvSpPr>
+        <p:spPr/>
+        <p:txBody>
+          <a:bodyPr/>
+          <a:lstStyle/>
+          <a:p>
+            <a:r>
+              <a:rPr lang="en-US"/>
               <a:t>Responses API with file_search</a:t>
             </a:r>
             <a:endParaRPr lang="en-CA"/>
@@ -26685,7 +27104,7 @@
 </p:sld>
 </file>
 
-<file path=ppt/slides/slide8.xml><?xml version="1.0" encoding="utf-8"?>
+<file path=ppt/slides/slide9.xml><?xml version="1.0" encoding="utf-8"?>
 <p:sld xmlns:a="http://schemas.openxmlformats.org/drawingml/2006/main" xmlns:r="http://schemas.openxmlformats.org/officeDocument/2006/relationships" xmlns:p="http://schemas.openxmlformats.org/presentationml/2006/main">
   <p:cSld>
     <p:spTree>

</xml_diff>

<commit_message>
Added: Grader evaluation using 'score_model'
</commit_message>
<xml_diff>
--- a/OpenAI-BackendTools.pptx
+++ b/OpenAI-BackendTools.pptx
@@ -5,10 +5,10 @@
     <p:sldMasterId id="2147483678" r:id="rId1"/>
   </p:sldMasterIdLst>
   <p:notesMasterIdLst>
-    <p:notesMasterId r:id="rId13"/>
+    <p:notesMasterId r:id="rId15"/>
   </p:notesMasterIdLst>
   <p:handoutMasterIdLst>
-    <p:handoutMasterId r:id="rId14"/>
+    <p:handoutMasterId r:id="rId16"/>
   </p:handoutMasterIdLst>
   <p:sldIdLst>
     <p:sldId id="258" r:id="rId2"/>
@@ -22,6 +22,8 @@
     <p:sldId id="266" r:id="rId10"/>
     <p:sldId id="264" r:id="rId11"/>
     <p:sldId id="265" r:id="rId12"/>
+    <p:sldId id="269" r:id="rId13"/>
+    <p:sldId id="270" r:id="rId14"/>
   </p:sldIdLst>
   <p:sldSz cx="9144000" cy="5715000" type="screen16x10"/>
   <p:notesSz cx="6797675" cy="9926638"/>
@@ -229,7 +231,7 @@
           <a:p>
             <a:fld id="{FC4BCF81-FD30-4738-8CD3-6C15724C57DB}" type="datetimeFigureOut">
               <a:rPr lang="en-GB" smtClean="0"/>
-              <a:t>19/07/2025</a:t>
+              <a:t>21/07/2025</a:t>
             </a:fld>
             <a:endParaRPr lang="en-GB"/>
           </a:p>
@@ -394,7 +396,7 @@
           <a:p>
             <a:fld id="{393C90FD-22B7-4ADA-A649-5A6995920D65}" type="datetimeFigureOut">
               <a:rPr lang="en-US" smtClean="0"/>
-              <a:t>7/19/2025</a:t>
+              <a:t>7/21/2025</a:t>
             </a:fld>
             <a:endParaRPr lang="en-US"/>
           </a:p>
@@ -19218,6 +19220,346 @@
     <p:extLst>
       <p:ext uri="{BB962C8B-B14F-4D97-AF65-F5344CB8AC3E}">
         <p14:creationId xmlns:p14="http://schemas.microsoft.com/office/powerpoint/2010/main" val="2542428014"/>
+      </p:ext>
+    </p:extLst>
+  </p:cSld>
+  <p:clrMapOvr>
+    <a:masterClrMapping/>
+  </p:clrMapOvr>
+</p:sld>
+</file>
+
+<file path=ppt/slides/slide12.xml><?xml version="1.0" encoding="utf-8"?>
+<p:sld xmlns:a="http://schemas.openxmlformats.org/drawingml/2006/main" xmlns:r="http://schemas.openxmlformats.org/officeDocument/2006/relationships" xmlns:p="http://schemas.openxmlformats.org/presentationml/2006/main">
+  <p:cSld>
+    <p:spTree>
+      <p:nvGrpSpPr>
+        <p:cNvPr id="1" name=""/>
+        <p:cNvGrpSpPr/>
+        <p:nvPr/>
+      </p:nvGrpSpPr>
+      <p:grpSpPr>
+        <a:xfrm>
+          <a:off x="0" y="0"/>
+          <a:ext cx="0" cy="0"/>
+          <a:chOff x="0" y="0"/>
+          <a:chExt cx="0" cy="0"/>
+        </a:xfrm>
+      </p:grpSpPr>
+      <p:sp>
+        <p:nvSpPr>
+          <p:cNvPr id="2" name="Title 1">
+            <a:extLst>
+              <a:ext uri="{FF2B5EF4-FFF2-40B4-BE49-F238E27FC236}">
+                <a16:creationId xmlns:a16="http://schemas.microsoft.com/office/drawing/2014/main" id="{DA391E45-5173-E639-33B2-276F945F228B}"/>
+              </a:ext>
+            </a:extLst>
+          </p:cNvPr>
+          <p:cNvSpPr>
+            <a:spLocks noGrp="1"/>
+          </p:cNvSpPr>
+          <p:nvPr>
+            <p:ph type="title"/>
+          </p:nvPr>
+        </p:nvSpPr>
+        <p:spPr/>
+        <p:txBody>
+          <a:bodyPr/>
+          <a:lstStyle/>
+          <a:p>
+            <a:r>
+              <a:rPr lang="en-US"/>
+              <a:t>Evals</a:t>
+            </a:r>
+            <a:endParaRPr lang="en-CA"/>
+          </a:p>
+        </p:txBody>
+      </p:sp>
+      <p:pic>
+        <p:nvPicPr>
+          <p:cNvPr id="10" name="Picture 9">
+            <a:extLst>
+              <a:ext uri="{FF2B5EF4-FFF2-40B4-BE49-F238E27FC236}">
+                <a16:creationId xmlns:a16="http://schemas.microsoft.com/office/drawing/2014/main" id="{9062CECC-C62F-3843-CB62-41381A44FC60}"/>
+              </a:ext>
+            </a:extLst>
+          </p:cNvPr>
+          <p:cNvPicPr>
+            <a:picLocks noChangeAspect="1"/>
+          </p:cNvPicPr>
+          <p:nvPr/>
+        </p:nvPicPr>
+        <p:blipFill>
+          <a:blip r:embed="rId2"/>
+          <a:stretch>
+            <a:fillRect/>
+          </a:stretch>
+        </p:blipFill>
+        <p:spPr>
+          <a:xfrm>
+            <a:off x="7020272" y="811345"/>
+            <a:ext cx="1261981" cy="881558"/>
+          </a:xfrm>
+          <a:prstGeom prst="rect">
+            <a:avLst/>
+          </a:prstGeom>
+          <a:effectLst>
+            <a:outerShdw blurRad="165100" dir="2700000" algn="tl" rotWithShape="0">
+              <a:prstClr val="black">
+                <a:alpha val="20000"/>
+              </a:prstClr>
+            </a:outerShdw>
+          </a:effectLst>
+        </p:spPr>
+      </p:pic>
+      <p:pic>
+        <p:nvPicPr>
+          <p:cNvPr id="12" name="Picture 11">
+            <a:extLst>
+              <a:ext uri="{FF2B5EF4-FFF2-40B4-BE49-F238E27FC236}">
+                <a16:creationId xmlns:a16="http://schemas.microsoft.com/office/drawing/2014/main" id="{C754A429-5EE9-C752-C10D-32BFBFF23899}"/>
+              </a:ext>
+            </a:extLst>
+          </p:cNvPr>
+          <p:cNvPicPr>
+            <a:picLocks noChangeAspect="1"/>
+          </p:cNvPicPr>
+          <p:nvPr/>
+        </p:nvPicPr>
+        <p:blipFill>
+          <a:blip r:embed="rId3"/>
+          <a:stretch>
+            <a:fillRect/>
+          </a:stretch>
+        </p:blipFill>
+        <p:spPr>
+          <a:xfrm>
+            <a:off x="205801" y="831116"/>
+            <a:ext cx="3548180" cy="2842201"/>
+          </a:xfrm>
+          <a:prstGeom prst="rect">
+            <a:avLst/>
+          </a:prstGeom>
+          <a:effectLst>
+            <a:outerShdw blurRad="165100" dir="2700000" algn="tl" rotWithShape="0">
+              <a:prstClr val="black">
+                <a:alpha val="20000"/>
+              </a:prstClr>
+            </a:outerShdw>
+          </a:effectLst>
+        </p:spPr>
+      </p:pic>
+      <p:pic>
+        <p:nvPicPr>
+          <p:cNvPr id="14" name="Picture 13">
+            <a:extLst>
+              <a:ext uri="{FF2B5EF4-FFF2-40B4-BE49-F238E27FC236}">
+                <a16:creationId xmlns:a16="http://schemas.microsoft.com/office/drawing/2014/main" id="{FF63CC6A-6145-3E35-6558-74D3CF0FFEBF}"/>
+              </a:ext>
+            </a:extLst>
+          </p:cNvPr>
+          <p:cNvPicPr>
+            <a:picLocks noChangeAspect="1"/>
+          </p:cNvPicPr>
+          <p:nvPr/>
+        </p:nvPicPr>
+        <p:blipFill>
+          <a:blip r:embed="rId4"/>
+          <a:stretch>
+            <a:fillRect/>
+          </a:stretch>
+        </p:blipFill>
+        <p:spPr>
+          <a:xfrm>
+            <a:off x="207916" y="3865612"/>
+            <a:ext cx="4246842" cy="1159560"/>
+          </a:xfrm>
+          <a:prstGeom prst="rect">
+            <a:avLst/>
+          </a:prstGeom>
+          <a:effectLst>
+            <a:outerShdw blurRad="165100" dir="2700000" algn="tl" rotWithShape="0">
+              <a:prstClr val="black">
+                <a:alpha val="20000"/>
+              </a:prstClr>
+            </a:outerShdw>
+          </a:effectLst>
+        </p:spPr>
+      </p:pic>
+      <p:pic>
+        <p:nvPicPr>
+          <p:cNvPr id="8" name="Picture 7">
+            <a:extLst>
+              <a:ext uri="{FF2B5EF4-FFF2-40B4-BE49-F238E27FC236}">
+                <a16:creationId xmlns:a16="http://schemas.microsoft.com/office/drawing/2014/main" id="{6257E391-8D3B-9DD5-DE49-009EFBA6BF89}"/>
+              </a:ext>
+            </a:extLst>
+          </p:cNvPr>
+          <p:cNvPicPr>
+            <a:picLocks noChangeAspect="1"/>
+          </p:cNvPicPr>
+          <p:nvPr/>
+        </p:nvPicPr>
+        <p:blipFill>
+          <a:blip r:embed="rId5"/>
+          <a:stretch>
+            <a:fillRect/>
+          </a:stretch>
+        </p:blipFill>
+        <p:spPr>
+          <a:xfrm>
+            <a:off x="4725887" y="795729"/>
+            <a:ext cx="2165487" cy="2202066"/>
+          </a:xfrm>
+          <a:prstGeom prst="rect">
+            <a:avLst/>
+          </a:prstGeom>
+          <a:effectLst>
+            <a:outerShdw blurRad="165100" dir="2700000" algn="tl" rotWithShape="0">
+              <a:prstClr val="black">
+                <a:alpha val="20000"/>
+              </a:prstClr>
+            </a:outerShdw>
+          </a:effectLst>
+        </p:spPr>
+      </p:pic>
+      <p:pic>
+        <p:nvPicPr>
+          <p:cNvPr id="5" name="Picture 4">
+            <a:extLst>
+              <a:ext uri="{FF2B5EF4-FFF2-40B4-BE49-F238E27FC236}">
+                <a16:creationId xmlns:a16="http://schemas.microsoft.com/office/drawing/2014/main" id="{AC8F0BAB-4583-3649-9B32-1C28914E65E0}"/>
+              </a:ext>
+            </a:extLst>
+          </p:cNvPr>
+          <p:cNvPicPr>
+            <a:picLocks noChangeAspect="1"/>
+          </p:cNvPicPr>
+          <p:nvPr/>
+        </p:nvPicPr>
+        <p:blipFill>
+          <a:blip r:embed="rId6"/>
+          <a:stretch>
+            <a:fillRect/>
+          </a:stretch>
+        </p:blipFill>
+        <p:spPr>
+          <a:xfrm>
+            <a:off x="4725887" y="3073524"/>
+            <a:ext cx="4177341" cy="2432515"/>
+          </a:xfrm>
+          <a:prstGeom prst="rect">
+            <a:avLst/>
+          </a:prstGeom>
+          <a:effectLst>
+            <a:outerShdw blurRad="165100" dir="2700000" algn="tl" rotWithShape="0">
+              <a:prstClr val="black">
+                <a:alpha val="20000"/>
+              </a:prstClr>
+            </a:outerShdw>
+          </a:effectLst>
+        </p:spPr>
+      </p:pic>
+    </p:spTree>
+    <p:extLst>
+      <p:ext uri="{BB962C8B-B14F-4D97-AF65-F5344CB8AC3E}">
+        <p14:creationId xmlns:p14="http://schemas.microsoft.com/office/powerpoint/2010/main" val="544718404"/>
+      </p:ext>
+    </p:extLst>
+  </p:cSld>
+  <p:clrMapOvr>
+    <a:masterClrMapping/>
+  </p:clrMapOvr>
+</p:sld>
+</file>
+
+<file path=ppt/slides/slide13.xml><?xml version="1.0" encoding="utf-8"?>
+<p:sld xmlns:a="http://schemas.openxmlformats.org/drawingml/2006/main" xmlns:r="http://schemas.openxmlformats.org/officeDocument/2006/relationships" xmlns:p="http://schemas.openxmlformats.org/presentationml/2006/main">
+  <p:cSld>
+    <p:spTree>
+      <p:nvGrpSpPr>
+        <p:cNvPr id="1" name=""/>
+        <p:cNvGrpSpPr/>
+        <p:nvPr/>
+      </p:nvGrpSpPr>
+      <p:grpSpPr>
+        <a:xfrm>
+          <a:off x="0" y="0"/>
+          <a:ext cx="0" cy="0"/>
+          <a:chOff x="0" y="0"/>
+          <a:chExt cx="0" cy="0"/>
+        </a:xfrm>
+      </p:grpSpPr>
+      <p:sp>
+        <p:nvSpPr>
+          <p:cNvPr id="2" name="Title 1">
+            <a:extLst>
+              <a:ext uri="{FF2B5EF4-FFF2-40B4-BE49-F238E27FC236}">
+                <a16:creationId xmlns:a16="http://schemas.microsoft.com/office/drawing/2014/main" id="{DA391E45-5173-E639-33B2-276F945F228B}"/>
+              </a:ext>
+            </a:extLst>
+          </p:cNvPr>
+          <p:cNvSpPr>
+            <a:spLocks noGrp="1"/>
+          </p:cNvSpPr>
+          <p:nvPr>
+            <p:ph type="title"/>
+          </p:nvPr>
+        </p:nvSpPr>
+        <p:spPr/>
+        <p:txBody>
+          <a:bodyPr/>
+          <a:lstStyle/>
+          <a:p>
+            <a:r>
+              <a:rPr lang="en-US"/>
+              <a:t>Evals</a:t>
+            </a:r>
+            <a:endParaRPr lang="en-CA"/>
+          </a:p>
+        </p:txBody>
+      </p:sp>
+      <p:pic>
+        <p:nvPicPr>
+          <p:cNvPr id="5" name="Picture 4">
+            <a:extLst>
+              <a:ext uri="{FF2B5EF4-FFF2-40B4-BE49-F238E27FC236}">
+                <a16:creationId xmlns:a16="http://schemas.microsoft.com/office/drawing/2014/main" id="{AC8F0BAB-4583-3649-9B32-1C28914E65E0}"/>
+              </a:ext>
+            </a:extLst>
+          </p:cNvPr>
+          <p:cNvPicPr>
+            <a:picLocks noChangeAspect="1"/>
+          </p:cNvPicPr>
+          <p:nvPr/>
+        </p:nvPicPr>
+        <p:blipFill>
+          <a:blip r:embed="rId2"/>
+          <a:stretch>
+            <a:fillRect/>
+          </a:stretch>
+        </p:blipFill>
+        <p:spPr>
+          <a:xfrm>
+            <a:off x="4725887" y="3073524"/>
+            <a:ext cx="4177341" cy="2432515"/>
+          </a:xfrm>
+          <a:prstGeom prst="rect">
+            <a:avLst/>
+          </a:prstGeom>
+          <a:effectLst>
+            <a:outerShdw blurRad="165100" dir="2700000" algn="tl" rotWithShape="0">
+              <a:prstClr val="black">
+                <a:alpha val="20000"/>
+              </a:prstClr>
+            </a:outerShdw>
+          </a:effectLst>
+        </p:spPr>
+      </p:pic>
+    </p:spTree>
+    <p:extLst>
+      <p:ext uri="{BB962C8B-B14F-4D97-AF65-F5344CB8AC3E}">
+        <p14:creationId xmlns:p14="http://schemas.microsoft.com/office/powerpoint/2010/main" val="284354502"/>
       </p:ext>
     </p:extLst>
   </p:cSld>
@@ -23833,6 +24175,144 @@
           </a:p>
         </p:txBody>
       </p:sp>
+      <p:grpSp>
+        <p:nvGrpSpPr>
+          <p:cNvPr id="7" name="Group 6">
+            <a:extLst>
+              <a:ext uri="{FF2B5EF4-FFF2-40B4-BE49-F238E27FC236}">
+                <a16:creationId xmlns:a16="http://schemas.microsoft.com/office/drawing/2014/main" id="{FA82D3FC-0644-105F-F237-341AD1636C01}"/>
+              </a:ext>
+            </a:extLst>
+          </p:cNvPr>
+          <p:cNvGrpSpPr/>
+          <p:nvPr/>
+        </p:nvGrpSpPr>
+        <p:grpSpPr>
+          <a:xfrm>
+            <a:off x="3952675" y="3936892"/>
+            <a:ext cx="1051373" cy="370229"/>
+            <a:chOff x="3952675" y="3936892"/>
+            <a:chExt cx="1051373" cy="370229"/>
+          </a:xfrm>
+          <a:effectLst>
+            <a:outerShdw blurRad="127000" dist="38100" dir="2700000" algn="tl" rotWithShape="0">
+              <a:prstClr val="black">
+                <a:alpha val="20000"/>
+              </a:prstClr>
+            </a:outerShdw>
+          </a:effectLst>
+        </p:grpSpPr>
+        <p:sp>
+          <p:nvSpPr>
+            <p:cNvPr id="3" name="TextBox 2">
+              <a:extLst>
+                <a:ext uri="{FF2B5EF4-FFF2-40B4-BE49-F238E27FC236}">
+                  <a16:creationId xmlns:a16="http://schemas.microsoft.com/office/drawing/2014/main" id="{D5E33521-3F98-8E4A-41D0-55E74F9FFBD3}"/>
+                </a:ext>
+              </a:extLst>
+            </p:cNvPr>
+            <p:cNvSpPr txBox="1"/>
+            <p:nvPr/>
+          </p:nvSpPr>
+          <p:spPr>
+            <a:xfrm>
+              <a:off x="4082689" y="3936892"/>
+              <a:ext cx="921359" cy="245058"/>
+            </a:xfrm>
+            <a:prstGeom prst="rect">
+              <a:avLst/>
+            </a:prstGeom>
+            <a:solidFill>
+              <a:srgbClr val="FF0000"/>
+            </a:solidFill>
+          </p:spPr>
+          <p:txBody>
+            <a:bodyPr wrap="square" lIns="36000" tIns="36000" rIns="36000" bIns="36000" rtlCol="0">
+              <a:spAutoFit/>
+            </a:bodyPr>
+            <a:lstStyle/>
+            <a:p>
+              <a:pPr algn="l">
+                <a:lnSpc>
+                  <a:spcPct val="80000"/>
+                </a:lnSpc>
+              </a:pPr>
+              <a:r>
+                <a:rPr lang="en-US" sz="700" b="1">
+                  <a:solidFill>
+                    <a:schemeClr val="bg1"/>
+                  </a:solidFill>
+                  <a:latin typeface="Arial Narrow" panose="020B0606020202030204" pitchFamily="34" charset="0"/>
+                </a:rPr>
+                <a:t>Only for files generated by assistants</a:t>
+              </a:r>
+              <a:endParaRPr lang="en-CA" sz="700" b="1">
+                <a:solidFill>
+                  <a:schemeClr val="bg1"/>
+                </a:solidFill>
+                <a:latin typeface="Arial Narrow" panose="020B0606020202030204" pitchFamily="34" charset="0"/>
+              </a:endParaRPr>
+            </a:p>
+          </p:txBody>
+        </p:sp>
+        <p:sp>
+          <p:nvSpPr>
+            <p:cNvPr id="5" name="Arrow: Right 4">
+              <a:extLst>
+                <a:ext uri="{FF2B5EF4-FFF2-40B4-BE49-F238E27FC236}">
+                  <a16:creationId xmlns:a16="http://schemas.microsoft.com/office/drawing/2014/main" id="{AF7D35AC-A919-ACAC-3EBC-9C7B60E55A6A}"/>
+                </a:ext>
+              </a:extLst>
+            </p:cNvPr>
+            <p:cNvSpPr/>
+            <p:nvPr/>
+          </p:nvSpPr>
+          <p:spPr>
+            <a:xfrm rot="8100000">
+              <a:off x="3952675" y="4113351"/>
+              <a:ext cx="193770" cy="193770"/>
+            </a:xfrm>
+            <a:prstGeom prst="rightArrow">
+              <a:avLst/>
+            </a:prstGeom>
+            <a:solidFill>
+              <a:srgbClr val="FF0000"/>
+            </a:solidFill>
+            <a:ln>
+              <a:noFill/>
+            </a:ln>
+          </p:spPr>
+          <p:style>
+            <a:lnRef idx="2">
+              <a:schemeClr val="accent1">
+                <a:shade val="15000"/>
+              </a:schemeClr>
+            </a:lnRef>
+            <a:fillRef idx="1">
+              <a:schemeClr val="accent1"/>
+            </a:fillRef>
+            <a:effectRef idx="0">
+              <a:schemeClr val="accent1"/>
+            </a:effectRef>
+            <a:fontRef idx="minor">
+              <a:schemeClr val="lt1"/>
+            </a:fontRef>
+          </p:style>
+          <p:txBody>
+            <a:bodyPr lIns="36000" tIns="36000" rIns="36000" bIns="36000" rtlCol="0" anchor="ctr"/>
+            <a:lstStyle/>
+            <a:p>
+              <a:pPr algn="ctr"/>
+              <a:endParaRPr lang="en-CA" sz="1600">
+                <a:solidFill>
+                  <a:srgbClr val="005AB4"/>
+                </a:solidFill>
+                <a:latin typeface="Arial Narrow" panose="020B0606020202030204" pitchFamily="34" charset="0"/>
+              </a:endParaRPr>
+            </a:p>
+          </p:txBody>
+        </p:sp>
+      </p:grpSp>
     </p:spTree>
     <p:extLst>
       <p:ext uri="{BB962C8B-B14F-4D97-AF65-F5344CB8AC3E}">

</xml_diff>

<commit_message>
Added: measure_score_model_variability() and langchain open evals correctness prompt as judge_model_prompt_template_3
</commit_message>
<xml_diff>
--- a/OpenAI-BackendTools.pptx
+++ b/OpenAI-BackendTools.pptx
@@ -5,10 +5,10 @@
     <p:sldMasterId id="2147483678" r:id="rId1"/>
   </p:sldMasterIdLst>
   <p:notesMasterIdLst>
-    <p:notesMasterId r:id="rId15"/>
+    <p:notesMasterId r:id="rId17"/>
   </p:notesMasterIdLst>
   <p:handoutMasterIdLst>
-    <p:handoutMasterId r:id="rId16"/>
+    <p:handoutMasterId r:id="rId18"/>
   </p:handoutMasterIdLst>
   <p:sldIdLst>
     <p:sldId id="258" r:id="rId2"/>
@@ -24,6 +24,8 @@
     <p:sldId id="265" r:id="rId12"/>
     <p:sldId id="269" r:id="rId13"/>
     <p:sldId id="270" r:id="rId14"/>
+    <p:sldId id="271" r:id="rId15"/>
+    <p:sldId id="272" r:id="rId16"/>
   </p:sldIdLst>
   <p:sldSz cx="9144000" cy="5715000" type="screen16x10"/>
   <p:notesSz cx="6797675" cy="9926638"/>
@@ -231,7 +233,7 @@
           <a:p>
             <a:fld id="{FC4BCF81-FD30-4738-8CD3-6C15724C57DB}" type="datetimeFigureOut">
               <a:rPr lang="en-GB" smtClean="0"/>
-              <a:t>21/07/2025</a:t>
+              <a:t>23/07/2025</a:t>
             </a:fld>
             <a:endParaRPr lang="en-GB"/>
           </a:p>
@@ -396,7 +398,7 @@
           <a:p>
             <a:fld id="{393C90FD-22B7-4ADA-A649-5A6995920D65}" type="datetimeFigureOut">
               <a:rPr lang="en-US" smtClean="0"/>
-              <a:t>7/21/2025</a:t>
+              <a:t>7/23/2025</a:t>
             </a:fld>
             <a:endParaRPr lang="en-US"/>
           </a:p>
@@ -19560,6 +19562,1006 @@
     <p:extLst>
       <p:ext uri="{BB962C8B-B14F-4D97-AF65-F5344CB8AC3E}">
         <p14:creationId xmlns:p14="http://schemas.microsoft.com/office/powerpoint/2010/main" val="284354502"/>
+      </p:ext>
+    </p:extLst>
+  </p:cSld>
+  <p:clrMapOvr>
+    <a:masterClrMapping/>
+  </p:clrMapOvr>
+</p:sld>
+</file>
+
+<file path=ppt/slides/slide14.xml><?xml version="1.0" encoding="utf-8"?>
+<p:sld xmlns:a="http://schemas.openxmlformats.org/drawingml/2006/main" xmlns:r="http://schemas.openxmlformats.org/officeDocument/2006/relationships" xmlns:p="http://schemas.openxmlformats.org/presentationml/2006/main">
+  <p:cSld>
+    <p:spTree>
+      <p:nvGrpSpPr>
+        <p:cNvPr id="1" name=""/>
+        <p:cNvGrpSpPr/>
+        <p:nvPr/>
+      </p:nvGrpSpPr>
+      <p:grpSpPr>
+        <a:xfrm>
+          <a:off x="0" y="0"/>
+          <a:ext cx="0" cy="0"/>
+          <a:chOff x="0" y="0"/>
+          <a:chExt cx="0" cy="0"/>
+        </a:xfrm>
+      </p:grpSpPr>
+      <p:sp>
+        <p:nvSpPr>
+          <p:cNvPr id="2" name="Title 1">
+            <a:extLst>
+              <a:ext uri="{FF2B5EF4-FFF2-40B4-BE49-F238E27FC236}">
+                <a16:creationId xmlns:a16="http://schemas.microsoft.com/office/drawing/2014/main" id="{DA391E45-5173-E639-33B2-276F945F228B}"/>
+              </a:ext>
+            </a:extLst>
+          </p:cNvPr>
+          <p:cNvSpPr>
+            <a:spLocks noGrp="1"/>
+          </p:cNvSpPr>
+          <p:nvPr>
+            <p:ph type="title"/>
+          </p:nvPr>
+        </p:nvSpPr>
+        <p:spPr/>
+        <p:txBody>
+          <a:bodyPr/>
+          <a:lstStyle/>
+          <a:p>
+            <a:r>
+              <a:rPr lang="en-US"/>
+              <a:t>Evaluation Types</a:t>
+            </a:r>
+            <a:endParaRPr lang="en-CA"/>
+          </a:p>
+        </p:txBody>
+      </p:sp>
+      <p:sp>
+        <p:nvSpPr>
+          <p:cNvPr id="4" name="Rectangle: Rounded Corners 3">
+            <a:extLst>
+              <a:ext uri="{FF2B5EF4-FFF2-40B4-BE49-F238E27FC236}">
+                <a16:creationId xmlns:a16="http://schemas.microsoft.com/office/drawing/2014/main" id="{F48378E1-7C9C-3EC1-65F1-DF9C5B09A09D}"/>
+              </a:ext>
+            </a:extLst>
+          </p:cNvPr>
+          <p:cNvSpPr/>
+          <p:nvPr/>
+        </p:nvSpPr>
+        <p:spPr>
+          <a:xfrm>
+            <a:off x="539552" y="1201316"/>
+            <a:ext cx="684000" cy="180000"/>
+          </a:xfrm>
+          <a:prstGeom prst="roundRect">
+            <a:avLst/>
+          </a:prstGeom>
+          <a:solidFill>
+            <a:srgbClr val="1064AF"/>
+          </a:solidFill>
+          <a:ln>
+            <a:solidFill>
+              <a:srgbClr val="1D5B93"/>
+            </a:solidFill>
+          </a:ln>
+          <a:effectLst>
+            <a:outerShdw blurRad="50800" dist="38100" dir="2700000" algn="tl" rotWithShape="0">
+              <a:prstClr val="black">
+                <a:alpha val="20000"/>
+              </a:prstClr>
+            </a:outerShdw>
+          </a:effectLst>
+        </p:spPr>
+        <p:style>
+          <a:lnRef idx="2">
+            <a:schemeClr val="accent1">
+              <a:shade val="15000"/>
+            </a:schemeClr>
+          </a:lnRef>
+          <a:fillRef idx="1">
+            <a:schemeClr val="accent1"/>
+          </a:fillRef>
+          <a:effectRef idx="0">
+            <a:schemeClr val="accent1"/>
+          </a:effectRef>
+          <a:fontRef idx="minor">
+            <a:schemeClr val="lt1"/>
+          </a:fontRef>
+        </p:style>
+        <p:txBody>
+          <a:bodyPr lIns="0" tIns="36000" rIns="0" bIns="0" rtlCol="0" anchor="ctr"/>
+          <a:lstStyle/>
+          <a:p>
+            <a:pPr algn="ctr">
+              <a:lnSpc>
+                <a:spcPct val="80000"/>
+              </a:lnSpc>
+            </a:pPr>
+            <a:r>
+              <a:rPr lang="en-US" sz="1000" b="1">
+                <a:solidFill>
+                  <a:schemeClr val="bg1"/>
+                </a:solidFill>
+                <a:latin typeface="Arial Narrow" panose="020B0606020202030204" pitchFamily="34" charset="0"/>
+              </a:rPr>
+              <a:t>Questions</a:t>
+            </a:r>
+            <a:endParaRPr lang="en-CA" sz="1000" b="1">
+              <a:solidFill>
+                <a:schemeClr val="bg1"/>
+              </a:solidFill>
+              <a:latin typeface="Arial Narrow" panose="020B0606020202030204" pitchFamily="34" charset="0"/>
+            </a:endParaRPr>
+          </a:p>
+        </p:txBody>
+      </p:sp>
+      <p:sp>
+        <p:nvSpPr>
+          <p:cNvPr id="6" name="Rectangle: Rounded Corners 5">
+            <a:extLst>
+              <a:ext uri="{FF2B5EF4-FFF2-40B4-BE49-F238E27FC236}">
+                <a16:creationId xmlns:a16="http://schemas.microsoft.com/office/drawing/2014/main" id="{98223F9B-6C78-78BB-3C69-756C4C7FF405}"/>
+              </a:ext>
+            </a:extLst>
+          </p:cNvPr>
+          <p:cNvSpPr/>
+          <p:nvPr/>
+        </p:nvSpPr>
+        <p:spPr>
+          <a:xfrm>
+            <a:off x="1403648" y="1201316"/>
+            <a:ext cx="684000" cy="180000"/>
+          </a:xfrm>
+          <a:prstGeom prst="roundRect">
+            <a:avLst/>
+          </a:prstGeom>
+          <a:solidFill>
+            <a:srgbClr val="883588"/>
+          </a:solidFill>
+          <a:ln>
+            <a:solidFill>
+              <a:srgbClr val="6D316D"/>
+            </a:solidFill>
+          </a:ln>
+          <a:effectLst>
+            <a:outerShdw blurRad="50800" dist="38100" dir="2700000" algn="tl" rotWithShape="0">
+              <a:prstClr val="black">
+                <a:alpha val="20000"/>
+              </a:prstClr>
+            </a:outerShdw>
+          </a:effectLst>
+        </p:spPr>
+        <p:style>
+          <a:lnRef idx="2">
+            <a:schemeClr val="accent1">
+              <a:shade val="15000"/>
+            </a:schemeClr>
+          </a:lnRef>
+          <a:fillRef idx="1">
+            <a:schemeClr val="accent1"/>
+          </a:fillRef>
+          <a:effectRef idx="0">
+            <a:schemeClr val="accent1"/>
+          </a:effectRef>
+          <a:fontRef idx="minor">
+            <a:schemeClr val="lt1"/>
+          </a:fontRef>
+        </p:style>
+        <p:txBody>
+          <a:bodyPr lIns="0" tIns="36000" rIns="0" bIns="0" rtlCol="0" anchor="ctr"/>
+          <a:lstStyle/>
+          <a:p>
+            <a:pPr algn="ctr">
+              <a:lnSpc>
+                <a:spcPct val="80000"/>
+              </a:lnSpc>
+            </a:pPr>
+            <a:r>
+              <a:rPr lang="en-US" sz="1000" b="1">
+                <a:solidFill>
+                  <a:schemeClr val="bg1"/>
+                </a:solidFill>
+                <a:latin typeface="Arial Narrow" panose="020B0606020202030204" pitchFamily="34" charset="0"/>
+              </a:rPr>
+              <a:t>Answers</a:t>
+            </a:r>
+            <a:endParaRPr lang="en-CA" sz="1000" b="1">
+              <a:solidFill>
+                <a:schemeClr val="bg1"/>
+              </a:solidFill>
+              <a:latin typeface="Arial Narrow" panose="020B0606020202030204" pitchFamily="34" charset="0"/>
+            </a:endParaRPr>
+          </a:p>
+        </p:txBody>
+      </p:sp>
+      <p:sp>
+        <p:nvSpPr>
+          <p:cNvPr id="7" name="Rectangle: Rounded Corners 6">
+            <a:extLst>
+              <a:ext uri="{FF2B5EF4-FFF2-40B4-BE49-F238E27FC236}">
+                <a16:creationId xmlns:a16="http://schemas.microsoft.com/office/drawing/2014/main" id="{6365AED6-626A-14A8-25A8-C3667C1838DA}"/>
+              </a:ext>
+            </a:extLst>
+          </p:cNvPr>
+          <p:cNvSpPr/>
+          <p:nvPr/>
+        </p:nvSpPr>
+        <p:spPr>
+          <a:xfrm>
+            <a:off x="2267744" y="1201316"/>
+            <a:ext cx="864096" cy="180000"/>
+          </a:xfrm>
+          <a:prstGeom prst="roundRect">
+            <a:avLst/>
+          </a:prstGeom>
+          <a:solidFill>
+            <a:srgbClr val="009245"/>
+          </a:solidFill>
+          <a:ln>
+            <a:solidFill>
+              <a:srgbClr val="07793D"/>
+            </a:solidFill>
+          </a:ln>
+          <a:effectLst>
+            <a:outerShdw blurRad="50800" dist="38100" dir="2700000" algn="tl" rotWithShape="0">
+              <a:prstClr val="black">
+                <a:alpha val="20000"/>
+              </a:prstClr>
+            </a:outerShdw>
+          </a:effectLst>
+        </p:spPr>
+        <p:style>
+          <a:lnRef idx="2">
+            <a:schemeClr val="accent1">
+              <a:shade val="15000"/>
+            </a:schemeClr>
+          </a:lnRef>
+          <a:fillRef idx="1">
+            <a:schemeClr val="accent1"/>
+          </a:fillRef>
+          <a:effectRef idx="0">
+            <a:schemeClr val="accent1"/>
+          </a:effectRef>
+          <a:fontRef idx="minor">
+            <a:schemeClr val="lt1"/>
+          </a:fontRef>
+        </p:style>
+        <p:txBody>
+          <a:bodyPr lIns="0" tIns="36000" rIns="0" bIns="0" rtlCol="0" anchor="ctr"/>
+          <a:lstStyle/>
+          <a:p>
+            <a:pPr algn="ctr">
+              <a:lnSpc>
+                <a:spcPct val="80000"/>
+              </a:lnSpc>
+            </a:pPr>
+            <a:r>
+              <a:rPr lang="en-US" sz="1000" b="1">
+                <a:solidFill>
+                  <a:schemeClr val="bg1"/>
+                </a:solidFill>
+                <a:latin typeface="Arial Narrow" panose="020B0606020202030204" pitchFamily="34" charset="0"/>
+              </a:rPr>
+              <a:t>Gold answers</a:t>
+            </a:r>
+            <a:endParaRPr lang="en-CA" sz="1000" b="1">
+              <a:solidFill>
+                <a:schemeClr val="bg1"/>
+              </a:solidFill>
+              <a:latin typeface="Arial Narrow" panose="020B0606020202030204" pitchFamily="34" charset="0"/>
+            </a:endParaRPr>
+          </a:p>
+        </p:txBody>
+      </p:sp>
+      <p:sp>
+        <p:nvSpPr>
+          <p:cNvPr id="8" name="Rectangle: Rounded Corners 7">
+            <a:extLst>
+              <a:ext uri="{FF2B5EF4-FFF2-40B4-BE49-F238E27FC236}">
+                <a16:creationId xmlns:a16="http://schemas.microsoft.com/office/drawing/2014/main" id="{F8C808AF-5F9A-8F96-AC56-E5779A9E4C6D}"/>
+              </a:ext>
+            </a:extLst>
+          </p:cNvPr>
+          <p:cNvSpPr/>
+          <p:nvPr/>
+        </p:nvSpPr>
+        <p:spPr>
+          <a:xfrm>
+            <a:off x="539552" y="1682632"/>
+            <a:ext cx="684000" cy="180000"/>
+          </a:xfrm>
+          <a:prstGeom prst="roundRect">
+            <a:avLst/>
+          </a:prstGeom>
+          <a:solidFill>
+            <a:srgbClr val="1064AF"/>
+          </a:solidFill>
+          <a:ln>
+            <a:solidFill>
+              <a:srgbClr val="1D5B93"/>
+            </a:solidFill>
+          </a:ln>
+          <a:effectLst>
+            <a:outerShdw blurRad="50800" dist="38100" dir="2700000" algn="tl" rotWithShape="0">
+              <a:prstClr val="black">
+                <a:alpha val="20000"/>
+              </a:prstClr>
+            </a:outerShdw>
+          </a:effectLst>
+        </p:spPr>
+        <p:style>
+          <a:lnRef idx="2">
+            <a:schemeClr val="accent1">
+              <a:shade val="15000"/>
+            </a:schemeClr>
+          </a:lnRef>
+          <a:fillRef idx="1">
+            <a:schemeClr val="accent1"/>
+          </a:fillRef>
+          <a:effectRef idx="0">
+            <a:schemeClr val="accent1"/>
+          </a:effectRef>
+          <a:fontRef idx="minor">
+            <a:schemeClr val="lt1"/>
+          </a:fontRef>
+        </p:style>
+        <p:txBody>
+          <a:bodyPr lIns="0" tIns="36000" rIns="0" bIns="0" rtlCol="0" anchor="ctr"/>
+          <a:lstStyle/>
+          <a:p>
+            <a:pPr algn="ctr">
+              <a:lnSpc>
+                <a:spcPct val="80000"/>
+              </a:lnSpc>
+            </a:pPr>
+            <a:r>
+              <a:rPr lang="en-US" sz="1000" b="1">
+                <a:solidFill>
+                  <a:schemeClr val="bg1"/>
+                </a:solidFill>
+                <a:latin typeface="Arial Narrow" panose="020B0606020202030204" pitchFamily="34" charset="0"/>
+              </a:rPr>
+              <a:t>Questions</a:t>
+            </a:r>
+            <a:endParaRPr lang="en-CA" sz="1000" b="1">
+              <a:solidFill>
+                <a:schemeClr val="bg1"/>
+              </a:solidFill>
+              <a:latin typeface="Arial Narrow" panose="020B0606020202030204" pitchFamily="34" charset="0"/>
+            </a:endParaRPr>
+          </a:p>
+        </p:txBody>
+      </p:sp>
+      <p:sp>
+        <p:nvSpPr>
+          <p:cNvPr id="9" name="Rectangle: Rounded Corners 8">
+            <a:extLst>
+              <a:ext uri="{FF2B5EF4-FFF2-40B4-BE49-F238E27FC236}">
+                <a16:creationId xmlns:a16="http://schemas.microsoft.com/office/drawing/2014/main" id="{46D83323-8479-95FA-1451-B395F7E7AF45}"/>
+              </a:ext>
+            </a:extLst>
+          </p:cNvPr>
+          <p:cNvSpPr/>
+          <p:nvPr/>
+        </p:nvSpPr>
+        <p:spPr>
+          <a:xfrm>
+            <a:off x="1403648" y="1682632"/>
+            <a:ext cx="684000" cy="180000"/>
+          </a:xfrm>
+          <a:prstGeom prst="roundRect">
+            <a:avLst/>
+          </a:prstGeom>
+          <a:solidFill>
+            <a:srgbClr val="883588"/>
+          </a:solidFill>
+          <a:ln>
+            <a:solidFill>
+              <a:srgbClr val="6D316D"/>
+            </a:solidFill>
+          </a:ln>
+          <a:effectLst>
+            <a:outerShdw blurRad="50800" dist="38100" dir="2700000" algn="tl" rotWithShape="0">
+              <a:prstClr val="black">
+                <a:alpha val="20000"/>
+              </a:prstClr>
+            </a:outerShdw>
+          </a:effectLst>
+        </p:spPr>
+        <p:style>
+          <a:lnRef idx="2">
+            <a:schemeClr val="accent1">
+              <a:shade val="15000"/>
+            </a:schemeClr>
+          </a:lnRef>
+          <a:fillRef idx="1">
+            <a:schemeClr val="accent1"/>
+          </a:fillRef>
+          <a:effectRef idx="0">
+            <a:schemeClr val="accent1"/>
+          </a:effectRef>
+          <a:fontRef idx="minor">
+            <a:schemeClr val="lt1"/>
+          </a:fontRef>
+        </p:style>
+        <p:txBody>
+          <a:bodyPr lIns="0" tIns="36000" rIns="0" bIns="0" rtlCol="0" anchor="ctr"/>
+          <a:lstStyle/>
+          <a:p>
+            <a:pPr algn="ctr">
+              <a:lnSpc>
+                <a:spcPct val="80000"/>
+              </a:lnSpc>
+            </a:pPr>
+            <a:r>
+              <a:rPr lang="en-US" sz="1000" b="1">
+                <a:solidFill>
+                  <a:schemeClr val="bg1"/>
+                </a:solidFill>
+                <a:latin typeface="Arial Narrow" panose="020B0606020202030204" pitchFamily="34" charset="0"/>
+              </a:rPr>
+              <a:t>Answers</a:t>
+            </a:r>
+            <a:endParaRPr lang="en-CA" sz="1000" b="1">
+              <a:solidFill>
+                <a:schemeClr val="bg1"/>
+              </a:solidFill>
+              <a:latin typeface="Arial Narrow" panose="020B0606020202030204" pitchFamily="34" charset="0"/>
+            </a:endParaRPr>
+          </a:p>
+        </p:txBody>
+      </p:sp>
+      <p:sp>
+        <p:nvSpPr>
+          <p:cNvPr id="10" name="Rectangle: Rounded Corners 9">
+            <a:extLst>
+              <a:ext uri="{FF2B5EF4-FFF2-40B4-BE49-F238E27FC236}">
+                <a16:creationId xmlns:a16="http://schemas.microsoft.com/office/drawing/2014/main" id="{9180B4D0-7563-9B95-FB59-61977E913419}"/>
+              </a:ext>
+            </a:extLst>
+          </p:cNvPr>
+          <p:cNvSpPr/>
+          <p:nvPr/>
+        </p:nvSpPr>
+        <p:spPr>
+          <a:xfrm>
+            <a:off x="2267744" y="1682632"/>
+            <a:ext cx="1080120" cy="180000"/>
+          </a:xfrm>
+          <a:prstGeom prst="roundRect">
+            <a:avLst/>
+          </a:prstGeom>
+          <a:solidFill>
+            <a:srgbClr val="00A5E1"/>
+          </a:solidFill>
+          <a:ln>
+            <a:solidFill>
+              <a:srgbClr val="098EBC"/>
+            </a:solidFill>
+          </a:ln>
+          <a:effectLst>
+            <a:outerShdw blurRad="50800" dist="38100" dir="2700000" algn="tl" rotWithShape="0">
+              <a:prstClr val="black">
+                <a:alpha val="20000"/>
+              </a:prstClr>
+            </a:outerShdw>
+          </a:effectLst>
+        </p:spPr>
+        <p:style>
+          <a:lnRef idx="2">
+            <a:schemeClr val="accent1">
+              <a:shade val="15000"/>
+            </a:schemeClr>
+          </a:lnRef>
+          <a:fillRef idx="1">
+            <a:schemeClr val="accent1"/>
+          </a:fillRef>
+          <a:effectRef idx="0">
+            <a:schemeClr val="accent1"/>
+          </a:effectRef>
+          <a:fontRef idx="minor">
+            <a:schemeClr val="lt1"/>
+          </a:fontRef>
+        </p:style>
+        <p:txBody>
+          <a:bodyPr lIns="0" tIns="36000" rIns="0" bIns="0" rtlCol="0" anchor="ctr"/>
+          <a:lstStyle/>
+          <a:p>
+            <a:pPr algn="ctr">
+              <a:lnSpc>
+                <a:spcPct val="80000"/>
+              </a:lnSpc>
+            </a:pPr>
+            <a:r>
+              <a:rPr lang="en-US" sz="1000" b="1">
+                <a:solidFill>
+                  <a:schemeClr val="bg1"/>
+                </a:solidFill>
+                <a:latin typeface="Arial Narrow" panose="020B0606020202030204" pitchFamily="34" charset="0"/>
+              </a:rPr>
+              <a:t>Retrieved chunks</a:t>
+            </a:r>
+            <a:endParaRPr lang="en-CA" sz="1000" b="1">
+              <a:solidFill>
+                <a:schemeClr val="bg1"/>
+              </a:solidFill>
+              <a:latin typeface="Arial Narrow" panose="020B0606020202030204" pitchFamily="34" charset="0"/>
+            </a:endParaRPr>
+          </a:p>
+        </p:txBody>
+      </p:sp>
+      <p:sp>
+        <p:nvSpPr>
+          <p:cNvPr id="11" name="TextBox 10">
+            <a:extLst>
+              <a:ext uri="{FF2B5EF4-FFF2-40B4-BE49-F238E27FC236}">
+                <a16:creationId xmlns:a16="http://schemas.microsoft.com/office/drawing/2014/main" id="{081CA50B-E4D2-0AEF-3E26-CD6BA3C960B5}"/>
+              </a:ext>
+            </a:extLst>
+          </p:cNvPr>
+          <p:cNvSpPr txBox="1"/>
+          <p:nvPr/>
+        </p:nvSpPr>
+        <p:spPr>
+          <a:xfrm>
+            <a:off x="3923928" y="1168205"/>
+            <a:ext cx="1425070" cy="246221"/>
+          </a:xfrm>
+          <a:prstGeom prst="rect">
+            <a:avLst/>
+          </a:prstGeom>
+          <a:noFill/>
+        </p:spPr>
+        <p:txBody>
+          <a:bodyPr wrap="none" lIns="0" tIns="0" rIns="0" bIns="0" rtlCol="0">
+            <a:spAutoFit/>
+          </a:bodyPr>
+          <a:lstStyle/>
+          <a:p>
+            <a:pPr algn="l"/>
+            <a:r>
+              <a:rPr lang="en-US" sz="1600">
+                <a:solidFill>
+                  <a:srgbClr val="005AB4"/>
+                </a:solidFill>
+                <a:latin typeface="Arial Narrow" panose="020B0606020202030204" pitchFamily="34" charset="0"/>
+              </a:rPr>
+              <a:t>Semantic Similarity</a:t>
+            </a:r>
+            <a:endParaRPr lang="en-CA" sz="1600">
+              <a:solidFill>
+                <a:srgbClr val="005AB4"/>
+              </a:solidFill>
+              <a:latin typeface="Arial Narrow" panose="020B0606020202030204" pitchFamily="34" charset="0"/>
+            </a:endParaRPr>
+          </a:p>
+        </p:txBody>
+      </p:sp>
+      <p:sp>
+        <p:nvSpPr>
+          <p:cNvPr id="12" name="TextBox 11">
+            <a:extLst>
+              <a:ext uri="{FF2B5EF4-FFF2-40B4-BE49-F238E27FC236}">
+                <a16:creationId xmlns:a16="http://schemas.microsoft.com/office/drawing/2014/main" id="{2F19C2E1-88DC-631E-A007-F2BEEFDEDF5F}"/>
+              </a:ext>
+            </a:extLst>
+          </p:cNvPr>
+          <p:cNvSpPr txBox="1"/>
+          <p:nvPr/>
+        </p:nvSpPr>
+        <p:spPr>
+          <a:xfrm>
+            <a:off x="5652120" y="1168205"/>
+            <a:ext cx="1173398" cy="246221"/>
+          </a:xfrm>
+          <a:prstGeom prst="rect">
+            <a:avLst/>
+          </a:prstGeom>
+          <a:noFill/>
+        </p:spPr>
+        <p:txBody>
+          <a:bodyPr wrap="none" lIns="0" tIns="0" rIns="0" bIns="0" rtlCol="0">
+            <a:spAutoFit/>
+          </a:bodyPr>
+          <a:lstStyle/>
+          <a:p>
+            <a:pPr algn="l"/>
+            <a:r>
+              <a:rPr lang="en-US" sz="1600">
+                <a:solidFill>
+                  <a:srgbClr val="005AB4"/>
+                </a:solidFill>
+                <a:latin typeface="Arial Narrow" panose="020B0606020202030204" pitchFamily="34" charset="0"/>
+              </a:rPr>
+              <a:t>LLM-as-a-judge</a:t>
+            </a:r>
+            <a:endParaRPr lang="en-CA" sz="1600">
+              <a:solidFill>
+                <a:srgbClr val="005AB4"/>
+              </a:solidFill>
+              <a:latin typeface="Arial Narrow" panose="020B0606020202030204" pitchFamily="34" charset="0"/>
+            </a:endParaRPr>
+          </a:p>
+        </p:txBody>
+      </p:sp>
+      <p:sp>
+        <p:nvSpPr>
+          <p:cNvPr id="13" name="TextBox 12">
+            <a:extLst>
+              <a:ext uri="{FF2B5EF4-FFF2-40B4-BE49-F238E27FC236}">
+                <a16:creationId xmlns:a16="http://schemas.microsoft.com/office/drawing/2014/main" id="{232E72AE-AD18-466A-A394-924F3C9DE67C}"/>
+              </a:ext>
+            </a:extLst>
+          </p:cNvPr>
+          <p:cNvSpPr txBox="1"/>
+          <p:nvPr/>
+        </p:nvSpPr>
+        <p:spPr>
+          <a:xfrm>
+            <a:off x="3923928" y="1649521"/>
+            <a:ext cx="1425070" cy="246221"/>
+          </a:xfrm>
+          <a:prstGeom prst="rect">
+            <a:avLst/>
+          </a:prstGeom>
+          <a:noFill/>
+        </p:spPr>
+        <p:txBody>
+          <a:bodyPr wrap="none" lIns="0" tIns="0" rIns="0" bIns="0" rtlCol="0">
+            <a:spAutoFit/>
+          </a:bodyPr>
+          <a:lstStyle/>
+          <a:p>
+            <a:pPr algn="l"/>
+            <a:r>
+              <a:rPr lang="en-US" sz="1600">
+                <a:solidFill>
+                  <a:srgbClr val="005AB4"/>
+                </a:solidFill>
+                <a:latin typeface="Arial Narrow" panose="020B0606020202030204" pitchFamily="34" charset="0"/>
+              </a:rPr>
+              <a:t>Semantic Similarity</a:t>
+            </a:r>
+            <a:endParaRPr lang="en-CA" sz="1600">
+              <a:solidFill>
+                <a:srgbClr val="005AB4"/>
+              </a:solidFill>
+              <a:latin typeface="Arial Narrow" panose="020B0606020202030204" pitchFamily="34" charset="0"/>
+            </a:endParaRPr>
+          </a:p>
+        </p:txBody>
+      </p:sp>
+    </p:spTree>
+    <p:extLst>
+      <p:ext uri="{BB962C8B-B14F-4D97-AF65-F5344CB8AC3E}">
+        <p14:creationId xmlns:p14="http://schemas.microsoft.com/office/powerpoint/2010/main" val="218251215"/>
+      </p:ext>
+    </p:extLst>
+  </p:cSld>
+  <p:clrMapOvr>
+    <a:masterClrMapping/>
+  </p:clrMapOvr>
+</p:sld>
+</file>
+
+<file path=ppt/slides/slide15.xml><?xml version="1.0" encoding="utf-8"?>
+<p:sld xmlns:a="http://schemas.openxmlformats.org/drawingml/2006/main" xmlns:r="http://schemas.openxmlformats.org/officeDocument/2006/relationships" xmlns:p="http://schemas.openxmlformats.org/presentationml/2006/main">
+  <p:cSld>
+    <p:spTree>
+      <p:nvGrpSpPr>
+        <p:cNvPr id="1" name=""/>
+        <p:cNvGrpSpPr/>
+        <p:nvPr/>
+      </p:nvGrpSpPr>
+      <p:grpSpPr>
+        <a:xfrm>
+          <a:off x="0" y="0"/>
+          <a:ext cx="0" cy="0"/>
+          <a:chOff x="0" y="0"/>
+          <a:chExt cx="0" cy="0"/>
+        </a:xfrm>
+      </p:grpSpPr>
+      <p:sp>
+        <p:nvSpPr>
+          <p:cNvPr id="2" name="Title 1">
+            <a:extLst>
+              <a:ext uri="{FF2B5EF4-FFF2-40B4-BE49-F238E27FC236}">
+                <a16:creationId xmlns:a16="http://schemas.microsoft.com/office/drawing/2014/main" id="{DA391E45-5173-E639-33B2-276F945F228B}"/>
+              </a:ext>
+            </a:extLst>
+          </p:cNvPr>
+          <p:cNvSpPr>
+            <a:spLocks noGrp="1"/>
+          </p:cNvSpPr>
+          <p:nvPr>
+            <p:ph type="title"/>
+          </p:nvPr>
+        </p:nvSpPr>
+        <p:spPr/>
+        <p:txBody>
+          <a:bodyPr/>
+          <a:lstStyle/>
+          <a:p>
+            <a:r>
+              <a:rPr lang="en-US"/>
+              <a:t>LLM-as-a-judge Prompts</a:t>
+            </a:r>
+            <a:endParaRPr lang="en-CA"/>
+          </a:p>
+        </p:txBody>
+      </p:sp>
+      <p:sp>
+        <p:nvSpPr>
+          <p:cNvPr id="20" name="Content Placeholder 19">
+            <a:extLst>
+              <a:ext uri="{FF2B5EF4-FFF2-40B4-BE49-F238E27FC236}">
+                <a16:creationId xmlns:a16="http://schemas.microsoft.com/office/drawing/2014/main" id="{C3CB07B3-D298-9B78-AD40-C04688DE78A7}"/>
+              </a:ext>
+            </a:extLst>
+          </p:cNvPr>
+          <p:cNvSpPr>
+            <a:spLocks noGrp="1"/>
+          </p:cNvSpPr>
+          <p:nvPr>
+            <p:ph idx="1"/>
+          </p:nvPr>
+        </p:nvSpPr>
+        <p:spPr/>
+        <p:txBody>
+          <a:bodyPr/>
+          <a:lstStyle/>
+          <a:p>
+            <a:pPr marL="0" indent="0">
+              <a:buNone/>
+            </a:pPr>
+            <a:r>
+              <a:rPr lang="en-US" b="1"/>
+              <a:t>Problem:</a:t>
+            </a:r>
+            <a:r>
+              <a:rPr lang="en-US"/>
+              <a:t> Answer scores can differ on each run, even with temperature = 0</a:t>
+            </a:r>
+            <a:endParaRPr lang="en-CA"/>
+          </a:p>
+        </p:txBody>
+      </p:sp>
+      <p:sp>
+        <p:nvSpPr>
+          <p:cNvPr id="11" name="TextBox 10">
+            <a:extLst>
+              <a:ext uri="{FF2B5EF4-FFF2-40B4-BE49-F238E27FC236}">
+                <a16:creationId xmlns:a16="http://schemas.microsoft.com/office/drawing/2014/main" id="{081CA50B-E4D2-0AEF-3E26-CD6BA3C960B5}"/>
+              </a:ext>
+            </a:extLst>
+          </p:cNvPr>
+          <p:cNvSpPr txBox="1"/>
+          <p:nvPr/>
+        </p:nvSpPr>
+        <p:spPr>
+          <a:xfrm>
+            <a:off x="323528" y="1623089"/>
+            <a:ext cx="1667123" cy="246221"/>
+          </a:xfrm>
+          <a:prstGeom prst="rect">
+            <a:avLst/>
+          </a:prstGeom>
+          <a:noFill/>
+        </p:spPr>
+        <p:txBody>
+          <a:bodyPr wrap="none" lIns="0" tIns="0" rIns="0" bIns="0" rtlCol="0">
+            <a:spAutoFit/>
+          </a:bodyPr>
+          <a:lstStyle/>
+          <a:p>
+            <a:pPr algn="l"/>
+            <a:r>
+              <a:rPr lang="en-US" sz="1600">
+                <a:solidFill>
+                  <a:srgbClr val="005AB4"/>
+                </a:solidFill>
+                <a:latin typeface="Arial Narrow" panose="020B0606020202030204" pitchFamily="34" charset="0"/>
+              </a:rPr>
+              <a:t>Simple scoring prompt</a:t>
+            </a:r>
+            <a:endParaRPr lang="en-CA" sz="1600">
+              <a:solidFill>
+                <a:srgbClr val="005AB4"/>
+              </a:solidFill>
+              <a:latin typeface="Arial Narrow" panose="020B0606020202030204" pitchFamily="34" charset="0"/>
+            </a:endParaRPr>
+          </a:p>
+        </p:txBody>
+      </p:sp>
+      <p:pic>
+        <p:nvPicPr>
+          <p:cNvPr id="5" name="Picture 4">
+            <a:extLst>
+              <a:ext uri="{FF2B5EF4-FFF2-40B4-BE49-F238E27FC236}">
+                <a16:creationId xmlns:a16="http://schemas.microsoft.com/office/drawing/2014/main" id="{D86C574C-EA37-E687-AF84-F5BB33BAC0D5}"/>
+              </a:ext>
+            </a:extLst>
+          </p:cNvPr>
+          <p:cNvPicPr>
+            <a:picLocks noChangeAspect="1"/>
+          </p:cNvPicPr>
+          <p:nvPr/>
+        </p:nvPicPr>
+        <p:blipFill>
+          <a:blip r:embed="rId2"/>
+          <a:stretch>
+            <a:fillRect/>
+          </a:stretch>
+        </p:blipFill>
+        <p:spPr>
+          <a:xfrm>
+            <a:off x="2915816" y="1551081"/>
+            <a:ext cx="5993432" cy="911526"/>
+          </a:xfrm>
+          <a:prstGeom prst="rect">
+            <a:avLst/>
+          </a:prstGeom>
+        </p:spPr>
+      </p:pic>
+      <p:sp>
+        <p:nvSpPr>
+          <p:cNvPr id="14" name="TextBox 13">
+            <a:extLst>
+              <a:ext uri="{FF2B5EF4-FFF2-40B4-BE49-F238E27FC236}">
+                <a16:creationId xmlns:a16="http://schemas.microsoft.com/office/drawing/2014/main" id="{ACD0562D-B077-472F-1CDF-B154EAA3C295}"/>
+              </a:ext>
+            </a:extLst>
+          </p:cNvPr>
+          <p:cNvSpPr txBox="1"/>
+          <p:nvPr/>
+        </p:nvSpPr>
+        <p:spPr>
+          <a:xfrm>
+            <a:off x="323528" y="2717841"/>
+            <a:ext cx="1070806" cy="246221"/>
+          </a:xfrm>
+          <a:prstGeom prst="rect">
+            <a:avLst/>
+          </a:prstGeom>
+          <a:noFill/>
+        </p:spPr>
+        <p:txBody>
+          <a:bodyPr wrap="none" lIns="0" tIns="0" rIns="0" bIns="0" rtlCol="0">
+            <a:spAutoFit/>
+          </a:bodyPr>
+          <a:lstStyle/>
+          <a:p>
+            <a:pPr algn="l"/>
+            <a:r>
+              <a:rPr lang="en-US" sz="1600">
+                <a:solidFill>
+                  <a:srgbClr val="005AB4"/>
+                </a:solidFill>
+                <a:latin typeface="Arial Narrow" panose="020B0606020202030204" pitchFamily="34" charset="0"/>
+              </a:rPr>
+              <a:t>Scoring model</a:t>
+            </a:r>
+            <a:endParaRPr lang="en-CA" sz="1600">
+              <a:solidFill>
+                <a:srgbClr val="005AB4"/>
+              </a:solidFill>
+              <a:latin typeface="Arial Narrow" panose="020B0606020202030204" pitchFamily="34" charset="0"/>
+            </a:endParaRPr>
+          </a:p>
+        </p:txBody>
+      </p:sp>
+      <p:pic>
+        <p:nvPicPr>
+          <p:cNvPr id="16" name="Picture 15">
+            <a:extLst>
+              <a:ext uri="{FF2B5EF4-FFF2-40B4-BE49-F238E27FC236}">
+                <a16:creationId xmlns:a16="http://schemas.microsoft.com/office/drawing/2014/main" id="{76E7D3F6-8898-BB5B-65AF-1EC257057413}"/>
+              </a:ext>
+            </a:extLst>
+          </p:cNvPr>
+          <p:cNvPicPr>
+            <a:picLocks noChangeAspect="1"/>
+          </p:cNvPicPr>
+          <p:nvPr/>
+        </p:nvPicPr>
+        <p:blipFill>
+          <a:blip r:embed="rId3"/>
+          <a:stretch>
+            <a:fillRect/>
+          </a:stretch>
+        </p:blipFill>
+        <p:spPr>
+          <a:xfrm>
+            <a:off x="2915816" y="2670523"/>
+            <a:ext cx="5993432" cy="915165"/>
+          </a:xfrm>
+          <a:prstGeom prst="rect">
+            <a:avLst/>
+          </a:prstGeom>
+        </p:spPr>
+      </p:pic>
+      <p:pic>
+        <p:nvPicPr>
+          <p:cNvPr id="18" name="Picture 17">
+            <a:extLst>
+              <a:ext uri="{FF2B5EF4-FFF2-40B4-BE49-F238E27FC236}">
+                <a16:creationId xmlns:a16="http://schemas.microsoft.com/office/drawing/2014/main" id="{8B8EEE7F-1C86-1BD6-154C-0260F2763C1E}"/>
+              </a:ext>
+            </a:extLst>
+          </p:cNvPr>
+          <p:cNvPicPr>
+            <a:picLocks noChangeAspect="1"/>
+          </p:cNvPicPr>
+          <p:nvPr/>
+        </p:nvPicPr>
+        <p:blipFill>
+          <a:blip r:embed="rId4"/>
+          <a:stretch>
+            <a:fillRect/>
+          </a:stretch>
+        </p:blipFill>
+        <p:spPr>
+          <a:xfrm>
+            <a:off x="2915816" y="3793604"/>
+            <a:ext cx="5993432" cy="912827"/>
+          </a:xfrm>
+          <a:prstGeom prst="rect">
+            <a:avLst/>
+          </a:prstGeom>
+        </p:spPr>
+      </p:pic>
+      <p:sp>
+        <p:nvSpPr>
+          <p:cNvPr id="19" name="TextBox 18">
+            <a:extLst>
+              <a:ext uri="{FF2B5EF4-FFF2-40B4-BE49-F238E27FC236}">
+                <a16:creationId xmlns:a16="http://schemas.microsoft.com/office/drawing/2014/main" id="{2147EBBA-F8F3-71F1-0DA2-3BD7F8BB7F82}"/>
+              </a:ext>
+            </a:extLst>
+          </p:cNvPr>
+          <p:cNvSpPr txBox="1"/>
+          <p:nvPr/>
+        </p:nvSpPr>
+        <p:spPr>
+          <a:xfrm>
+            <a:off x="323528" y="3826376"/>
+            <a:ext cx="1726435" cy="246221"/>
+          </a:xfrm>
+          <a:prstGeom prst="rect">
+            <a:avLst/>
+          </a:prstGeom>
+          <a:noFill/>
+        </p:spPr>
+        <p:txBody>
+          <a:bodyPr wrap="none" lIns="0" tIns="0" rIns="0" bIns="0" rtlCol="0">
+            <a:spAutoFit/>
+          </a:bodyPr>
+          <a:lstStyle/>
+          <a:p>
+            <a:pPr algn="l"/>
+            <a:r>
+              <a:rPr lang="en-US" sz="1600">
+                <a:solidFill>
+                  <a:srgbClr val="005AB4"/>
+                </a:solidFill>
+                <a:latin typeface="Arial Narrow" panose="020B0606020202030204" pitchFamily="34" charset="0"/>
+              </a:rPr>
+              <a:t>Langchain Correctness</a:t>
+            </a:r>
+            <a:endParaRPr lang="en-CA" sz="1600">
+              <a:solidFill>
+                <a:srgbClr val="005AB4"/>
+              </a:solidFill>
+              <a:latin typeface="Arial Narrow" panose="020B0606020202030204" pitchFamily="34" charset="0"/>
+            </a:endParaRPr>
+          </a:p>
+        </p:txBody>
+      </p:sp>
+    </p:spTree>
+    <p:extLst>
+      <p:ext uri="{BB962C8B-B14F-4D97-AF65-F5344CB8AC3E}">
+        <p14:creationId xmlns:p14="http://schemas.microsoft.com/office/powerpoint/2010/main" val="2002005780"/>
       </p:ext>
     </p:extLst>
   </p:cSld>

</xml_diff>